<commit_message>
new files and source code
</commit_message>
<xml_diff>
--- a/Lab Tuesday/Lecture/[MultiDisplicine] Simple CE.pptx
+++ b/Lab Tuesday/Lecture/[MultiDisplicine] Simple CE.pptx
@@ -477,38 +477,37 @@
           <a:p>
             <a:pPr lvl="0"/>
             <a:r>
-              <a:rPr lang="en-US" smtClean="0"/>
+              <a:rPr lang="en-US"/>
               <a:t>Click to edit Master text styles</a:t>
             </a:r>
           </a:p>
           <a:p>
             <a:pPr lvl="1"/>
             <a:r>
-              <a:rPr lang="en-US" smtClean="0"/>
+              <a:rPr lang="en-US"/>
               <a:t>Second level</a:t>
             </a:r>
           </a:p>
           <a:p>
             <a:pPr lvl="2"/>
             <a:r>
-              <a:rPr lang="en-US" smtClean="0"/>
+              <a:rPr lang="en-US"/>
               <a:t>Third level</a:t>
             </a:r>
           </a:p>
           <a:p>
             <a:pPr lvl="3"/>
             <a:r>
-              <a:rPr lang="en-US" smtClean="0"/>
+              <a:rPr lang="en-US"/>
               <a:t>Fourth level</a:t>
             </a:r>
           </a:p>
           <a:p>
             <a:pPr lvl="4"/>
             <a:r>
-              <a:rPr lang="en-US" smtClean="0"/>
+              <a:rPr lang="en-US"/>
               <a:t>Fifth level</a:t>
             </a:r>
-            <a:endParaRPr lang="en-US"/>
           </a:p>
         </p:txBody>
       </p:sp>
@@ -1543,10 +1542,9 @@
           </a:lstStyle>
           <a:p>
             <a:r>
-              <a:rPr kumimoji="0" lang="en-US" smtClean="0"/>
+              <a:rPr kumimoji="0" lang="en-US"/>
               <a:t>Click to edit Master subtitle style</a:t>
             </a:r>
-            <a:endParaRPr kumimoji="0" lang="en-US"/>
           </a:p>
         </p:txBody>
       </p:sp>
@@ -1580,10 +1578,9 @@
           </a:lstStyle>
           <a:p>
             <a:r>
-              <a:rPr kumimoji="0" lang="en-US" dirty="0" smtClean="0"/>
+              <a:rPr kumimoji="0" lang="en-US" dirty="0"/>
               <a:t>Click to edit Master title style</a:t>
             </a:r>
-            <a:endParaRPr kumimoji="0" lang="en-US" dirty="0"/>
           </a:p>
         </p:txBody>
       </p:sp>
@@ -1711,35 +1708,35 @@
           <a:p>
             <a:pPr lvl="0" eaLnBrk="1" latinLnBrk="0" hangingPunct="1"/>
             <a:r>
-              <a:rPr lang="en-US" smtClean="0"/>
+              <a:rPr lang="en-US"/>
               <a:t>Click to edit Master text styles</a:t>
             </a:r>
           </a:p>
           <a:p>
             <a:pPr lvl="1" eaLnBrk="1" latinLnBrk="0" hangingPunct="1"/>
             <a:r>
-              <a:rPr lang="en-US" smtClean="0"/>
+              <a:rPr lang="en-US"/>
               <a:t>Second level</a:t>
             </a:r>
           </a:p>
           <a:p>
             <a:pPr lvl="2" eaLnBrk="1" latinLnBrk="0" hangingPunct="1"/>
             <a:r>
-              <a:rPr lang="en-US" smtClean="0"/>
+              <a:rPr lang="en-US"/>
               <a:t>Third level</a:t>
             </a:r>
           </a:p>
           <a:p>
             <a:pPr lvl="3" eaLnBrk="1" latinLnBrk="0" hangingPunct="1"/>
             <a:r>
-              <a:rPr lang="en-US" smtClean="0"/>
+              <a:rPr lang="en-US"/>
               <a:t>Fourth level</a:t>
             </a:r>
           </a:p>
           <a:p>
             <a:pPr lvl="4" eaLnBrk="1" latinLnBrk="0" hangingPunct="1"/>
             <a:r>
-              <a:rPr lang="en-US" smtClean="0"/>
+              <a:rPr lang="en-US"/>
               <a:t>Fifth level</a:t>
             </a:r>
             <a:endParaRPr kumimoji="0" lang="en-US"/>
@@ -1762,10 +1759,9 @@
           <a:lstStyle/>
           <a:p>
             <a:r>
-              <a:rPr kumimoji="0" lang="en-US" smtClean="0"/>
+              <a:rPr kumimoji="0" lang="en-US"/>
               <a:t>Click to edit Master title style</a:t>
             </a:r>
-            <a:endParaRPr kumimoji="0" lang="en-US"/>
           </a:p>
         </p:txBody>
       </p:sp>
@@ -1898,35 +1894,35 @@
           <a:p>
             <a:pPr lvl="0" eaLnBrk="1" latinLnBrk="0" hangingPunct="1"/>
             <a:r>
-              <a:rPr lang="en-US" smtClean="0"/>
+              <a:rPr lang="en-US"/>
               <a:t>Click to edit Master text styles</a:t>
             </a:r>
           </a:p>
           <a:p>
             <a:pPr lvl="1" eaLnBrk="1" latinLnBrk="0" hangingPunct="1"/>
             <a:r>
-              <a:rPr lang="en-US" smtClean="0"/>
+              <a:rPr lang="en-US"/>
               <a:t>Second level</a:t>
             </a:r>
           </a:p>
           <a:p>
             <a:pPr lvl="2" eaLnBrk="1" latinLnBrk="0" hangingPunct="1"/>
             <a:r>
-              <a:rPr lang="en-US" smtClean="0"/>
+              <a:rPr lang="en-US"/>
               <a:t>Third level</a:t>
             </a:r>
           </a:p>
           <a:p>
             <a:pPr lvl="3" eaLnBrk="1" latinLnBrk="0" hangingPunct="1"/>
             <a:r>
-              <a:rPr lang="en-US" smtClean="0"/>
+              <a:rPr lang="en-US"/>
               <a:t>Fourth level</a:t>
             </a:r>
           </a:p>
           <a:p>
             <a:pPr lvl="4" eaLnBrk="1" latinLnBrk="0" hangingPunct="1"/>
             <a:r>
-              <a:rPr lang="en-US" smtClean="0"/>
+              <a:rPr lang="en-US"/>
               <a:t>Fifth level</a:t>
             </a:r>
             <a:endParaRPr kumimoji="0" lang="en-US"/>
@@ -1954,10 +1950,9 @@
           <a:lstStyle/>
           <a:p>
             <a:r>
-              <a:rPr kumimoji="0" lang="en-US" smtClean="0"/>
+              <a:rPr kumimoji="0" lang="en-US"/>
               <a:t>Click to edit Master title style</a:t>
             </a:r>
-            <a:endParaRPr kumimoji="0" lang="en-US"/>
           </a:p>
         </p:txBody>
       </p:sp>
@@ -2077,92 +2072,92 @@
           <a:p>
             <a:pPr lvl="0" eaLnBrk="1" latinLnBrk="0" hangingPunct="1"/>
             <a:r>
-              <a:rPr lang="en-US" dirty="0" smtClean="0"/>
+              <a:rPr lang="en-US" dirty="0"/>
               <a:t>General Information</a:t>
             </a:r>
           </a:p>
           <a:p>
             <a:pPr lvl="1" eaLnBrk="1" latinLnBrk="0" hangingPunct="1"/>
             <a:r>
-              <a:rPr lang="en-US" dirty="0" smtClean="0"/>
+              <a:rPr lang="en-US" dirty="0"/>
               <a:t>CSE 504003</a:t>
             </a:r>
           </a:p>
           <a:p>
             <a:pPr lvl="1" eaLnBrk="1" latinLnBrk="0" hangingPunct="1"/>
             <a:r>
-              <a:rPr lang="en-US" dirty="0" smtClean="0"/>
+              <a:rPr lang="en-US" dirty="0"/>
               <a:t>3 credits</a:t>
             </a:r>
           </a:p>
           <a:p>
             <a:pPr lvl="1" eaLnBrk="1" latinLnBrk="0" hangingPunct="1"/>
-            <a:endParaRPr lang="en-US" dirty="0" smtClean="0"/>
+            <a:endParaRPr lang="en-US" dirty="0"/>
           </a:p>
           <a:p>
             <a:pPr lvl="0" eaLnBrk="1" latinLnBrk="0" hangingPunct="1"/>
             <a:r>
-              <a:rPr lang="en-US" dirty="0" smtClean="0"/>
+              <a:rPr lang="en-US" dirty="0"/>
               <a:t>Coordinator </a:t>
             </a:r>
           </a:p>
           <a:p>
             <a:pPr lvl="1"/>
             <a:r>
-              <a:rPr lang="en-US" dirty="0" smtClean="0"/>
+              <a:rPr lang="en-US" dirty="0"/>
               <a:t>Pham Hoang </a:t>
             </a:r>
             <a:r>
-              <a:rPr lang="en-US" dirty="0" err="1" smtClean="0"/>
+              <a:rPr lang="en-US" dirty="0" err="1"/>
               <a:t>Anh</a:t>
             </a:r>
-            <a:endParaRPr lang="en-US" dirty="0" smtClean="0"/>
+            <a:endParaRPr lang="en-US" dirty="0"/>
           </a:p>
           <a:p>
             <a:pPr lvl="1"/>
             <a:r>
-              <a:rPr lang="en-US" dirty="0" smtClean="0"/>
+              <a:rPr lang="en-US" dirty="0"/>
               <a:t>Dept. Computer Engineering, Faculty of Computer Science and Engineering, HCMC Uni. Of Technology </a:t>
             </a:r>
           </a:p>
           <a:p>
             <a:pPr lvl="1"/>
             <a:r>
-              <a:rPr lang="en-US" dirty="0" smtClean="0"/>
+              <a:rPr lang="en-US" dirty="0"/>
               <a:t>Email: </a:t>
             </a:r>
             <a:r>
-              <a:rPr lang="en-US" dirty="0" smtClean="0">
+              <a:rPr lang="en-US" dirty="0">
                 <a:hlinkClick r:id="rId2"/>
               </a:rPr>
               <a:t>anhpham@cse.hcmut.edu.vn</a:t>
             </a:r>
             <a:r>
-              <a:rPr lang="en-US" dirty="0" smtClean="0"/>
+              <a:rPr lang="en-US" dirty="0"/>
               <a:t> </a:t>
             </a:r>
           </a:p>
           <a:p>
             <a:pPr lvl="1"/>
             <a:r>
-              <a:rPr lang="en-US" dirty="0" smtClean="0"/>
+              <a:rPr lang="en-US" dirty="0"/>
               <a:t>Phone: (08)38647256 (Ext. 5843)</a:t>
             </a:r>
           </a:p>
           <a:p>
             <a:pPr lvl="1"/>
             <a:r>
-              <a:rPr lang="en-US" dirty="0" smtClean="0"/>
+              <a:rPr lang="en-US" dirty="0"/>
               <a:t>Homepage: </a:t>
             </a:r>
             <a:r>
-              <a:rPr lang="en-US" dirty="0" smtClean="0">
+              <a:rPr lang="en-US" dirty="0">
                 <a:hlinkClick r:id="rId3"/>
               </a:rPr>
               <a:t>www.cse.hcmut.edu.vn/~anhpham</a:t>
             </a:r>
             <a:r>
-              <a:rPr lang="en-US" dirty="0" smtClean="0"/>
+              <a:rPr lang="en-US" dirty="0"/>
               <a:t> </a:t>
             </a:r>
           </a:p>
@@ -2198,10 +2193,9 @@
           </a:lstStyle>
           <a:p>
             <a:r>
-              <a:rPr kumimoji="0" lang="en-US" dirty="0" smtClean="0"/>
+              <a:rPr kumimoji="0" lang="en-US" dirty="0"/>
               <a:t>Click to edit Master title style</a:t>
             </a:r>
-            <a:endParaRPr kumimoji="0" lang="en-US" dirty="0"/>
           </a:p>
         </p:txBody>
       </p:sp>
@@ -2429,7 +2423,7 @@
           <a:p>
             <a:pPr lvl="0" eaLnBrk="1" latinLnBrk="0" hangingPunct="1"/>
             <a:r>
-              <a:rPr kumimoji="0" lang="en-US" smtClean="0"/>
+              <a:rPr kumimoji="0" lang="en-US"/>
               <a:t>Click to edit Master text styles</a:t>
             </a:r>
           </a:p>
@@ -2476,7 +2470,7 @@
           </a:lstStyle>
           <a:p>
             <a:r>
-              <a:rPr kumimoji="0" lang="en-US" smtClean="0"/>
+              <a:rPr kumimoji="0" lang="en-US"/>
               <a:t>Click to edit Master title style</a:t>
             </a:r>
             <a:endParaRPr kumimoji="0" lang="en-US" dirty="0"/>
@@ -2628,35 +2622,35 @@
           <a:p>
             <a:pPr lvl="0" eaLnBrk="1" latinLnBrk="0" hangingPunct="1"/>
             <a:r>
-              <a:rPr lang="en-US" smtClean="0"/>
+              <a:rPr lang="en-US"/>
               <a:t>Click to edit Master text styles</a:t>
             </a:r>
           </a:p>
           <a:p>
             <a:pPr lvl="1" eaLnBrk="1" latinLnBrk="0" hangingPunct="1"/>
             <a:r>
-              <a:rPr lang="en-US" smtClean="0"/>
+              <a:rPr lang="en-US"/>
               <a:t>Second level</a:t>
             </a:r>
           </a:p>
           <a:p>
             <a:pPr lvl="2" eaLnBrk="1" latinLnBrk="0" hangingPunct="1"/>
             <a:r>
-              <a:rPr lang="en-US" smtClean="0"/>
+              <a:rPr lang="en-US"/>
               <a:t>Third level</a:t>
             </a:r>
           </a:p>
           <a:p>
             <a:pPr lvl="3" eaLnBrk="1" latinLnBrk="0" hangingPunct="1"/>
             <a:r>
-              <a:rPr lang="en-US" smtClean="0"/>
+              <a:rPr lang="en-US"/>
               <a:t>Fourth level</a:t>
             </a:r>
           </a:p>
           <a:p>
             <a:pPr lvl="4" eaLnBrk="1" latinLnBrk="0" hangingPunct="1"/>
             <a:r>
-              <a:rPr lang="en-US" smtClean="0"/>
+              <a:rPr lang="en-US"/>
               <a:t>Fifth level</a:t>
             </a:r>
             <a:endParaRPr kumimoji="0" lang="en-US"/>
@@ -2701,35 +2695,35 @@
           <a:p>
             <a:pPr lvl="0" eaLnBrk="1" latinLnBrk="0" hangingPunct="1"/>
             <a:r>
-              <a:rPr lang="en-US" smtClean="0"/>
+              <a:rPr lang="en-US"/>
               <a:t>Click to edit Master text styles</a:t>
             </a:r>
           </a:p>
           <a:p>
             <a:pPr lvl="1" eaLnBrk="1" latinLnBrk="0" hangingPunct="1"/>
             <a:r>
-              <a:rPr lang="en-US" smtClean="0"/>
+              <a:rPr lang="en-US"/>
               <a:t>Second level</a:t>
             </a:r>
           </a:p>
           <a:p>
             <a:pPr lvl="2" eaLnBrk="1" latinLnBrk="0" hangingPunct="1"/>
             <a:r>
-              <a:rPr lang="en-US" smtClean="0"/>
+              <a:rPr lang="en-US"/>
               <a:t>Third level</a:t>
             </a:r>
           </a:p>
           <a:p>
             <a:pPr lvl="3" eaLnBrk="1" latinLnBrk="0" hangingPunct="1"/>
             <a:r>
-              <a:rPr lang="en-US" smtClean="0"/>
+              <a:rPr lang="en-US"/>
               <a:t>Fourth level</a:t>
             </a:r>
           </a:p>
           <a:p>
             <a:pPr lvl="4" eaLnBrk="1" latinLnBrk="0" hangingPunct="1"/>
             <a:r>
-              <a:rPr lang="en-US" smtClean="0"/>
+              <a:rPr lang="en-US"/>
               <a:t>Fifth level</a:t>
             </a:r>
             <a:endParaRPr kumimoji="0" lang="en-US"/>
@@ -2752,10 +2746,9 @@
           <a:lstStyle/>
           <a:p>
             <a:r>
-              <a:rPr kumimoji="0" lang="en-US" smtClean="0"/>
+              <a:rPr kumimoji="0" lang="en-US"/>
               <a:t>Click to edit Master title style</a:t>
             </a:r>
-            <a:endParaRPr kumimoji="0" lang="en-US"/>
           </a:p>
         </p:txBody>
       </p:sp>
@@ -2781,7 +2774,7 @@
       </p:transition>
     </mc:Fallback>
   </mc:AlternateContent>
-  <p:extLst mod="1">
+  <p:extLst>
     <p:ext uri="{DCECCB84-F9BA-43D5-87BE-67443E8EF086}">
       <p15:sldGuideLst xmlns:p15="http://schemas.microsoft.com/office/powerpoint/2012/main">
         <p15:guide id="0" orient="horz" pos="2160" userDrawn="1">
@@ -2920,35 +2913,35 @@
           <a:p>
             <a:pPr lvl="0" eaLnBrk="1" latinLnBrk="0" hangingPunct="1"/>
             <a:r>
-              <a:rPr lang="en-US" smtClean="0"/>
+              <a:rPr lang="en-US"/>
               <a:t>Click to edit Master text styles</a:t>
             </a:r>
           </a:p>
           <a:p>
             <a:pPr lvl="1" eaLnBrk="1" latinLnBrk="0" hangingPunct="1"/>
             <a:r>
-              <a:rPr lang="en-US" smtClean="0"/>
+              <a:rPr lang="en-US"/>
               <a:t>Second level</a:t>
             </a:r>
           </a:p>
           <a:p>
             <a:pPr lvl="2" eaLnBrk="1" latinLnBrk="0" hangingPunct="1"/>
             <a:r>
-              <a:rPr lang="en-US" smtClean="0"/>
+              <a:rPr lang="en-US"/>
               <a:t>Third level</a:t>
             </a:r>
           </a:p>
           <a:p>
             <a:pPr lvl="3" eaLnBrk="1" latinLnBrk="0" hangingPunct="1"/>
             <a:r>
-              <a:rPr lang="en-US" smtClean="0"/>
+              <a:rPr lang="en-US"/>
               <a:t>Fourth level</a:t>
             </a:r>
           </a:p>
           <a:p>
             <a:pPr lvl="4" eaLnBrk="1" latinLnBrk="0" hangingPunct="1"/>
             <a:r>
-              <a:rPr lang="en-US" smtClean="0"/>
+              <a:rPr lang="en-US"/>
               <a:t>Fifth level</a:t>
             </a:r>
             <a:endParaRPr kumimoji="0" lang="en-US"/>
@@ -3018,7 +3011,7 @@
           <a:p>
             <a:pPr lvl="0" eaLnBrk="1" latinLnBrk="0" hangingPunct="1"/>
             <a:r>
-              <a:rPr kumimoji="0" lang="en-US" smtClean="0"/>
+              <a:rPr kumimoji="0" lang="en-US"/>
               <a:t>Click to edit Master text styles</a:t>
             </a:r>
           </a:p>
@@ -3062,35 +3055,35 @@
           <a:p>
             <a:pPr lvl="0" eaLnBrk="1" latinLnBrk="0" hangingPunct="1"/>
             <a:r>
-              <a:rPr lang="en-US" smtClean="0"/>
+              <a:rPr lang="en-US"/>
               <a:t>Click to edit Master text styles</a:t>
             </a:r>
           </a:p>
           <a:p>
             <a:pPr lvl="1" eaLnBrk="1" latinLnBrk="0" hangingPunct="1"/>
             <a:r>
-              <a:rPr lang="en-US" smtClean="0"/>
+              <a:rPr lang="en-US"/>
               <a:t>Second level</a:t>
             </a:r>
           </a:p>
           <a:p>
             <a:pPr lvl="2" eaLnBrk="1" latinLnBrk="0" hangingPunct="1"/>
             <a:r>
-              <a:rPr lang="en-US" smtClean="0"/>
+              <a:rPr lang="en-US"/>
               <a:t>Third level</a:t>
             </a:r>
           </a:p>
           <a:p>
             <a:pPr lvl="3" eaLnBrk="1" latinLnBrk="0" hangingPunct="1"/>
             <a:r>
-              <a:rPr lang="en-US" smtClean="0"/>
+              <a:rPr lang="en-US"/>
               <a:t>Fourth level</a:t>
             </a:r>
           </a:p>
           <a:p>
             <a:pPr lvl="4" eaLnBrk="1" latinLnBrk="0" hangingPunct="1"/>
             <a:r>
-              <a:rPr lang="en-US" smtClean="0"/>
+              <a:rPr lang="en-US"/>
               <a:t>Fifth level</a:t>
             </a:r>
             <a:endParaRPr kumimoji="0" lang="en-US"/>
@@ -3160,7 +3153,7 @@
           <a:p>
             <a:pPr lvl="0" eaLnBrk="1" latinLnBrk="0" hangingPunct="1"/>
             <a:r>
-              <a:rPr kumimoji="0" lang="en-US" smtClean="0"/>
+              <a:rPr kumimoji="0" lang="en-US"/>
               <a:t>Click to edit Master text styles</a:t>
             </a:r>
           </a:p>
@@ -3191,10 +3184,9 @@
           </a:lstStyle>
           <a:p>
             <a:r>
-              <a:rPr kumimoji="0" lang="en-US" smtClean="0"/>
+              <a:rPr kumimoji="0" lang="en-US"/>
               <a:t>Click to edit Master title style</a:t>
             </a:r>
-            <a:endParaRPr kumimoji="0" lang="en-US"/>
           </a:p>
         </p:txBody>
       </p:sp>
@@ -3349,10 +3341,9 @@
           </a:lstStyle>
           <a:p>
             <a:r>
-              <a:rPr kumimoji="0" lang="en-US" smtClean="0"/>
+              <a:rPr kumimoji="0" lang="en-US"/>
               <a:t>Click to edit Master title style</a:t>
             </a:r>
-            <a:endParaRPr kumimoji="0" lang="en-US"/>
           </a:p>
         </p:txBody>
       </p:sp>
@@ -3608,35 +3599,35 @@
           <a:p>
             <a:pPr lvl="0" eaLnBrk="1" latinLnBrk="0" hangingPunct="1"/>
             <a:r>
-              <a:rPr lang="en-US" smtClean="0"/>
+              <a:rPr lang="en-US"/>
               <a:t>Click to edit Master text styles</a:t>
             </a:r>
           </a:p>
           <a:p>
             <a:pPr lvl="1" eaLnBrk="1" latinLnBrk="0" hangingPunct="1"/>
             <a:r>
-              <a:rPr lang="en-US" smtClean="0"/>
+              <a:rPr lang="en-US"/>
               <a:t>Second level</a:t>
             </a:r>
           </a:p>
           <a:p>
             <a:pPr lvl="2" eaLnBrk="1" latinLnBrk="0" hangingPunct="1"/>
             <a:r>
-              <a:rPr lang="en-US" smtClean="0"/>
+              <a:rPr lang="en-US"/>
               <a:t>Third level</a:t>
             </a:r>
           </a:p>
           <a:p>
             <a:pPr lvl="3" eaLnBrk="1" latinLnBrk="0" hangingPunct="1"/>
             <a:r>
-              <a:rPr lang="en-US" smtClean="0"/>
+              <a:rPr lang="en-US"/>
               <a:t>Fourth level</a:t>
             </a:r>
           </a:p>
           <a:p>
             <a:pPr lvl="4" eaLnBrk="1" latinLnBrk="0" hangingPunct="1"/>
             <a:r>
-              <a:rPr lang="en-US" smtClean="0"/>
+              <a:rPr lang="en-US"/>
               <a:t>Fifth level</a:t>
             </a:r>
             <a:endParaRPr kumimoji="0" lang="en-US"/>
@@ -3686,7 +3677,7 @@
           <a:p>
             <a:pPr lvl="0" eaLnBrk="1" latinLnBrk="0" hangingPunct="1"/>
             <a:r>
-              <a:rPr kumimoji="0" lang="en-US" smtClean="0"/>
+              <a:rPr kumimoji="0" lang="en-US"/>
               <a:t>Click to edit Master text styles</a:t>
             </a:r>
           </a:p>
@@ -3718,10 +3709,9 @@
           </a:lstStyle>
           <a:p>
             <a:r>
-              <a:rPr kumimoji="0" lang="en-US" smtClean="0"/>
+              <a:rPr kumimoji="0" lang="en-US"/>
               <a:t>Click to edit Master title style</a:t>
             </a:r>
-            <a:endParaRPr kumimoji="0" lang="en-US"/>
           </a:p>
         </p:txBody>
       </p:sp>
@@ -3886,7 +3876,7 @@
           </a:lstStyle>
           <a:p>
             <a:r>
-              <a:rPr kumimoji="0" lang="en-US" smtClean="0"/>
+              <a:rPr kumimoji="0" lang="en-US"/>
               <a:t>Click icon to add picture</a:t>
             </a:r>
             <a:endParaRPr kumimoji="0" lang="en-US" dirty="0"/>
@@ -3947,7 +3937,7 @@
           <a:p>
             <a:pPr lvl="0" eaLnBrk="1" latinLnBrk="0" hangingPunct="1"/>
             <a:r>
-              <a:rPr kumimoji="0" lang="en-US" smtClean="0"/>
+              <a:rPr kumimoji="0" lang="en-US"/>
               <a:t>Click to edit Master text styles</a:t>
             </a:r>
           </a:p>
@@ -3979,10 +3969,9 @@
           </a:lstStyle>
           <a:p>
             <a:r>
-              <a:rPr kumimoji="0" lang="en-US" smtClean="0"/>
+              <a:rPr kumimoji="0" lang="en-US"/>
               <a:t>Click to edit Master title style</a:t>
             </a:r>
-            <a:endParaRPr kumimoji="0" lang="en-US"/>
           </a:p>
         </p:txBody>
       </p:sp>
@@ -4791,35 +4780,35 @@
           <a:p>
             <a:pPr lvl="0"/>
             <a:r>
-              <a:rPr lang="en-US" smtClean="0"/>
+              <a:rPr lang="en-US"/>
               <a:t>Click to edit Master text styles</a:t>
             </a:r>
           </a:p>
           <a:p>
             <a:pPr lvl="1"/>
             <a:r>
-              <a:rPr lang="en-US" smtClean="0"/>
+              <a:rPr lang="en-US"/>
               <a:t>Second level</a:t>
             </a:r>
           </a:p>
           <a:p>
             <a:pPr lvl="2"/>
             <a:r>
-              <a:rPr lang="en-US" smtClean="0"/>
+              <a:rPr lang="en-US"/>
               <a:t>Third level</a:t>
             </a:r>
           </a:p>
           <a:p>
             <a:pPr lvl="3"/>
             <a:r>
-              <a:rPr lang="en-US" smtClean="0"/>
+              <a:rPr lang="en-US"/>
               <a:t>Fourth level</a:t>
             </a:r>
           </a:p>
           <a:p>
             <a:pPr lvl="4"/>
             <a:r>
-              <a:rPr lang="en-US" smtClean="0"/>
+              <a:rPr lang="en-US"/>
               <a:t>Fifth level</a:t>
             </a:r>
             <a:endParaRPr lang="en-US" dirty="0"/>
@@ -4852,7 +4841,7 @@
           <a:lstStyle/>
           <a:p>
             <a:r>
-              <a:rPr kumimoji="0" lang="en-US" smtClean="0"/>
+              <a:rPr kumimoji="0" lang="en-US"/>
               <a:t>Click to edit Master title style</a:t>
             </a:r>
             <a:endParaRPr kumimoji="0" lang="en-US" dirty="0"/>
@@ -4892,13 +4881,6 @@
       </p:transition>
     </mc:Fallback>
   </mc:AlternateContent>
-  <p:timing>
-    <p:tnLst>
-      <p:par>
-        <p:cTn id="1" dur="indefinite" restart="never" nodeType="tmRoot"/>
-      </p:par>
-    </p:tnLst>
-  </p:timing>
   <p:hf sldNum="0" hdr="0" ftr="0" dt="0"/>
   <p:txStyles>
     <p:titleStyle>
@@ -5174,7 +5156,7 @@
       </a:lvl9pPr>
     </p:otherStyle>
   </p:txStyles>
-  <p:extLst mod="1">
+  <p:extLst>
     <p:ext uri="{27BBF7A9-308A-43DC-89C8-2F10F3537804}">
       <p15:sldGuideLst xmlns:p15="http://schemas.microsoft.com/office/powerpoint/2012/main">
         <p15:guide id="0" orient="horz" pos="2160" userDrawn="1">
@@ -5239,7 +5221,7 @@
           <a:p>
             <a:pPr algn="ctr"/>
             <a:r>
-              <a:rPr lang="en-US" dirty="0" smtClean="0">
+              <a:rPr lang="en-US" dirty="0">
                 <a:solidFill>
                   <a:srgbClr val="FFFF00"/>
                 </a:solidFill>
@@ -5278,21 +5260,21 @@
           </a:p>
           <a:p>
             <a:r>
-              <a:rPr lang="en-US" dirty="0" smtClean="0">
+              <a:rPr lang="en-US" dirty="0">
                 <a:hlinkClick r:id="rId3"/>
               </a:rPr>
               <a:t>trongnhanle@hcmut.edu.vn</a:t>
             </a:r>
-            <a:endParaRPr lang="en-US" dirty="0" smtClean="0"/>
-          </a:p>
-          <a:p>
-            <a:r>
-              <a:rPr lang="en-US" dirty="0" smtClean="0">
+            <a:endParaRPr lang="en-US" dirty="0"/>
+          </a:p>
+          <a:p>
+            <a:r>
+              <a:rPr lang="en-US" dirty="0">
                 <a:hlinkClick r:id="rId4"/>
               </a:rPr>
               <a:t>trongnhanle85@gmail.com</a:t>
             </a:r>
-            <a:endParaRPr lang="en-US" dirty="0" smtClean="0"/>
+            <a:endParaRPr lang="en-US" dirty="0"/>
           </a:p>
           <a:p>
             <a:endParaRPr lang="en-US" dirty="0"/>
@@ -5341,7 +5323,7 @@
           </a:lstStyle>
           <a:p>
             <a:r>
-              <a:rPr lang="en-US" sz="3000" b="1" dirty="0" smtClean="0">
+              <a:rPr lang="en-US" sz="3000" b="1" dirty="0">
                 <a:solidFill>
                   <a:srgbClr val="FFC000"/>
                 </a:solidFill>
@@ -5350,13 +5332,6 @@
               </a:rPr>
               <a:t>LÊ TRỌNG NHÂN</a:t>
             </a:r>
-            <a:endParaRPr lang="en-US" sz="3000" b="1" dirty="0">
-              <a:solidFill>
-                <a:srgbClr val="FFC000"/>
-              </a:solidFill>
-              <a:latin typeface="Arial" panose="020B0604020202020204" pitchFamily="34" charset="0"/>
-              <a:cs typeface="Arial" panose="020B0604020202020204" pitchFamily="34" charset="0"/>
-            </a:endParaRPr>
           </a:p>
         </p:txBody>
       </p:sp>
@@ -5464,13 +5439,6 @@
       </p:transition>
     </mc:Fallback>
   </mc:AlternateContent>
-  <p:timing>
-    <p:tnLst>
-      <p:par>
-        <p:cTn id="1" dur="indefinite" restart="never" nodeType="tmRoot"/>
-      </p:par>
-    </p:tnLst>
-  </p:timing>
 </p:sld>
 </file>
 
@@ -5507,10 +5475,9 @@
           <a:lstStyle/>
           <a:p>
             <a:r>
-              <a:rPr lang="en-US" dirty="0" smtClean="0"/>
+              <a:rPr lang="en-US" dirty="0"/>
               <a:t>Receive and Process Data</a:t>
             </a:r>
-            <a:endParaRPr lang="en-US" dirty="0"/>
           </a:p>
         </p:txBody>
       </p:sp>
@@ -5627,11 +5594,11 @@
           </a:p>
           <a:p>
             <a:r>
-              <a:rPr lang="en-US" sz="1600" dirty="0" err="1" smtClean="0"/>
+              <a:rPr lang="en-US" sz="1600" dirty="0" err="1"/>
               <a:t>def</a:t>
             </a:r>
             <a:r>
-              <a:rPr lang="en-US" sz="1600" dirty="0" smtClean="0"/>
+              <a:rPr lang="en-US" sz="1600" dirty="0"/>
               <a:t> </a:t>
             </a:r>
             <a:r>
@@ -5819,13 +5786,6 @@
       </p:transition>
     </mc:Fallback>
   </mc:AlternateContent>
-  <p:timing>
-    <p:tnLst>
-      <p:par>
-        <p:cTn id="1" dur="indefinite" restart="never" nodeType="tmRoot"/>
-      </p:par>
-    </p:tnLst>
-  </p:timing>
 </p:sld>
 </file>
 
@@ -5862,10 +5822,9 @@
           <a:lstStyle/>
           <a:p>
             <a:r>
-              <a:rPr lang="en-US" dirty="0" smtClean="0"/>
+              <a:rPr lang="en-US" dirty="0"/>
               <a:t>Request Sensory Data</a:t>
             </a:r>
-            <a:endParaRPr lang="en-US" dirty="0"/>
           </a:p>
         </p:txBody>
       </p:sp>
@@ -5940,7 +5899,7 @@
               <a:tabLst/>
             </a:pPr>
             <a:r>
-              <a:rPr kumimoji="0" lang="en-US" sz="3600" b="0" i="0" u="none" strike="noStrike" cap="none" normalizeH="0" baseline="0" dirty="0" err="1" smtClean="0">
+              <a:rPr kumimoji="0" lang="en-US" sz="3600" b="0" i="0" u="none" strike="noStrike" cap="none" normalizeH="0" baseline="0" dirty="0" err="1">
                 <a:ln>
                   <a:noFill/>
                 </a:ln>
@@ -5953,7 +5912,7 @@
               <a:t>def</a:t>
             </a:r>
             <a:r>
-              <a:rPr kumimoji="0" lang="en-US" sz="3600" b="0" i="0" u="none" strike="noStrike" cap="none" normalizeH="0" baseline="0" dirty="0" smtClean="0">
+              <a:rPr kumimoji="0" lang="en-US" sz="3600" b="0" i="0" u="none" strike="noStrike" cap="none" normalizeH="0" baseline="0" dirty="0">
                 <a:ln>
                   <a:noFill/>
                 </a:ln>
@@ -5966,7 +5925,7 @@
               <a:t> </a:t>
             </a:r>
             <a:r>
-              <a:rPr kumimoji="0" lang="en-US" sz="3600" b="0" i="0" u="none" strike="noStrike" cap="none" normalizeH="0" baseline="0" dirty="0" err="1" smtClean="0">
+              <a:rPr kumimoji="0" lang="en-US" sz="3600" b="0" i="0" u="none" strike="noStrike" cap="none" normalizeH="0" baseline="0" dirty="0" err="1">
                 <a:ln>
                   <a:noFill/>
                 </a:ln>
@@ -5979,7 +5938,7 @@
               <a:t>requestData</a:t>
             </a:r>
             <a:r>
-              <a:rPr kumimoji="0" lang="en-US" sz="3600" b="0" i="0" u="none" strike="noStrike" cap="none" normalizeH="0" baseline="0" dirty="0" smtClean="0">
+              <a:rPr kumimoji="0" lang="en-US" sz="3600" b="0" i="0" u="none" strike="noStrike" cap="none" normalizeH="0" baseline="0" dirty="0">
                 <a:ln>
                   <a:noFill/>
                 </a:ln>
@@ -5992,7 +5951,7 @@
               <a:t>(</a:t>
             </a:r>
             <a:r>
-              <a:rPr kumimoji="0" lang="en-US" sz="3600" b="0" i="0" u="none" strike="noStrike" cap="none" normalizeH="0" baseline="0" dirty="0" err="1" smtClean="0">
+              <a:rPr kumimoji="0" lang="en-US" sz="3600" b="0" i="0" u="none" strike="noStrike" cap="none" normalizeH="0" baseline="0" dirty="0" err="1">
                 <a:ln>
                   <a:noFill/>
                 </a:ln>
@@ -6005,7 +5964,7 @@
               <a:t>cmd</a:t>
             </a:r>
             <a:r>
-              <a:rPr kumimoji="0" lang="en-US" sz="3600" b="0" i="0" u="none" strike="noStrike" cap="none" normalizeH="0" baseline="0" dirty="0" smtClean="0">
+              <a:rPr kumimoji="0" lang="en-US" sz="3600" b="0" i="0" u="none" strike="noStrike" cap="none" normalizeH="0" baseline="0" dirty="0">
                 <a:ln>
                   <a:noFill/>
                 </a:ln>
@@ -6018,7 +5977,7 @@
               <a:t>):</a:t>
             </a:r>
             <a:br>
-              <a:rPr kumimoji="0" lang="en-US" sz="3600" b="0" i="0" u="none" strike="noStrike" cap="none" normalizeH="0" baseline="0" dirty="0" smtClean="0">
+              <a:rPr kumimoji="0" lang="en-US" sz="3600" b="0" i="0" u="none" strike="noStrike" cap="none" normalizeH="0" baseline="0" dirty="0">
                 <a:ln>
                   <a:noFill/>
                 </a:ln>
@@ -6030,7 +5989,7 @@
               </a:rPr>
             </a:br>
             <a:r>
-              <a:rPr kumimoji="0" lang="en-US" sz="3600" b="0" i="0" u="none" strike="noStrike" cap="none" normalizeH="0" baseline="0" dirty="0" smtClean="0">
+              <a:rPr kumimoji="0" lang="en-US" sz="3600" b="0" i="0" u="none" strike="noStrike" cap="none" normalizeH="0" baseline="0" dirty="0">
                 <a:ln>
                   <a:noFill/>
                 </a:ln>
@@ -6043,7 +6002,7 @@
               <a:t>    </a:t>
             </a:r>
             <a:r>
-              <a:rPr kumimoji="0" lang="en-US" sz="3600" b="0" i="0" u="none" strike="noStrike" cap="none" normalizeH="0" baseline="0" dirty="0" err="1" smtClean="0">
+              <a:rPr kumimoji="0" lang="en-US" sz="3600" b="0" i="0" u="none" strike="noStrike" cap="none" normalizeH="0" baseline="0" dirty="0" err="1">
                 <a:ln>
                   <a:noFill/>
                 </a:ln>
@@ -6056,7 +6015,7 @@
               <a:t>sendCommand</a:t>
             </a:r>
             <a:r>
-              <a:rPr kumimoji="0" lang="en-US" sz="3600" b="0" i="0" u="none" strike="noStrike" cap="none" normalizeH="0" baseline="0" dirty="0" smtClean="0">
+              <a:rPr kumimoji="0" lang="en-US" sz="3600" b="0" i="0" u="none" strike="noStrike" cap="none" normalizeH="0" baseline="0" dirty="0">
                 <a:ln>
                   <a:noFill/>
                 </a:ln>
@@ -6069,7 +6028,7 @@
               <a:t>(</a:t>
             </a:r>
             <a:r>
-              <a:rPr kumimoji="0" lang="en-US" sz="3600" b="0" i="0" u="none" strike="noStrike" cap="none" normalizeH="0" baseline="0" dirty="0" err="1" smtClean="0">
+              <a:rPr kumimoji="0" lang="en-US" sz="3600" b="0" i="0" u="none" strike="noStrike" cap="none" normalizeH="0" baseline="0" dirty="0" err="1">
                 <a:ln>
                   <a:noFill/>
                 </a:ln>
@@ -6082,7 +6041,7 @@
               <a:t>cmd</a:t>
             </a:r>
             <a:r>
-              <a:rPr kumimoji="0" lang="en-US" sz="3600" b="0" i="0" u="none" strike="noStrike" cap="none" normalizeH="0" baseline="0" dirty="0" smtClean="0">
+              <a:rPr kumimoji="0" lang="en-US" sz="3600" b="0" i="0" u="none" strike="noStrike" cap="none" normalizeH="0" baseline="0" dirty="0">
                 <a:ln>
                   <a:noFill/>
                 </a:ln>
@@ -6095,7 +6054,7 @@
               <a:t>)</a:t>
             </a:r>
             <a:br>
-              <a:rPr kumimoji="0" lang="en-US" sz="3600" b="0" i="0" u="none" strike="noStrike" cap="none" normalizeH="0" baseline="0" dirty="0" smtClean="0">
+              <a:rPr kumimoji="0" lang="en-US" sz="3600" b="0" i="0" u="none" strike="noStrike" cap="none" normalizeH="0" baseline="0" dirty="0">
                 <a:ln>
                   <a:noFill/>
                 </a:ln>
@@ -6107,7 +6066,7 @@
               </a:rPr>
             </a:br>
             <a:r>
-              <a:rPr kumimoji="0" lang="en-US" sz="3600" b="0" i="0" u="none" strike="noStrike" cap="none" normalizeH="0" baseline="0" dirty="0" smtClean="0">
+              <a:rPr kumimoji="0" lang="en-US" sz="3600" b="0" i="0" u="none" strike="noStrike" cap="none" normalizeH="0" baseline="0" dirty="0">
                 <a:ln>
                   <a:noFill/>
                 </a:ln>
@@ -6120,7 +6079,7 @@
               <a:t>    </a:t>
             </a:r>
             <a:r>
-              <a:rPr kumimoji="0" lang="en-US" sz="3600" b="0" i="0" u="none" strike="noStrike" cap="none" normalizeH="0" baseline="0" dirty="0" err="1" smtClean="0">
+              <a:rPr kumimoji="0" lang="en-US" sz="3600" b="0" i="0" u="none" strike="noStrike" cap="none" normalizeH="0" baseline="0" dirty="0" err="1">
                 <a:ln>
                   <a:noFill/>
                 </a:ln>
@@ -6133,7 +6092,7 @@
               <a:t>time.sleep</a:t>
             </a:r>
             <a:r>
-              <a:rPr kumimoji="0" lang="en-US" sz="3600" b="0" i="0" u="none" strike="noStrike" cap="none" normalizeH="0" baseline="0" dirty="0" smtClean="0">
+              <a:rPr kumimoji="0" lang="en-US" sz="3600" b="0" i="0" u="none" strike="noStrike" cap="none" normalizeH="0" baseline="0" dirty="0">
                 <a:ln>
                   <a:noFill/>
                 </a:ln>
@@ -6146,7 +6105,7 @@
               <a:t>(</a:t>
             </a:r>
             <a:r>
-              <a:rPr kumimoji="0" lang="en-US" sz="3600" b="0" i="0" u="none" strike="noStrike" cap="none" normalizeH="0" baseline="0" dirty="0" smtClean="0">
+              <a:rPr kumimoji="0" lang="en-US" sz="3600" b="0" i="0" u="none" strike="noStrike" cap="none" normalizeH="0" baseline="0" dirty="0">
                 <a:ln>
                   <a:noFill/>
                 </a:ln>
@@ -6159,7 +6118,7 @@
               <a:t>1</a:t>
             </a:r>
             <a:r>
-              <a:rPr kumimoji="0" lang="en-US" sz="3600" b="0" i="0" u="none" strike="noStrike" cap="none" normalizeH="0" baseline="0" dirty="0" smtClean="0">
+              <a:rPr kumimoji="0" lang="en-US" sz="3600" b="0" i="0" u="none" strike="noStrike" cap="none" normalizeH="0" baseline="0" dirty="0">
                 <a:ln>
                   <a:noFill/>
                 </a:ln>
@@ -6172,7 +6131,7 @@
               <a:t>)</a:t>
             </a:r>
             <a:br>
-              <a:rPr kumimoji="0" lang="en-US" sz="3600" b="0" i="0" u="none" strike="noStrike" cap="none" normalizeH="0" baseline="0" dirty="0" smtClean="0">
+              <a:rPr kumimoji="0" lang="en-US" sz="3600" b="0" i="0" u="none" strike="noStrike" cap="none" normalizeH="0" baseline="0" dirty="0">
                 <a:ln>
                   <a:noFill/>
                 </a:ln>
@@ -6184,7 +6143,7 @@
               </a:rPr>
             </a:br>
             <a:r>
-              <a:rPr kumimoji="0" lang="en-US" sz="3600" b="0" i="0" u="none" strike="noStrike" cap="none" normalizeH="0" baseline="0" dirty="0" smtClean="0">
+              <a:rPr kumimoji="0" lang="en-US" sz="3600" b="0" i="0" u="none" strike="noStrike" cap="none" normalizeH="0" baseline="0" dirty="0">
                 <a:ln>
                   <a:noFill/>
                 </a:ln>
@@ -6197,7 +6156,7 @@
               <a:t>    </a:t>
             </a:r>
             <a:r>
-              <a:rPr kumimoji="0" lang="en-US" sz="3600" b="0" i="0" u="none" strike="noStrike" cap="none" normalizeH="0" baseline="0" dirty="0" err="1" smtClean="0">
+              <a:rPr kumimoji="0" lang="en-US" sz="3600" b="0" i="0" u="none" strike="noStrike" cap="none" normalizeH="0" baseline="0" dirty="0" err="1">
                 <a:ln>
                   <a:noFill/>
                 </a:ln>
@@ -6210,7 +6169,7 @@
               <a:t>readSerial</a:t>
             </a:r>
             <a:r>
-              <a:rPr kumimoji="0" lang="en-US" sz="3600" b="0" i="0" u="none" strike="noStrike" cap="none" normalizeH="0" baseline="0" dirty="0" smtClean="0">
+              <a:rPr kumimoji="0" lang="en-US" sz="3600" b="0" i="0" u="none" strike="noStrike" cap="none" normalizeH="0" baseline="0" dirty="0">
                 <a:ln>
                   <a:noFill/>
                 </a:ln>
@@ -6222,7 +6181,7 @@
               </a:rPr>
               <a:t>()</a:t>
             </a:r>
-            <a:endParaRPr kumimoji="0" lang="en-US" sz="3200" b="0" i="0" u="none" strike="noStrike" cap="none" normalizeH="0" baseline="0" dirty="0" smtClean="0">
+            <a:endParaRPr kumimoji="0" lang="en-US" sz="3200" b="0" i="0" u="none" strike="noStrike" cap="none" normalizeH="0" baseline="0" dirty="0">
               <a:ln>
                 <a:noFill/>
               </a:ln>
@@ -6245,13 +6204,13 @@
   <p:clrMapOvr>
     <a:masterClrMapping/>
   </p:clrMapOvr>
-  <mc:AlternateContent xmlns:mc="http://schemas.openxmlformats.org/markup-compatibility/2006">
-    <mc:Choice xmlns:p14="http://schemas.microsoft.com/office/powerpoint/2010/main" Requires="p14">
+  <mc:AlternateContent xmlns:mc="http://schemas.openxmlformats.org/markup-compatibility/2006" xmlns:p14="http://schemas.microsoft.com/office/powerpoint/2010/main">
+    <mc:Choice Requires="p14">
       <p:transition spd="med" p14:dur="700">
         <p:fade/>
       </p:transition>
     </mc:Choice>
-    <mc:Fallback>
+    <mc:Fallback xmlns="">
       <p:transition spd="med">
         <p:fade/>
       </p:transition>
@@ -6293,10 +6252,9 @@
           <a:lstStyle/>
           <a:p>
             <a:r>
-              <a:rPr lang="en-US" dirty="0" smtClean="0"/>
+              <a:rPr lang="en-US" dirty="0"/>
               <a:t>Testing the Program</a:t>
             </a:r>
-            <a:endParaRPr lang="en-US" dirty="0"/>
           </a:p>
         </p:txBody>
       </p:sp>
@@ -6371,7 +6329,7 @@
               <a:tabLst/>
             </a:pPr>
             <a:r>
-              <a:rPr kumimoji="0" lang="en-US" sz="4000" b="0" i="0" u="none" strike="noStrike" cap="none" normalizeH="0" baseline="0" dirty="0" smtClean="0">
+              <a:rPr kumimoji="0" lang="en-US" sz="4000" b="0" i="0" u="none" strike="noStrike" cap="none" normalizeH="0" baseline="0" dirty="0">
                 <a:ln>
                   <a:noFill/>
                 </a:ln>
@@ -6384,7 +6342,7 @@
               <a:t>while True</a:t>
             </a:r>
             <a:r>
-              <a:rPr kumimoji="0" lang="en-US" sz="4000" b="0" i="0" u="none" strike="noStrike" cap="none" normalizeH="0" baseline="0" dirty="0" smtClean="0">
+              <a:rPr kumimoji="0" lang="en-US" sz="4000" b="0" i="0" u="none" strike="noStrike" cap="none" normalizeH="0" baseline="0" dirty="0">
                 <a:ln>
                   <a:noFill/>
                 </a:ln>
@@ -6397,7 +6355,7 @@
               <a:t>:</a:t>
             </a:r>
             <a:br>
-              <a:rPr kumimoji="0" lang="en-US" sz="4000" b="0" i="0" u="none" strike="noStrike" cap="none" normalizeH="0" baseline="0" dirty="0" smtClean="0">
+              <a:rPr kumimoji="0" lang="en-US" sz="4000" b="0" i="0" u="none" strike="noStrike" cap="none" normalizeH="0" baseline="0" dirty="0">
                 <a:ln>
                   <a:noFill/>
                 </a:ln>
@@ -6409,7 +6367,7 @@
               </a:rPr>
             </a:br>
             <a:r>
-              <a:rPr kumimoji="0" lang="en-US" sz="4000" b="0" i="0" u="none" strike="noStrike" cap="none" normalizeH="0" baseline="0" dirty="0" smtClean="0">
+              <a:rPr kumimoji="0" lang="en-US" sz="4000" b="0" i="0" u="none" strike="noStrike" cap="none" normalizeH="0" baseline="0" dirty="0">
                 <a:ln>
                   <a:noFill/>
                 </a:ln>
@@ -6422,7 +6380,7 @@
               <a:t>    </a:t>
             </a:r>
             <a:r>
-              <a:rPr kumimoji="0" lang="en-US" sz="4000" b="0" i="0" u="none" strike="noStrike" cap="none" normalizeH="0" baseline="0" dirty="0" err="1" smtClean="0">
+              <a:rPr kumimoji="0" lang="en-US" sz="4000" b="0" i="0" u="none" strike="noStrike" cap="none" normalizeH="0" baseline="0" dirty="0" err="1">
                 <a:ln>
                   <a:noFill/>
                 </a:ln>
@@ -6435,7 +6393,7 @@
               <a:t>requestData</a:t>
             </a:r>
             <a:r>
-              <a:rPr kumimoji="0" lang="en-US" sz="4000" b="0" i="0" u="none" strike="noStrike" cap="none" normalizeH="0" baseline="0" dirty="0" smtClean="0">
+              <a:rPr kumimoji="0" lang="en-US" sz="4000" b="0" i="0" u="none" strike="noStrike" cap="none" normalizeH="0" baseline="0" dirty="0">
                 <a:ln>
                   <a:noFill/>
                 </a:ln>
@@ -6448,7 +6406,7 @@
               <a:t>(</a:t>
             </a:r>
             <a:r>
-              <a:rPr kumimoji="0" lang="en-US" sz="4000" b="0" i="0" u="none" strike="noStrike" cap="none" normalizeH="0" baseline="0" dirty="0" smtClean="0">
+              <a:rPr kumimoji="0" lang="en-US" sz="4000" b="0" i="0" u="none" strike="noStrike" cap="none" normalizeH="0" baseline="0" dirty="0">
                 <a:ln>
                   <a:noFill/>
                 </a:ln>
@@ -6461,7 +6419,7 @@
               <a:t>"0"</a:t>
             </a:r>
             <a:r>
-              <a:rPr kumimoji="0" lang="en-US" sz="4000" b="0" i="0" u="none" strike="noStrike" cap="none" normalizeH="0" baseline="0" dirty="0" smtClean="0">
+              <a:rPr kumimoji="0" lang="en-US" sz="4000" b="0" i="0" u="none" strike="noStrike" cap="none" normalizeH="0" baseline="0" dirty="0">
                 <a:ln>
                   <a:noFill/>
                 </a:ln>
@@ -6474,7 +6432,7 @@
               <a:t>)</a:t>
             </a:r>
             <a:br>
-              <a:rPr kumimoji="0" lang="en-US" sz="4000" b="0" i="0" u="none" strike="noStrike" cap="none" normalizeH="0" baseline="0" dirty="0" smtClean="0">
+              <a:rPr kumimoji="0" lang="en-US" sz="4000" b="0" i="0" u="none" strike="noStrike" cap="none" normalizeH="0" baseline="0" dirty="0">
                 <a:ln>
                   <a:noFill/>
                 </a:ln>
@@ -6486,7 +6444,7 @@
               </a:rPr>
             </a:br>
             <a:r>
-              <a:rPr kumimoji="0" lang="en-US" sz="4000" b="0" i="0" u="none" strike="noStrike" cap="none" normalizeH="0" baseline="0" dirty="0" smtClean="0">
+              <a:rPr kumimoji="0" lang="en-US" sz="4000" b="0" i="0" u="none" strike="noStrike" cap="none" normalizeH="0" baseline="0" dirty="0">
                 <a:ln>
                   <a:noFill/>
                 </a:ln>
@@ -6499,7 +6457,7 @@
               <a:t>    </a:t>
             </a:r>
             <a:r>
-              <a:rPr kumimoji="0" lang="en-US" sz="4000" b="0" i="0" u="none" strike="noStrike" cap="none" normalizeH="0" baseline="0" dirty="0" err="1" smtClean="0">
+              <a:rPr kumimoji="0" lang="en-US" sz="4000" b="0" i="0" u="none" strike="noStrike" cap="none" normalizeH="0" baseline="0" dirty="0" err="1">
                 <a:ln>
                   <a:noFill/>
                 </a:ln>
@@ -6512,7 +6470,7 @@
               <a:t>time.sleep</a:t>
             </a:r>
             <a:r>
-              <a:rPr kumimoji="0" lang="en-US" sz="4000" b="0" i="0" u="none" strike="noStrike" cap="none" normalizeH="0" baseline="0" dirty="0" smtClean="0">
+              <a:rPr kumimoji="0" lang="en-US" sz="4000" b="0" i="0" u="none" strike="noStrike" cap="none" normalizeH="0" baseline="0" dirty="0">
                 <a:ln>
                   <a:noFill/>
                 </a:ln>
@@ -6525,7 +6483,7 @@
               <a:t>(</a:t>
             </a:r>
             <a:r>
-              <a:rPr kumimoji="0" lang="en-US" sz="4000" b="0" i="0" u="none" strike="noStrike" cap="none" normalizeH="0" baseline="0" dirty="0" smtClean="0">
+              <a:rPr kumimoji="0" lang="en-US" sz="4000" b="0" i="0" u="none" strike="noStrike" cap="none" normalizeH="0" baseline="0" dirty="0">
                 <a:ln>
                   <a:noFill/>
                 </a:ln>
@@ -6538,7 +6496,7 @@
               <a:t>2</a:t>
             </a:r>
             <a:r>
-              <a:rPr kumimoji="0" lang="en-US" sz="4000" b="0" i="0" u="none" strike="noStrike" cap="none" normalizeH="0" baseline="0" dirty="0" smtClean="0">
+              <a:rPr kumimoji="0" lang="en-US" sz="4000" b="0" i="0" u="none" strike="noStrike" cap="none" normalizeH="0" baseline="0" dirty="0">
                 <a:ln>
                   <a:noFill/>
                 </a:ln>
@@ -6551,7 +6509,7 @@
               <a:t>)</a:t>
             </a:r>
             <a:br>
-              <a:rPr kumimoji="0" lang="en-US" sz="4000" b="0" i="0" u="none" strike="noStrike" cap="none" normalizeH="0" baseline="0" dirty="0" smtClean="0">
+              <a:rPr kumimoji="0" lang="en-US" sz="4000" b="0" i="0" u="none" strike="noStrike" cap="none" normalizeH="0" baseline="0" dirty="0">
                 <a:ln>
                   <a:noFill/>
                 </a:ln>
@@ -6563,7 +6521,7 @@
               </a:rPr>
             </a:br>
             <a:r>
-              <a:rPr kumimoji="0" lang="en-US" sz="4000" b="0" i="0" u="none" strike="noStrike" cap="none" normalizeH="0" baseline="0" dirty="0" smtClean="0">
+              <a:rPr kumimoji="0" lang="en-US" sz="4000" b="0" i="0" u="none" strike="noStrike" cap="none" normalizeH="0" baseline="0" dirty="0">
                 <a:ln>
                   <a:noFill/>
                 </a:ln>
@@ -6576,7 +6534,7 @@
               <a:t>    </a:t>
             </a:r>
             <a:r>
-              <a:rPr kumimoji="0" lang="en-US" sz="4000" b="0" i="0" u="none" strike="noStrike" cap="none" normalizeH="0" baseline="0" dirty="0" err="1" smtClean="0">
+              <a:rPr kumimoji="0" lang="en-US" sz="4000" b="0" i="0" u="none" strike="noStrike" cap="none" normalizeH="0" baseline="0" dirty="0" err="1">
                 <a:ln>
                   <a:noFill/>
                 </a:ln>
@@ -6589,7 +6547,7 @@
               <a:t>requestData</a:t>
             </a:r>
             <a:r>
-              <a:rPr kumimoji="0" lang="en-US" sz="4000" b="0" i="0" u="none" strike="noStrike" cap="none" normalizeH="0" baseline="0" dirty="0" smtClean="0">
+              <a:rPr kumimoji="0" lang="en-US" sz="4000" b="0" i="0" u="none" strike="noStrike" cap="none" normalizeH="0" baseline="0" dirty="0">
                 <a:ln>
                   <a:noFill/>
                 </a:ln>
@@ -6602,7 +6560,7 @@
               <a:t>(</a:t>
             </a:r>
             <a:r>
-              <a:rPr kumimoji="0" lang="en-US" sz="4000" b="0" i="0" u="none" strike="noStrike" cap="none" normalizeH="0" baseline="0" dirty="0" smtClean="0">
+              <a:rPr kumimoji="0" lang="en-US" sz="4000" b="0" i="0" u="none" strike="noStrike" cap="none" normalizeH="0" baseline="0" dirty="0">
                 <a:ln>
                   <a:noFill/>
                 </a:ln>
@@ -6615,7 +6573,7 @@
               <a:t>"1"</a:t>
             </a:r>
             <a:r>
-              <a:rPr kumimoji="0" lang="en-US" sz="4000" b="0" i="0" u="none" strike="noStrike" cap="none" normalizeH="0" baseline="0" dirty="0" smtClean="0">
+              <a:rPr kumimoji="0" lang="en-US" sz="4000" b="0" i="0" u="none" strike="noStrike" cap="none" normalizeH="0" baseline="0" dirty="0">
                 <a:ln>
                   <a:noFill/>
                 </a:ln>
@@ -6628,7 +6586,7 @@
               <a:t>)</a:t>
             </a:r>
             <a:br>
-              <a:rPr kumimoji="0" lang="en-US" sz="4000" b="0" i="0" u="none" strike="noStrike" cap="none" normalizeH="0" baseline="0" dirty="0" smtClean="0">
+              <a:rPr kumimoji="0" lang="en-US" sz="4000" b="0" i="0" u="none" strike="noStrike" cap="none" normalizeH="0" baseline="0" dirty="0">
                 <a:ln>
                   <a:noFill/>
                 </a:ln>
@@ -6640,7 +6598,7 @@
               </a:rPr>
             </a:br>
             <a:r>
-              <a:rPr kumimoji="0" lang="en-US" sz="4000" b="0" i="0" u="none" strike="noStrike" cap="none" normalizeH="0" baseline="0" dirty="0" smtClean="0">
+              <a:rPr kumimoji="0" lang="en-US" sz="4000" b="0" i="0" u="none" strike="noStrike" cap="none" normalizeH="0" baseline="0" dirty="0">
                 <a:ln>
                   <a:noFill/>
                 </a:ln>
@@ -6653,7 +6611,7 @@
               <a:t>    </a:t>
             </a:r>
             <a:r>
-              <a:rPr kumimoji="0" lang="en-US" sz="4000" b="0" i="0" u="none" strike="noStrike" cap="none" normalizeH="0" baseline="0" dirty="0" err="1" smtClean="0">
+              <a:rPr kumimoji="0" lang="en-US" sz="4000" b="0" i="0" u="none" strike="noStrike" cap="none" normalizeH="0" baseline="0" dirty="0" err="1">
                 <a:ln>
                   <a:noFill/>
                 </a:ln>
@@ -6666,7 +6624,7 @@
               <a:t>time.sleep</a:t>
             </a:r>
             <a:r>
-              <a:rPr kumimoji="0" lang="en-US" sz="4000" b="0" i="0" u="none" strike="noStrike" cap="none" normalizeH="0" baseline="0" dirty="0" smtClean="0">
+              <a:rPr kumimoji="0" lang="en-US" sz="4000" b="0" i="0" u="none" strike="noStrike" cap="none" normalizeH="0" baseline="0" dirty="0">
                 <a:ln>
                   <a:noFill/>
                 </a:ln>
@@ -6679,7 +6637,7 @@
               <a:t>(</a:t>
             </a:r>
             <a:r>
-              <a:rPr kumimoji="0" lang="en-US" sz="4000" b="0" i="0" u="none" strike="noStrike" cap="none" normalizeH="0" baseline="0" dirty="0" smtClean="0">
+              <a:rPr kumimoji="0" lang="en-US" sz="4000" b="0" i="0" u="none" strike="noStrike" cap="none" normalizeH="0" baseline="0" dirty="0">
                 <a:ln>
                   <a:noFill/>
                 </a:ln>
@@ -6692,7 +6650,7 @@
               <a:t>2</a:t>
             </a:r>
             <a:r>
-              <a:rPr kumimoji="0" lang="en-US" sz="4000" b="0" i="0" u="none" strike="noStrike" cap="none" normalizeH="0" baseline="0" dirty="0" smtClean="0">
+              <a:rPr kumimoji="0" lang="en-US" sz="4000" b="0" i="0" u="none" strike="noStrike" cap="none" normalizeH="0" baseline="0" dirty="0">
                 <a:ln>
                   <a:noFill/>
                 </a:ln>
@@ -6704,7 +6662,7 @@
               </a:rPr>
               <a:t>)</a:t>
             </a:r>
-            <a:endParaRPr kumimoji="0" lang="en-US" sz="3600" b="0" i="0" u="none" strike="noStrike" cap="none" normalizeH="0" baseline="0" dirty="0" smtClean="0">
+            <a:endParaRPr kumimoji="0" lang="en-US" sz="3600" b="0" i="0" u="none" strike="noStrike" cap="none" normalizeH="0" baseline="0" dirty="0">
               <a:ln>
                 <a:noFill/>
               </a:ln>
@@ -6727,13 +6685,13 @@
   <p:clrMapOvr>
     <a:masterClrMapping/>
   </p:clrMapOvr>
-  <mc:AlternateContent xmlns:mc="http://schemas.openxmlformats.org/markup-compatibility/2006">
-    <mc:Choice xmlns:p14="http://schemas.microsoft.com/office/powerpoint/2010/main" Requires="p14">
+  <mc:AlternateContent xmlns:mc="http://schemas.openxmlformats.org/markup-compatibility/2006" xmlns:p14="http://schemas.microsoft.com/office/powerpoint/2010/main">
+    <mc:Choice Requires="p14">
       <p:transition spd="med" p14:dur="700">
         <p:fade/>
       </p:transition>
     </mc:Choice>
-    <mc:Fallback>
+    <mc:Fallback xmlns="">
       <p:transition spd="med">
         <p:fade/>
       </p:transition>
@@ -6775,31 +6733,31 @@
           <a:lstStyle/>
           <a:p>
             <a:r>
-              <a:rPr lang="en-US" dirty="0" smtClean="0"/>
+              <a:rPr lang="en-US" dirty="0"/>
               <a:t>Implement the callback </a:t>
             </a:r>
             <a:r>
-              <a:rPr lang="en-US" b="1" dirty="0" smtClean="0"/>
+              <a:rPr lang="en-US" b="1" dirty="0"/>
               <a:t>message() </a:t>
             </a:r>
             <a:r>
-              <a:rPr lang="en-US" dirty="0" smtClean="0"/>
+              <a:rPr lang="en-US" dirty="0"/>
               <a:t>in </a:t>
             </a:r>
             <a:r>
-              <a:rPr lang="en-US" dirty="0" err="1" smtClean="0"/>
+              <a:rPr lang="en-US" dirty="0" err="1"/>
               <a:t>mqtt</a:t>
             </a:r>
             <a:r>
-              <a:rPr lang="en-US" dirty="0" smtClean="0"/>
+              <a:rPr lang="en-US" dirty="0"/>
               <a:t>, in order to control a device when </a:t>
             </a:r>
             <a:r>
-              <a:rPr lang="en-US" dirty="0" err="1" smtClean="0"/>
+              <a:rPr lang="en-US" dirty="0" err="1"/>
               <a:t>mqtt</a:t>
             </a:r>
             <a:r>
-              <a:rPr lang="en-US" dirty="0" smtClean="0"/>
+              <a:rPr lang="en-US" dirty="0"/>
               <a:t> data is received (button on the dashboard is clicked)</a:t>
             </a:r>
           </a:p>
@@ -6824,10 +6782,9 @@
           <a:lstStyle/>
           <a:p>
             <a:r>
-              <a:rPr lang="en-US" dirty="0" smtClean="0"/>
+              <a:rPr lang="en-US" dirty="0"/>
               <a:t>Exercise 1</a:t>
             </a:r>
-            <a:endParaRPr lang="en-US" dirty="0"/>
           </a:p>
         </p:txBody>
       </p:sp>
@@ -6841,13 +6798,13 @@
   <p:clrMapOvr>
     <a:masterClrMapping/>
   </p:clrMapOvr>
-  <mc:AlternateContent xmlns:mc="http://schemas.openxmlformats.org/markup-compatibility/2006">
-    <mc:Choice xmlns:p14="http://schemas.microsoft.com/office/powerpoint/2010/main" Requires="p14">
+  <mc:AlternateContent xmlns:mc="http://schemas.openxmlformats.org/markup-compatibility/2006" xmlns:p14="http://schemas.microsoft.com/office/powerpoint/2010/main">
+    <mc:Choice Requires="p14">
       <p:transition spd="med" p14:dur="700">
         <p:fade/>
       </p:transition>
     </mc:Choice>
-    <mc:Fallback>
+    <mc:Fallback xmlns="">
       <p:transition spd="med">
         <p:fade/>
       </p:transition>
@@ -6922,10 +6879,9 @@
           <a:lstStyle/>
           <a:p>
             <a:r>
-              <a:rPr lang="en-US" dirty="0" smtClean="0"/>
+              <a:rPr lang="en-US" dirty="0"/>
               <a:t>Exercise 2</a:t>
             </a:r>
-            <a:endParaRPr lang="en-US" dirty="0"/>
           </a:p>
         </p:txBody>
       </p:sp>
@@ -6939,13 +6895,13 @@
   <p:clrMapOvr>
     <a:masterClrMapping/>
   </p:clrMapOvr>
-  <mc:AlternateContent xmlns:mc="http://schemas.openxmlformats.org/markup-compatibility/2006">
-    <mc:Choice xmlns:p14="http://schemas.microsoft.com/office/powerpoint/2010/main" Requires="p14">
+  <mc:AlternateContent xmlns:mc="http://schemas.openxmlformats.org/markup-compatibility/2006" xmlns:p14="http://schemas.microsoft.com/office/powerpoint/2010/main">
+    <mc:Choice Requires="p14">
       <p:transition spd="med" p14:dur="700">
         <p:fade/>
       </p:transition>
     </mc:Choice>
-    <mc:Fallback>
+    <mc:Fallback xmlns="">
       <p:transition spd="med">
         <p:fade/>
       </p:transition>
@@ -6987,11 +6943,11 @@
           <a:lstStyle/>
           <a:p>
             <a:r>
-              <a:rPr lang="en-US" dirty="0" smtClean="0"/>
+              <a:rPr lang="en-US" dirty="0"/>
               <a:t>Update your repository in </a:t>
             </a:r>
             <a:r>
-              <a:rPr lang="en-US" dirty="0" err="1" smtClean="0"/>
+              <a:rPr lang="en-US" dirty="0" err="1"/>
               <a:t>Github</a:t>
             </a:r>
             <a:endParaRPr lang="en-US" dirty="0"/>
@@ -7014,10 +6970,9 @@
           <a:lstStyle/>
           <a:p>
             <a:r>
-              <a:rPr lang="en-US" dirty="0" smtClean="0"/>
+              <a:rPr lang="en-US" dirty="0"/>
               <a:t>Finalize the LAB	</a:t>
             </a:r>
-            <a:endParaRPr lang="en-US" dirty="0"/>
           </a:p>
         </p:txBody>
       </p:sp>
@@ -7031,13 +6986,13 @@
   <p:clrMapOvr>
     <a:masterClrMapping/>
   </p:clrMapOvr>
-  <mc:AlternateContent xmlns:mc="http://schemas.openxmlformats.org/markup-compatibility/2006">
-    <mc:Choice xmlns:p14="http://schemas.microsoft.com/office/powerpoint/2010/main" Requires="p14">
+  <mc:AlternateContent xmlns:mc="http://schemas.openxmlformats.org/markup-compatibility/2006" xmlns:p14="http://schemas.microsoft.com/office/powerpoint/2010/main">
+    <mc:Choice Requires="p14">
       <p:transition spd="med" p14:dur="700">
         <p:fade/>
       </p:transition>
     </mc:Choice>
-    <mc:Fallback>
+    <mc:Fallback xmlns="">
       <p:transition spd="med">
         <p:fade/>
       </p:transition>
@@ -7081,27 +7036,22 @@
             <a:pPr algn="just"/>
             <a:r>
               <a:rPr lang="en-US" dirty="0"/>
-              <a:t>Serial communication is a communication method that uses one or two transmission lines to send and receive data, and that data is continuously sent and received one bit at a </a:t>
-            </a:r>
-            <a:r>
-              <a:rPr lang="en-US" dirty="0" smtClean="0"/>
-              <a:t>time.</a:t>
-            </a:r>
-          </a:p>
-          <a:p>
-            <a:r>
-              <a:rPr lang="en-US" dirty="0" smtClean="0"/>
+              <a:t>Serial communication is a communication method that uses one or two transmission lines to send and receive data, and that data is continuously sent and received one bit at a time.</a:t>
+            </a:r>
+          </a:p>
+          <a:p>
+            <a:r>
+              <a:rPr lang="en-US" dirty="0"/>
               <a:t>All programmable devices have at least one serial: PC, Smartphone, Tablets, </a:t>
             </a:r>
             <a:r>
-              <a:rPr lang="en-US" dirty="0" err="1" smtClean="0"/>
+              <a:rPr lang="en-US" dirty="0" err="1"/>
               <a:t>Arduino</a:t>
             </a:r>
             <a:r>
-              <a:rPr lang="en-US" dirty="0" smtClean="0"/>
+              <a:rPr lang="en-US" dirty="0"/>
               <a:t> Boards</a:t>
             </a:r>
-            <a:endParaRPr lang="en-US" dirty="0"/>
           </a:p>
         </p:txBody>
       </p:sp>
@@ -7123,10 +7073,9 @@
           <a:lstStyle/>
           <a:p>
             <a:r>
-              <a:rPr lang="en-US" dirty="0" smtClean="0"/>
+              <a:rPr lang="en-US" dirty="0"/>
               <a:t>What is Serial Communication?</a:t>
             </a:r>
-            <a:endParaRPr lang="en-US" dirty="0"/>
           </a:p>
         </p:txBody>
       </p:sp>
@@ -7234,13 +7183,6 @@
       </p:transition>
     </mc:Fallback>
   </mc:AlternateContent>
-  <p:timing>
-    <p:tnLst>
-      <p:par>
-        <p:cTn id="1" dur="indefinite" restart="never" nodeType="tmRoot"/>
-      </p:par>
-    </p:tnLst>
-  </p:timing>
 </p:sld>
 </file>
 
@@ -7285,20 +7227,12 @@
           <a:p>
             <a:pPr algn="ctr"/>
             <a:r>
-              <a:rPr lang="en-US" dirty="0" smtClean="0">
+              <a:rPr lang="en-US" dirty="0">
                 <a:solidFill>
                   <a:srgbClr val="FFFF00"/>
                 </a:solidFill>
               </a:rPr>
-              <a:t>Part 1: </a:t>
-            </a:r>
-            <a:r>
-              <a:rPr lang="en-US" dirty="0" smtClean="0">
-                <a:solidFill>
-                  <a:srgbClr val="FFFF00"/>
-                </a:solidFill>
-              </a:rPr>
-              <a:t>Send Commands To Hardware</a:t>
+              <a:t>Part 1: Send Commands To Hardware</a:t>
             </a:r>
             <a:endParaRPr lang="en-US" dirty="0"/>
           </a:p>
@@ -7326,13 +7260,6 @@
       </p:transition>
     </mc:Fallback>
   </mc:AlternateContent>
-  <p:timing>
-    <p:tnLst>
-      <p:par>
-        <p:cTn id="1" dur="indefinite" restart="never" nodeType="tmRoot"/>
-      </p:par>
-    </p:tnLst>
-  </p:timing>
 </p:sld>
 </file>
 
@@ -7370,17 +7297,13 @@
           <a:p>
             <a:r>
               <a:rPr lang="en-US" b="1" dirty="0"/>
-              <a:t>p</a:t>
-            </a:r>
-            <a:r>
-              <a:rPr lang="en-US" b="1" dirty="0" smtClean="0"/>
-              <a:t>ip install </a:t>
-            </a:r>
-            <a:r>
-              <a:rPr lang="en-US" b="1" dirty="0" err="1" smtClean="0"/>
+              <a:t>pip install </a:t>
+            </a:r>
+            <a:r>
+              <a:rPr lang="en-US" b="1" dirty="0" err="1"/>
               <a:t>pyserial</a:t>
             </a:r>
-            <a:endParaRPr lang="en-US" b="1" dirty="0" smtClean="0"/>
+            <a:endParaRPr lang="en-US" b="1" dirty="0"/>
           </a:p>
           <a:p>
             <a:endParaRPr lang="en-US" dirty="0"/>
@@ -7389,7 +7312,7 @@
             <a:pPr marL="109725" indent="0">
               <a:buNone/>
             </a:pPr>
-            <a:endParaRPr lang="en-US" dirty="0" smtClean="0"/>
+            <a:endParaRPr lang="en-US" dirty="0"/>
           </a:p>
         </p:txBody>
       </p:sp>
@@ -7409,15 +7332,11 @@
           <a:lstStyle/>
           <a:p>
             <a:r>
-              <a:rPr lang="en-US" dirty="0" smtClean="0"/>
-              <a:t>Step 1</a:t>
-            </a:r>
-            <a:r>
-              <a:rPr lang="en-US" dirty="0" smtClean="0"/>
-              <a:t>: Install </a:t>
-            </a:r>
-            <a:r>
-              <a:rPr lang="en-US" dirty="0" err="1" smtClean="0"/>
+              <a:rPr lang="en-US" dirty="0"/>
+              <a:t>Step 1: Install </a:t>
+            </a:r>
+            <a:r>
+              <a:rPr lang="en-US" dirty="0" err="1"/>
               <a:t>pyserial</a:t>
             </a:r>
             <a:endParaRPr lang="en-US" dirty="0"/>
@@ -7495,7 +7414,7 @@
               <a:tabLst/>
             </a:pPr>
             <a:r>
-              <a:rPr kumimoji="0" lang="en-US" sz="3600" b="0" i="0" u="none" strike="noStrike" cap="none" normalizeH="0" baseline="0" dirty="0" smtClean="0">
+              <a:rPr kumimoji="0" lang="en-US" sz="3600" b="0" i="0" u="none" strike="noStrike" cap="none" normalizeH="0" baseline="0" dirty="0">
                 <a:ln>
                   <a:noFill/>
                 </a:ln>
@@ -7508,7 +7427,7 @@
               <a:t>print</a:t>
             </a:r>
             <a:r>
-              <a:rPr kumimoji="0" lang="en-US" sz="3600" b="0" i="0" u="none" strike="noStrike" cap="none" normalizeH="0" baseline="0" dirty="0" smtClean="0">
+              <a:rPr kumimoji="0" lang="en-US" sz="3600" b="0" i="0" u="none" strike="noStrike" cap="none" normalizeH="0" baseline="0" dirty="0">
                 <a:ln>
                   <a:noFill/>
                 </a:ln>
@@ -7521,7 +7440,7 @@
               <a:t>(</a:t>
             </a:r>
             <a:r>
-              <a:rPr kumimoji="0" lang="en-US" sz="3600" b="0" i="0" u="none" strike="noStrike" cap="none" normalizeH="0" baseline="0" dirty="0" smtClean="0">
+              <a:rPr kumimoji="0" lang="en-US" sz="3600" b="0" i="0" u="none" strike="noStrike" cap="none" normalizeH="0" baseline="0" dirty="0">
                 <a:ln>
                   <a:noFill/>
                 </a:ln>
@@ -7534,7 +7453,7 @@
               <a:t>"Sensors and Actuators"</a:t>
             </a:r>
             <a:r>
-              <a:rPr kumimoji="0" lang="en-US" sz="3600" b="0" i="0" u="none" strike="noStrike" cap="none" normalizeH="0" baseline="0" dirty="0" smtClean="0">
+              <a:rPr kumimoji="0" lang="en-US" sz="3600" b="0" i="0" u="none" strike="noStrike" cap="none" normalizeH="0" baseline="0" dirty="0">
                 <a:ln>
                   <a:noFill/>
                 </a:ln>
@@ -7547,7 +7466,7 @@
               <a:t>)</a:t>
             </a:r>
             <a:br>
-              <a:rPr kumimoji="0" lang="en-US" sz="3600" b="0" i="0" u="none" strike="noStrike" cap="none" normalizeH="0" baseline="0" dirty="0" smtClean="0">
+              <a:rPr kumimoji="0" lang="en-US" sz="3600" b="0" i="0" u="none" strike="noStrike" cap="none" normalizeH="0" baseline="0" dirty="0">
                 <a:ln>
                   <a:noFill/>
                 </a:ln>
@@ -7558,21 +7477,8 @@
                 <a:latin typeface="JetBrains Mono"/>
               </a:rPr>
             </a:br>
-            <a:r>
-              <a:rPr kumimoji="0" lang="en-US" sz="3600" b="0" i="0" u="none" strike="noStrike" cap="none" normalizeH="0" baseline="0" dirty="0" smtClean="0">
-                <a:ln>
-                  <a:noFill/>
-                </a:ln>
-                <a:solidFill>
-                  <a:srgbClr val="080808"/>
-                </a:solidFill>
-                <a:effectLst/>
-                <a:latin typeface="JetBrains Mono"/>
-              </a:rPr>
-              <a:t/>
-            </a:r>
             <a:br>
-              <a:rPr kumimoji="0" lang="en-US" sz="3600" b="0" i="0" u="none" strike="noStrike" cap="none" normalizeH="0" baseline="0" dirty="0" smtClean="0">
+              <a:rPr kumimoji="0" lang="en-US" sz="3600" b="0" i="0" u="none" strike="noStrike" cap="none" normalizeH="0" baseline="0" dirty="0">
                 <a:ln>
                   <a:noFill/>
                 </a:ln>
@@ -7584,7 +7490,7 @@
               </a:rPr>
             </a:br>
             <a:r>
-              <a:rPr kumimoji="0" lang="en-US" sz="3600" b="0" i="0" u="none" strike="noStrike" cap="none" normalizeH="0" baseline="0" dirty="0" smtClean="0">
+              <a:rPr kumimoji="0" lang="en-US" sz="3600" b="0" i="0" u="none" strike="noStrike" cap="none" normalizeH="0" baseline="0" dirty="0">
                 <a:ln>
                   <a:noFill/>
                 </a:ln>
@@ -7597,7 +7503,7 @@
               <a:t>import </a:t>
             </a:r>
             <a:r>
-              <a:rPr kumimoji="0" lang="en-US" sz="3600" b="0" i="0" u="none" strike="noStrike" cap="none" normalizeH="0" baseline="0" dirty="0" smtClean="0">
+              <a:rPr kumimoji="0" lang="en-US" sz="3600" b="0" i="0" u="none" strike="noStrike" cap="none" normalizeH="0" baseline="0" dirty="0">
                 <a:ln>
                   <a:noFill/>
                 </a:ln>
@@ -7610,7 +7516,7 @@
               <a:t>time</a:t>
             </a:r>
             <a:br>
-              <a:rPr kumimoji="0" lang="en-US" sz="3600" b="0" i="0" u="none" strike="noStrike" cap="none" normalizeH="0" baseline="0" dirty="0" smtClean="0">
+              <a:rPr kumimoji="0" lang="en-US" sz="3600" b="0" i="0" u="none" strike="noStrike" cap="none" normalizeH="0" baseline="0" dirty="0">
                 <a:ln>
                   <a:noFill/>
                 </a:ln>
@@ -7622,7 +7528,7 @@
               </a:rPr>
             </a:br>
             <a:r>
-              <a:rPr kumimoji="0" lang="en-US" sz="3600" b="0" i="0" u="none" strike="noStrike" cap="none" normalizeH="0" baseline="0" dirty="0" smtClean="0">
+              <a:rPr kumimoji="0" lang="en-US" sz="3600" b="0" i="0" u="none" strike="noStrike" cap="none" normalizeH="0" baseline="0" dirty="0">
                 <a:ln>
                   <a:noFill/>
                 </a:ln>
@@ -7635,7 +7541,7 @@
               <a:t>import </a:t>
             </a:r>
             <a:r>
-              <a:rPr kumimoji="0" lang="en-US" sz="3600" b="0" i="0" u="none" strike="noStrike" cap="none" normalizeH="0" baseline="0" dirty="0" err="1" smtClean="0">
+              <a:rPr kumimoji="0" lang="en-US" sz="3600" b="0" i="0" u="none" strike="noStrike" cap="none" normalizeH="0" baseline="0" dirty="0" err="1">
                 <a:ln>
                   <a:noFill/>
                 </a:ln>
@@ -7647,21 +7553,8 @@
               </a:rPr>
               <a:t>serial.tools.list_ports</a:t>
             </a:r>
-            <a:r>
-              <a:rPr kumimoji="0" lang="en-US" sz="3600" b="0" i="0" u="none" strike="noStrike" cap="none" normalizeH="0" baseline="0" dirty="0" smtClean="0">
-                <a:ln>
-                  <a:noFill/>
-                </a:ln>
-                <a:solidFill>
-                  <a:srgbClr val="080808"/>
-                </a:solidFill>
-                <a:effectLst/>
-                <a:latin typeface="JetBrains Mono"/>
-              </a:rPr>
-              <a:t/>
-            </a:r>
             <a:br>
-              <a:rPr kumimoji="0" lang="en-US" sz="3600" b="0" i="0" u="none" strike="noStrike" cap="none" normalizeH="0" baseline="0" dirty="0" smtClean="0">
+              <a:rPr kumimoji="0" lang="en-US" sz="3600" b="0" i="0" u="none" strike="noStrike" cap="none" normalizeH="0" baseline="0" dirty="0">
                 <a:ln>
                   <a:noFill/>
                 </a:ln>
@@ -7672,7 +7565,7 @@
                 <a:latin typeface="JetBrains Mono"/>
               </a:rPr>
             </a:br>
-            <a:endParaRPr kumimoji="0" lang="en-US" sz="3200" b="0" i="0" u="none" strike="noStrike" cap="none" normalizeH="0" baseline="0" dirty="0" smtClean="0">
+            <a:endParaRPr kumimoji="0" lang="en-US" sz="3200" b="0" i="0" u="none" strike="noStrike" cap="none" normalizeH="0" baseline="0" dirty="0">
               <a:ln>
                 <a:noFill/>
               </a:ln>
@@ -7707,13 +7600,6 @@
       </p:transition>
     </mc:Fallback>
   </mc:AlternateContent>
-  <p:timing>
-    <p:tnLst>
-      <p:par>
-        <p:cTn id="1" dur="indefinite" restart="never" nodeType="tmRoot"/>
-      </p:par>
-    </p:tnLst>
-  </p:timing>
 </p:sld>
 </file>
 
@@ -7755,7 +7641,7 @@
           <a:lstStyle/>
           <a:p>
             <a:r>
-              <a:rPr lang="en-US" dirty="0" smtClean="0"/>
+              <a:rPr lang="en-US" dirty="0"/>
               <a:t>In windows: check the port name in Device Manager/Ports</a:t>
             </a:r>
           </a:p>
@@ -7764,34 +7650,33 @@
           </a:p>
           <a:p>
             <a:r>
-              <a:rPr lang="en-US" dirty="0" smtClean="0"/>
+              <a:rPr lang="en-US" dirty="0"/>
               <a:t>In MAC/Linux: </a:t>
             </a:r>
             <a:r>
-              <a:rPr lang="en-US" dirty="0" err="1" smtClean="0"/>
+              <a:rPr lang="en-US" dirty="0" err="1"/>
               <a:t>ls</a:t>
             </a:r>
             <a:r>
-              <a:rPr lang="en-US" dirty="0" smtClean="0"/>
+              <a:rPr lang="en-US" dirty="0"/>
               <a:t> /</a:t>
             </a:r>
             <a:r>
-              <a:rPr lang="en-US" dirty="0" err="1" smtClean="0"/>
+              <a:rPr lang="en-US" dirty="0" err="1"/>
               <a:t>dev</a:t>
             </a:r>
             <a:r>
-              <a:rPr lang="en-US" dirty="0" smtClean="0"/>
+              <a:rPr lang="en-US" dirty="0"/>
               <a:t>/</a:t>
             </a:r>
             <a:r>
-              <a:rPr lang="en-US" dirty="0" err="1" smtClean="0"/>
+              <a:rPr lang="en-US" dirty="0" err="1"/>
               <a:t>tty</a:t>
             </a:r>
             <a:r>
-              <a:rPr lang="en-US" dirty="0" smtClean="0"/>
+              <a:rPr lang="en-US" dirty="0"/>
               <a:t>*</a:t>
             </a:r>
-            <a:endParaRPr lang="en-US" dirty="0"/>
           </a:p>
         </p:txBody>
       </p:sp>
@@ -7811,10 +7696,9 @@
           <a:lstStyle/>
           <a:p>
             <a:r>
-              <a:rPr lang="en-US" dirty="0" smtClean="0"/>
+              <a:rPr lang="en-US" dirty="0"/>
               <a:t>Step 2: Open the port</a:t>
             </a:r>
-            <a:endParaRPr lang="en-US" dirty="0"/>
           </a:p>
         </p:txBody>
       </p:sp>
@@ -7889,7 +7773,7 @@
               <a:tabLst/>
             </a:pPr>
             <a:r>
-              <a:rPr kumimoji="0" lang="en-US" sz="2200" b="0" i="0" u="none" strike="noStrike" cap="none" normalizeH="0" baseline="0" dirty="0" smtClean="0">
+              <a:rPr kumimoji="0" lang="en-US" sz="2200" b="0" i="0" u="none" strike="noStrike" cap="none" normalizeH="0" baseline="0" dirty="0">
                 <a:ln>
                   <a:noFill/>
                 </a:ln>
@@ -7902,7 +7786,7 @@
               <a:t>try</a:t>
             </a:r>
             <a:r>
-              <a:rPr kumimoji="0" lang="en-US" sz="2200" b="0" i="0" u="none" strike="noStrike" cap="none" normalizeH="0" baseline="0" dirty="0" smtClean="0">
+              <a:rPr kumimoji="0" lang="en-US" sz="2200" b="0" i="0" u="none" strike="noStrike" cap="none" normalizeH="0" baseline="0" dirty="0">
                 <a:ln>
                   <a:noFill/>
                 </a:ln>
@@ -7915,7 +7799,7 @@
               <a:t>:</a:t>
             </a:r>
             <a:br>
-              <a:rPr kumimoji="0" lang="en-US" sz="2200" b="0" i="0" u="none" strike="noStrike" cap="none" normalizeH="0" baseline="0" dirty="0" smtClean="0">
+              <a:rPr kumimoji="0" lang="en-US" sz="2200" b="0" i="0" u="none" strike="noStrike" cap="none" normalizeH="0" baseline="0" dirty="0">
                 <a:ln>
                   <a:noFill/>
                 </a:ln>
@@ -7927,7 +7811,7 @@
               </a:rPr>
             </a:br>
             <a:r>
-              <a:rPr kumimoji="0" lang="en-US" sz="2200" b="0" i="0" u="none" strike="noStrike" cap="none" normalizeH="0" baseline="0" dirty="0" smtClean="0">
+              <a:rPr kumimoji="0" lang="en-US" sz="2200" b="0" i="0" u="none" strike="noStrike" cap="none" normalizeH="0" baseline="0" dirty="0">
                 <a:ln>
                   <a:noFill/>
                 </a:ln>
@@ -7940,7 +7824,7 @@
               <a:t>    </a:t>
             </a:r>
             <a:r>
-              <a:rPr kumimoji="0" lang="en-US" sz="2200" b="0" i="0" u="none" strike="noStrike" cap="none" normalizeH="0" baseline="0" dirty="0" err="1" smtClean="0">
+              <a:rPr kumimoji="0" lang="en-US" sz="2200" b="0" i="0" u="none" strike="noStrike" cap="none" normalizeH="0" baseline="0" dirty="0" err="1">
                 <a:ln>
                   <a:noFill/>
                 </a:ln>
@@ -7953,7 +7837,7 @@
               <a:t>ser</a:t>
             </a:r>
             <a:r>
-              <a:rPr kumimoji="0" lang="en-US" sz="2200" b="0" i="0" u="none" strike="noStrike" cap="none" normalizeH="0" baseline="0" dirty="0" smtClean="0">
+              <a:rPr kumimoji="0" lang="en-US" sz="2200" b="0" i="0" u="none" strike="noStrike" cap="none" normalizeH="0" baseline="0" dirty="0">
                 <a:ln>
                   <a:noFill/>
                 </a:ln>
@@ -7966,7 +7850,7 @@
               <a:t> = </a:t>
             </a:r>
             <a:r>
-              <a:rPr kumimoji="0" lang="en-US" sz="2200" b="0" i="0" u="none" strike="noStrike" cap="none" normalizeH="0" baseline="0" dirty="0" err="1" smtClean="0">
+              <a:rPr kumimoji="0" lang="en-US" sz="2200" b="0" i="0" u="none" strike="noStrike" cap="none" normalizeH="0" baseline="0" dirty="0" err="1">
                 <a:ln>
                   <a:noFill/>
                 </a:ln>
@@ -7979,7 +7863,7 @@
               <a:t>serial.Serial</a:t>
             </a:r>
             <a:r>
-              <a:rPr kumimoji="0" lang="en-US" sz="2200" b="0" i="0" u="none" strike="noStrike" cap="none" normalizeH="0" baseline="0" dirty="0" smtClean="0">
+              <a:rPr kumimoji="0" lang="en-US" sz="2200" b="0" i="0" u="none" strike="noStrike" cap="none" normalizeH="0" baseline="0" dirty="0">
                 <a:ln>
                   <a:noFill/>
                 </a:ln>
@@ -7992,7 +7876,7 @@
               <a:t>(</a:t>
             </a:r>
             <a:r>
-              <a:rPr kumimoji="0" lang="en-US" sz="2200" b="0" i="0" u="none" strike="noStrike" cap="none" normalizeH="0" baseline="0" dirty="0" smtClean="0">
+              <a:rPr kumimoji="0" lang="en-US" sz="2200" b="0" i="0" u="none" strike="noStrike" cap="none" normalizeH="0" baseline="0" dirty="0">
                 <a:ln>
                   <a:noFill/>
                 </a:ln>
@@ -8005,7 +7889,7 @@
               <a:t>port</a:t>
             </a:r>
             <a:r>
-              <a:rPr kumimoji="0" lang="en-US" sz="2200" b="0" i="0" u="none" strike="noStrike" cap="none" normalizeH="0" baseline="0" dirty="0" smtClean="0">
+              <a:rPr kumimoji="0" lang="en-US" sz="2200" b="0" i="0" u="none" strike="noStrike" cap="none" normalizeH="0" baseline="0" dirty="0">
                 <a:ln>
                   <a:noFill/>
                 </a:ln>
@@ -8018,7 +7902,7 @@
               <a:t>=“</a:t>
             </a:r>
             <a:r>
-              <a:rPr kumimoji="0" lang="en-US" sz="2200" b="0" i="0" u="none" strike="noStrike" cap="none" normalizeH="0" baseline="0" dirty="0" err="1" smtClean="0">
+              <a:rPr kumimoji="0" lang="en-US" sz="2200" b="0" i="0" u="none" strike="noStrike" cap="none" normalizeH="0" baseline="0" dirty="0" err="1">
                 <a:ln>
                   <a:noFill/>
                 </a:ln>
@@ -8031,7 +7915,7 @@
               <a:t>COMx</a:t>
             </a:r>
             <a:r>
-              <a:rPr kumimoji="0" lang="en-US" sz="2200" b="0" i="0" u="none" strike="noStrike" cap="none" normalizeH="0" baseline="0" dirty="0" smtClean="0">
+              <a:rPr kumimoji="0" lang="en-US" sz="2200" b="0" i="0" u="none" strike="noStrike" cap="none" normalizeH="0" baseline="0" dirty="0">
                 <a:ln>
                   <a:noFill/>
                 </a:ln>
@@ -8044,7 +7928,7 @@
               <a:t>”, </a:t>
             </a:r>
             <a:r>
-              <a:rPr kumimoji="0" lang="en-US" sz="2200" b="0" i="0" u="none" strike="noStrike" cap="none" normalizeH="0" baseline="0" dirty="0" err="1" smtClean="0">
+              <a:rPr kumimoji="0" lang="en-US" sz="2200" b="0" i="0" u="none" strike="noStrike" cap="none" normalizeH="0" baseline="0" dirty="0" err="1">
                 <a:ln>
                   <a:noFill/>
                 </a:ln>
@@ -8057,7 +7941,7 @@
               <a:t>baudrate</a:t>
             </a:r>
             <a:r>
-              <a:rPr kumimoji="0" lang="en-US" sz="2200" b="0" i="0" u="none" strike="noStrike" cap="none" normalizeH="0" baseline="0" dirty="0" smtClean="0">
+              <a:rPr kumimoji="0" lang="en-US" sz="2200" b="0" i="0" u="none" strike="noStrike" cap="none" normalizeH="0" baseline="0" dirty="0">
                 <a:ln>
                   <a:noFill/>
                 </a:ln>
@@ -8070,7 +7954,7 @@
               <a:t>=</a:t>
             </a:r>
             <a:r>
-              <a:rPr kumimoji="0" lang="en-US" sz="2200" b="0" i="0" u="none" strike="noStrike" cap="none" normalizeH="0" baseline="0" dirty="0" smtClean="0">
+              <a:rPr kumimoji="0" lang="en-US" sz="2200" b="0" i="0" u="none" strike="noStrike" cap="none" normalizeH="0" baseline="0" dirty="0">
                 <a:ln>
                   <a:noFill/>
                 </a:ln>
@@ -8083,7 +7967,7 @@
               <a:t>115200</a:t>
             </a:r>
             <a:r>
-              <a:rPr kumimoji="0" lang="en-US" sz="2200" b="0" i="0" u="none" strike="noStrike" cap="none" normalizeH="0" baseline="0" dirty="0" smtClean="0">
+              <a:rPr kumimoji="0" lang="en-US" sz="2200" b="0" i="0" u="none" strike="noStrike" cap="none" normalizeH="0" baseline="0" dirty="0">
                 <a:ln>
                   <a:noFill/>
                 </a:ln>
@@ -8096,7 +7980,7 @@
               <a:t>)</a:t>
             </a:r>
             <a:br>
-              <a:rPr kumimoji="0" lang="en-US" sz="2200" b="0" i="0" u="none" strike="noStrike" cap="none" normalizeH="0" baseline="0" dirty="0" smtClean="0">
+              <a:rPr kumimoji="0" lang="en-US" sz="2200" b="0" i="0" u="none" strike="noStrike" cap="none" normalizeH="0" baseline="0" dirty="0">
                 <a:ln>
                   <a:noFill/>
                 </a:ln>
@@ -8108,7 +7992,7 @@
               </a:rPr>
             </a:br>
             <a:r>
-              <a:rPr kumimoji="0" lang="en-US" sz="2200" b="0" i="0" u="none" strike="noStrike" cap="none" normalizeH="0" baseline="0" dirty="0" smtClean="0">
+              <a:rPr kumimoji="0" lang="en-US" sz="2200" b="0" i="0" u="none" strike="noStrike" cap="none" normalizeH="0" baseline="0" dirty="0">
                 <a:ln>
                   <a:noFill/>
                 </a:ln>
@@ -8121,7 +8005,7 @@
               <a:t>except</a:t>
             </a:r>
             <a:r>
-              <a:rPr kumimoji="0" lang="en-US" sz="2200" b="0" i="0" u="none" strike="noStrike" cap="none" normalizeH="0" baseline="0" dirty="0" smtClean="0">
+              <a:rPr kumimoji="0" lang="en-US" sz="2200" b="0" i="0" u="none" strike="noStrike" cap="none" normalizeH="0" baseline="0" dirty="0">
                 <a:ln>
                   <a:noFill/>
                 </a:ln>
@@ -8134,7 +8018,7 @@
               <a:t>:</a:t>
             </a:r>
             <a:br>
-              <a:rPr kumimoji="0" lang="en-US" sz="2200" b="0" i="0" u="none" strike="noStrike" cap="none" normalizeH="0" baseline="0" dirty="0" smtClean="0">
+              <a:rPr kumimoji="0" lang="en-US" sz="2200" b="0" i="0" u="none" strike="noStrike" cap="none" normalizeH="0" baseline="0" dirty="0">
                 <a:ln>
                   <a:noFill/>
                 </a:ln>
@@ -8146,7 +8030,7 @@
               </a:rPr>
             </a:br>
             <a:r>
-              <a:rPr kumimoji="0" lang="en-US" sz="2200" b="0" i="0" u="none" strike="noStrike" cap="none" normalizeH="0" baseline="0" dirty="0" smtClean="0">
+              <a:rPr kumimoji="0" lang="en-US" sz="2200" b="0" i="0" u="none" strike="noStrike" cap="none" normalizeH="0" baseline="0" dirty="0">
                 <a:ln>
                   <a:noFill/>
                 </a:ln>
@@ -8159,7 +8043,7 @@
               <a:t>    </a:t>
             </a:r>
             <a:r>
-              <a:rPr kumimoji="0" lang="en-US" sz="2200" b="0" i="0" u="none" strike="noStrike" cap="none" normalizeH="0" baseline="0" dirty="0" smtClean="0">
+              <a:rPr kumimoji="0" lang="en-US" sz="2200" b="0" i="0" u="none" strike="noStrike" cap="none" normalizeH="0" baseline="0" dirty="0">
                 <a:ln>
                   <a:noFill/>
                 </a:ln>
@@ -8172,7 +8056,7 @@
               <a:t>print</a:t>
             </a:r>
             <a:r>
-              <a:rPr kumimoji="0" lang="en-US" sz="2200" b="0" i="0" u="none" strike="noStrike" cap="none" normalizeH="0" baseline="0" dirty="0" smtClean="0">
+              <a:rPr kumimoji="0" lang="en-US" sz="2200" b="0" i="0" u="none" strike="noStrike" cap="none" normalizeH="0" baseline="0" dirty="0">
                 <a:ln>
                   <a:noFill/>
                 </a:ln>
@@ -8185,7 +8069,7 @@
               <a:t>(</a:t>
             </a:r>
             <a:r>
-              <a:rPr kumimoji="0" lang="en-US" sz="2200" b="0" i="0" u="none" strike="noStrike" cap="none" normalizeH="0" baseline="0" dirty="0" smtClean="0">
+              <a:rPr kumimoji="0" lang="en-US" sz="2200" b="0" i="0" u="none" strike="noStrike" cap="none" normalizeH="0" baseline="0" dirty="0">
                 <a:ln>
                   <a:noFill/>
                 </a:ln>
@@ -8198,7 +8082,7 @@
               <a:t>"Can not open the port"</a:t>
             </a:r>
             <a:r>
-              <a:rPr kumimoji="0" lang="en-US" sz="2200" b="0" i="0" u="none" strike="noStrike" cap="none" normalizeH="0" baseline="0" dirty="0" smtClean="0">
+              <a:rPr kumimoji="0" lang="en-US" sz="2200" b="0" i="0" u="none" strike="noStrike" cap="none" normalizeH="0" baseline="0" dirty="0">
                 <a:ln>
                   <a:noFill/>
                 </a:ln>
@@ -8210,7 +8094,7 @@
               </a:rPr>
               <a:t>)</a:t>
             </a:r>
-            <a:endParaRPr kumimoji="0" lang="en-US" sz="1800" b="0" i="0" u="none" strike="noStrike" cap="none" normalizeH="0" baseline="0" dirty="0" smtClean="0">
+            <a:endParaRPr kumimoji="0" lang="en-US" sz="1800" b="0" i="0" u="none" strike="noStrike" cap="none" normalizeH="0" baseline="0" dirty="0">
               <a:ln>
                 <a:noFill/>
               </a:ln>
@@ -8245,13 +8129,6 @@
       </p:transition>
     </mc:Fallback>
   </mc:AlternateContent>
-  <p:timing>
-    <p:tnLst>
-      <p:par>
-        <p:cTn id="1" dur="indefinite" restart="never" nodeType="tmRoot"/>
-      </p:par>
-    </p:tnLst>
-  </p:timing>
 </p:sld>
 </file>
 
@@ -8288,10 +8165,9 @@
           <a:lstStyle/>
           <a:p>
             <a:r>
-              <a:rPr lang="en-US" dirty="0" smtClean="0"/>
+              <a:rPr lang="en-US" dirty="0"/>
               <a:t>Step 3: Send A Command</a:t>
             </a:r>
-            <a:endParaRPr lang="en-US" dirty="0"/>
           </a:p>
         </p:txBody>
       </p:sp>
@@ -8366,7 +8242,7 @@
               <a:tabLst/>
             </a:pPr>
             <a:r>
-              <a:rPr kumimoji="0" lang="en-US" sz="4000" b="0" i="0" u="none" strike="noStrike" cap="none" normalizeH="0" baseline="0" dirty="0" err="1" smtClean="0">
+              <a:rPr kumimoji="0" lang="en-US" sz="4000" b="0" i="0" u="none" strike="noStrike" cap="none" normalizeH="0" baseline="0" dirty="0" err="1">
                 <a:ln>
                   <a:noFill/>
                 </a:ln>
@@ -8379,7 +8255,7 @@
               <a:t>def</a:t>
             </a:r>
             <a:r>
-              <a:rPr kumimoji="0" lang="en-US" sz="4000" b="0" i="0" u="none" strike="noStrike" cap="none" normalizeH="0" baseline="0" dirty="0" smtClean="0">
+              <a:rPr kumimoji="0" lang="en-US" sz="4000" b="0" i="0" u="none" strike="noStrike" cap="none" normalizeH="0" baseline="0" dirty="0">
                 <a:ln>
                   <a:noFill/>
                 </a:ln>
@@ -8392,7 +8268,7 @@
               <a:t> </a:t>
             </a:r>
             <a:r>
-              <a:rPr kumimoji="0" lang="en-US" sz="4000" b="0" i="0" u="none" strike="noStrike" cap="none" normalizeH="0" baseline="0" dirty="0" err="1" smtClean="0">
+              <a:rPr kumimoji="0" lang="en-US" sz="4000" b="0" i="0" u="none" strike="noStrike" cap="none" normalizeH="0" baseline="0" dirty="0" err="1">
                 <a:ln>
                   <a:noFill/>
                 </a:ln>
@@ -8405,7 +8281,7 @@
               <a:t>sendCommand</a:t>
             </a:r>
             <a:r>
-              <a:rPr kumimoji="0" lang="en-US" sz="4000" b="0" i="0" u="none" strike="noStrike" cap="none" normalizeH="0" baseline="0" dirty="0" smtClean="0">
+              <a:rPr kumimoji="0" lang="en-US" sz="4000" b="0" i="0" u="none" strike="noStrike" cap="none" normalizeH="0" baseline="0" dirty="0">
                 <a:ln>
                   <a:noFill/>
                 </a:ln>
@@ -8418,7 +8294,7 @@
               <a:t>(</a:t>
             </a:r>
             <a:r>
-              <a:rPr kumimoji="0" lang="en-US" sz="4000" b="0" i="0" u="none" strike="noStrike" cap="none" normalizeH="0" baseline="0" dirty="0" err="1" smtClean="0">
+              <a:rPr kumimoji="0" lang="en-US" sz="4000" b="0" i="0" u="none" strike="noStrike" cap="none" normalizeH="0" baseline="0" dirty="0" err="1">
                 <a:ln>
                   <a:noFill/>
                 </a:ln>
@@ -8431,7 +8307,7 @@
               <a:t>cmd</a:t>
             </a:r>
             <a:r>
-              <a:rPr kumimoji="0" lang="en-US" sz="4000" b="0" i="0" u="none" strike="noStrike" cap="none" normalizeH="0" baseline="0" dirty="0" smtClean="0">
+              <a:rPr kumimoji="0" lang="en-US" sz="4000" b="0" i="0" u="none" strike="noStrike" cap="none" normalizeH="0" baseline="0" dirty="0">
                 <a:ln>
                   <a:noFill/>
                 </a:ln>
@@ -8444,7 +8320,7 @@
               <a:t>):</a:t>
             </a:r>
             <a:br>
-              <a:rPr kumimoji="0" lang="en-US" sz="4000" b="0" i="0" u="none" strike="noStrike" cap="none" normalizeH="0" baseline="0" dirty="0" smtClean="0">
+              <a:rPr kumimoji="0" lang="en-US" sz="4000" b="0" i="0" u="none" strike="noStrike" cap="none" normalizeH="0" baseline="0" dirty="0">
                 <a:ln>
                   <a:noFill/>
                 </a:ln>
@@ -8456,7 +8332,7 @@
               </a:rPr>
             </a:br>
             <a:r>
-              <a:rPr kumimoji="0" lang="en-US" sz="4000" b="0" i="0" u="none" strike="noStrike" cap="none" normalizeH="0" baseline="0" dirty="0" smtClean="0">
+              <a:rPr kumimoji="0" lang="en-US" sz="4000" b="0" i="0" u="none" strike="noStrike" cap="none" normalizeH="0" baseline="0" dirty="0">
                 <a:ln>
                   <a:noFill/>
                 </a:ln>
@@ -8469,7 +8345,7 @@
               <a:t>    </a:t>
             </a:r>
             <a:r>
-              <a:rPr kumimoji="0" lang="en-US" sz="4000" b="0" i="0" u="none" strike="noStrike" cap="none" normalizeH="0" baseline="0" dirty="0" err="1" smtClean="0">
+              <a:rPr kumimoji="0" lang="en-US" sz="4000" b="0" i="0" u="none" strike="noStrike" cap="none" normalizeH="0" baseline="0" dirty="0" err="1">
                 <a:ln>
                   <a:noFill/>
                 </a:ln>
@@ -8482,7 +8358,7 @@
               <a:t>ser.write</a:t>
             </a:r>
             <a:r>
-              <a:rPr kumimoji="0" lang="en-US" sz="4000" b="0" i="0" u="none" strike="noStrike" cap="none" normalizeH="0" baseline="0" dirty="0" smtClean="0">
+              <a:rPr kumimoji="0" lang="en-US" sz="4000" b="0" i="0" u="none" strike="noStrike" cap="none" normalizeH="0" baseline="0" dirty="0">
                 <a:ln>
                   <a:noFill/>
                 </a:ln>
@@ -8495,7 +8371,7 @@
               <a:t>(</a:t>
             </a:r>
             <a:r>
-              <a:rPr kumimoji="0" lang="en-US" sz="4000" b="0" i="0" u="none" strike="noStrike" cap="none" normalizeH="0" baseline="0" dirty="0" err="1" smtClean="0">
+              <a:rPr kumimoji="0" lang="en-US" sz="4000" b="0" i="0" u="none" strike="noStrike" cap="none" normalizeH="0" baseline="0" dirty="0" err="1">
                 <a:ln>
                   <a:noFill/>
                 </a:ln>
@@ -8508,7 +8384,7 @@
               <a:t>cmd.encode</a:t>
             </a:r>
             <a:r>
-              <a:rPr kumimoji="0" lang="en-US" sz="4000" b="0" i="0" u="none" strike="noStrike" cap="none" normalizeH="0" baseline="0" dirty="0" smtClean="0">
+              <a:rPr kumimoji="0" lang="en-US" sz="4000" b="0" i="0" u="none" strike="noStrike" cap="none" normalizeH="0" baseline="0" dirty="0">
                 <a:ln>
                   <a:noFill/>
                 </a:ln>
@@ -8520,7 +8396,7 @@
               </a:rPr>
               <a:t>())</a:t>
             </a:r>
-            <a:endParaRPr kumimoji="0" lang="en-US" sz="3600" b="0" i="0" u="none" strike="noStrike" cap="none" normalizeH="0" baseline="0" dirty="0" smtClean="0">
+            <a:endParaRPr kumimoji="0" lang="en-US" sz="3600" b="0" i="0" u="none" strike="noStrike" cap="none" normalizeH="0" baseline="0" dirty="0">
               <a:ln>
                 <a:noFill/>
               </a:ln>
@@ -8543,13 +8419,13 @@
   <p:clrMapOvr>
     <a:masterClrMapping/>
   </p:clrMapOvr>
-  <mc:AlternateContent xmlns:mc="http://schemas.openxmlformats.org/markup-compatibility/2006">
-    <mc:Choice xmlns:p14="http://schemas.microsoft.com/office/powerpoint/2010/main" Requires="p14">
+  <mc:AlternateContent xmlns:mc="http://schemas.openxmlformats.org/markup-compatibility/2006" xmlns:p14="http://schemas.microsoft.com/office/powerpoint/2010/main">
+    <mc:Choice Requires="p14">
       <p:transition spd="med" p14:dur="700">
         <p:fade/>
       </p:transition>
     </mc:Choice>
-    <mc:Fallback>
+    <mc:Fallback xmlns="">
       <p:transition spd="med">
         <p:fade/>
       </p:transition>
@@ -8591,10 +8467,9 @@
           <a:lstStyle/>
           <a:p>
             <a:r>
-              <a:rPr lang="en-US" dirty="0" smtClean="0"/>
+              <a:rPr lang="en-US" dirty="0"/>
               <a:t>Step 4: Testing the Program</a:t>
             </a:r>
-            <a:endParaRPr lang="en-US" dirty="0"/>
           </a:p>
         </p:txBody>
       </p:sp>
@@ -8669,7 +8544,7 @@
               <a:tabLst/>
             </a:pPr>
             <a:r>
-              <a:rPr kumimoji="0" lang="en-US" sz="2200" b="0" i="0" u="none" strike="noStrike" cap="none" normalizeH="0" baseline="0" dirty="0" smtClean="0">
+              <a:rPr kumimoji="0" lang="en-US" sz="2200" b="0" i="0" u="none" strike="noStrike" cap="none" normalizeH="0" baseline="0" dirty="0">
                 <a:ln>
                   <a:noFill/>
                 </a:ln>
@@ -8682,7 +8557,7 @@
               <a:t>while True</a:t>
             </a:r>
             <a:r>
-              <a:rPr kumimoji="0" lang="en-US" sz="2200" b="0" i="0" u="none" strike="noStrike" cap="none" normalizeH="0" baseline="0" dirty="0" smtClean="0">
+              <a:rPr kumimoji="0" lang="en-US" sz="2200" b="0" i="0" u="none" strike="noStrike" cap="none" normalizeH="0" baseline="0" dirty="0">
                 <a:ln>
                   <a:noFill/>
                 </a:ln>
@@ -8695,7 +8570,7 @@
               <a:t>:</a:t>
             </a:r>
             <a:br>
-              <a:rPr kumimoji="0" lang="en-US" sz="2200" b="0" i="0" u="none" strike="noStrike" cap="none" normalizeH="0" baseline="0" dirty="0" smtClean="0">
+              <a:rPr kumimoji="0" lang="en-US" sz="2200" b="0" i="0" u="none" strike="noStrike" cap="none" normalizeH="0" baseline="0" dirty="0">
                 <a:ln>
                   <a:noFill/>
                 </a:ln>
@@ -8707,7 +8582,7 @@
               </a:rPr>
             </a:br>
             <a:r>
-              <a:rPr kumimoji="0" lang="en-US" sz="2200" b="0" i="0" u="none" strike="noStrike" cap="none" normalizeH="0" baseline="0" dirty="0" smtClean="0">
+              <a:rPr kumimoji="0" lang="en-US" sz="2200" b="0" i="0" u="none" strike="noStrike" cap="none" normalizeH="0" baseline="0" dirty="0">
                 <a:ln>
                   <a:noFill/>
                 </a:ln>
@@ -8720,7 +8595,7 @@
               <a:t>    </a:t>
             </a:r>
             <a:r>
-              <a:rPr kumimoji="0" lang="en-US" sz="2200" b="0" i="0" u="none" strike="noStrike" cap="none" normalizeH="0" baseline="0" dirty="0" smtClean="0">
+              <a:rPr kumimoji="0" lang="en-US" sz="2200" b="0" i="0" u="none" strike="noStrike" cap="none" normalizeH="0" baseline="0" dirty="0">
                 <a:ln>
                   <a:noFill/>
                 </a:ln>
@@ -8733,7 +8608,7 @@
               <a:t>print</a:t>
             </a:r>
             <a:r>
-              <a:rPr kumimoji="0" lang="en-US" sz="2200" b="0" i="0" u="none" strike="noStrike" cap="none" normalizeH="0" baseline="0" dirty="0" smtClean="0">
+              <a:rPr kumimoji="0" lang="en-US" sz="2200" b="0" i="0" u="none" strike="noStrike" cap="none" normalizeH="0" baseline="0" dirty="0">
                 <a:ln>
                   <a:noFill/>
                 </a:ln>
@@ -8746,7 +8621,7 @@
               <a:t>(</a:t>
             </a:r>
             <a:r>
-              <a:rPr kumimoji="0" lang="en-US" sz="2200" b="0" i="0" u="none" strike="noStrike" cap="none" normalizeH="0" baseline="0" dirty="0" smtClean="0">
+              <a:rPr kumimoji="0" lang="en-US" sz="2200" b="0" i="0" u="none" strike="noStrike" cap="none" normalizeH="0" baseline="0" dirty="0">
                 <a:ln>
                   <a:noFill/>
                 </a:ln>
@@ -8759,7 +8634,7 @@
               <a:t>"Testing commands"</a:t>
             </a:r>
             <a:r>
-              <a:rPr kumimoji="0" lang="en-US" sz="2200" b="0" i="0" u="none" strike="noStrike" cap="none" normalizeH="0" baseline="0" dirty="0" smtClean="0">
+              <a:rPr kumimoji="0" lang="en-US" sz="2200" b="0" i="0" u="none" strike="noStrike" cap="none" normalizeH="0" baseline="0" dirty="0">
                 <a:ln>
                   <a:noFill/>
                 </a:ln>
@@ -8772,7 +8647,7 @@
               <a:t>)</a:t>
             </a:r>
             <a:br>
-              <a:rPr kumimoji="0" lang="en-US" sz="2200" b="0" i="0" u="none" strike="noStrike" cap="none" normalizeH="0" baseline="0" dirty="0" smtClean="0">
+              <a:rPr kumimoji="0" lang="en-US" sz="2200" b="0" i="0" u="none" strike="noStrike" cap="none" normalizeH="0" baseline="0" dirty="0">
                 <a:ln>
                   <a:noFill/>
                 </a:ln>
@@ -8784,7 +8659,7 @@
               </a:rPr>
             </a:br>
             <a:r>
-              <a:rPr kumimoji="0" lang="en-US" sz="2200" b="0" i="0" u="none" strike="noStrike" cap="none" normalizeH="0" baseline="0" dirty="0" smtClean="0">
+              <a:rPr kumimoji="0" lang="en-US" sz="2200" b="0" i="0" u="none" strike="noStrike" cap="none" normalizeH="0" baseline="0" dirty="0">
                 <a:ln>
                   <a:noFill/>
                 </a:ln>
@@ -8797,7 +8672,7 @@
               <a:t>    </a:t>
             </a:r>
             <a:r>
-              <a:rPr kumimoji="0" lang="en-US" sz="2200" b="0" i="0" u="none" strike="noStrike" cap="none" normalizeH="0" baseline="0" dirty="0" err="1" smtClean="0">
+              <a:rPr kumimoji="0" lang="en-US" sz="2200" b="0" i="0" u="none" strike="noStrike" cap="none" normalizeH="0" baseline="0" dirty="0" err="1">
                 <a:ln>
                   <a:noFill/>
                 </a:ln>
@@ -8810,7 +8685,7 @@
               <a:t>sendCommand</a:t>
             </a:r>
             <a:r>
-              <a:rPr kumimoji="0" lang="en-US" sz="2200" b="0" i="0" u="none" strike="noStrike" cap="none" normalizeH="0" baseline="0" dirty="0" smtClean="0">
+              <a:rPr kumimoji="0" lang="en-US" sz="2200" b="0" i="0" u="none" strike="noStrike" cap="none" normalizeH="0" baseline="0" dirty="0">
                 <a:ln>
                   <a:noFill/>
                 </a:ln>
@@ -8823,7 +8698,7 @@
               <a:t>(</a:t>
             </a:r>
             <a:r>
-              <a:rPr kumimoji="0" lang="en-US" sz="2200" b="0" i="0" u="none" strike="noStrike" cap="none" normalizeH="0" baseline="0" dirty="0" smtClean="0">
+              <a:rPr kumimoji="0" lang="en-US" sz="2200" b="0" i="0" u="none" strike="noStrike" cap="none" normalizeH="0" baseline="0" dirty="0">
                 <a:ln>
                   <a:noFill/>
                 </a:ln>
@@ -8836,7 +8711,7 @@
               <a:t>"2"</a:t>
             </a:r>
             <a:r>
-              <a:rPr kumimoji="0" lang="en-US" sz="2200" b="0" i="0" u="none" strike="noStrike" cap="none" normalizeH="0" baseline="0" dirty="0" smtClean="0">
+              <a:rPr kumimoji="0" lang="en-US" sz="2200" b="0" i="0" u="none" strike="noStrike" cap="none" normalizeH="0" baseline="0" dirty="0">
                 <a:ln>
                   <a:noFill/>
                 </a:ln>
@@ -8849,7 +8724,7 @@
               <a:t>)</a:t>
             </a:r>
             <a:br>
-              <a:rPr kumimoji="0" lang="en-US" sz="2200" b="0" i="0" u="none" strike="noStrike" cap="none" normalizeH="0" baseline="0" dirty="0" smtClean="0">
+              <a:rPr kumimoji="0" lang="en-US" sz="2200" b="0" i="0" u="none" strike="noStrike" cap="none" normalizeH="0" baseline="0" dirty="0">
                 <a:ln>
                   <a:noFill/>
                 </a:ln>
@@ -8861,7 +8736,7 @@
               </a:rPr>
             </a:br>
             <a:r>
-              <a:rPr kumimoji="0" lang="en-US" sz="2200" b="0" i="0" u="none" strike="noStrike" cap="none" normalizeH="0" baseline="0" dirty="0" smtClean="0">
+              <a:rPr kumimoji="0" lang="en-US" sz="2200" b="0" i="0" u="none" strike="noStrike" cap="none" normalizeH="0" baseline="0" dirty="0">
                 <a:ln>
                   <a:noFill/>
                 </a:ln>
@@ -8874,7 +8749,7 @@
               <a:t>    </a:t>
             </a:r>
             <a:r>
-              <a:rPr kumimoji="0" lang="en-US" sz="2200" b="0" i="0" u="none" strike="noStrike" cap="none" normalizeH="0" baseline="0" dirty="0" err="1" smtClean="0">
+              <a:rPr kumimoji="0" lang="en-US" sz="2200" b="0" i="0" u="none" strike="noStrike" cap="none" normalizeH="0" baseline="0" dirty="0" err="1">
                 <a:ln>
                   <a:noFill/>
                 </a:ln>
@@ -8887,7 +8762,7 @@
               <a:t>time.sleep</a:t>
             </a:r>
             <a:r>
-              <a:rPr kumimoji="0" lang="en-US" sz="2200" b="0" i="0" u="none" strike="noStrike" cap="none" normalizeH="0" baseline="0" dirty="0" smtClean="0">
+              <a:rPr kumimoji="0" lang="en-US" sz="2200" b="0" i="0" u="none" strike="noStrike" cap="none" normalizeH="0" baseline="0" dirty="0">
                 <a:ln>
                   <a:noFill/>
                 </a:ln>
@@ -8900,7 +8775,7 @@
               <a:t>(</a:t>
             </a:r>
             <a:r>
-              <a:rPr kumimoji="0" lang="en-US" sz="2200" b="0" i="0" u="none" strike="noStrike" cap="none" normalizeH="0" baseline="0" dirty="0" smtClean="0">
+              <a:rPr kumimoji="0" lang="en-US" sz="2200" b="0" i="0" u="none" strike="noStrike" cap="none" normalizeH="0" baseline="0" dirty="0">
                 <a:ln>
                   <a:noFill/>
                 </a:ln>
@@ -8913,7 +8788,7 @@
               <a:t>2</a:t>
             </a:r>
             <a:r>
-              <a:rPr kumimoji="0" lang="en-US" sz="2200" b="0" i="0" u="none" strike="noStrike" cap="none" normalizeH="0" baseline="0" dirty="0" smtClean="0">
+              <a:rPr kumimoji="0" lang="en-US" sz="2200" b="0" i="0" u="none" strike="noStrike" cap="none" normalizeH="0" baseline="0" dirty="0">
                 <a:ln>
                   <a:noFill/>
                 </a:ln>
@@ -8926,7 +8801,7 @@
               <a:t>)</a:t>
             </a:r>
             <a:br>
-              <a:rPr kumimoji="0" lang="en-US" sz="2200" b="0" i="0" u="none" strike="noStrike" cap="none" normalizeH="0" baseline="0" dirty="0" smtClean="0">
+              <a:rPr kumimoji="0" lang="en-US" sz="2200" b="0" i="0" u="none" strike="noStrike" cap="none" normalizeH="0" baseline="0" dirty="0">
                 <a:ln>
                   <a:noFill/>
                 </a:ln>
@@ -8938,7 +8813,7 @@
               </a:rPr>
             </a:br>
             <a:r>
-              <a:rPr kumimoji="0" lang="en-US" sz="2200" b="0" i="0" u="none" strike="noStrike" cap="none" normalizeH="0" baseline="0" dirty="0" smtClean="0">
+              <a:rPr kumimoji="0" lang="en-US" sz="2200" b="0" i="0" u="none" strike="noStrike" cap="none" normalizeH="0" baseline="0" dirty="0">
                 <a:ln>
                   <a:noFill/>
                 </a:ln>
@@ -8951,7 +8826,7 @@
               <a:t>    </a:t>
             </a:r>
             <a:r>
-              <a:rPr kumimoji="0" lang="en-US" sz="2200" b="0" i="0" u="none" strike="noStrike" cap="none" normalizeH="0" baseline="0" dirty="0" err="1" smtClean="0">
+              <a:rPr kumimoji="0" lang="en-US" sz="2200" b="0" i="0" u="none" strike="noStrike" cap="none" normalizeH="0" baseline="0" dirty="0" err="1">
                 <a:ln>
                   <a:noFill/>
                 </a:ln>
@@ -8964,7 +8839,7 @@
               <a:t>sendCommand</a:t>
             </a:r>
             <a:r>
-              <a:rPr kumimoji="0" lang="en-US" sz="2200" b="0" i="0" u="none" strike="noStrike" cap="none" normalizeH="0" baseline="0" dirty="0" smtClean="0">
+              <a:rPr kumimoji="0" lang="en-US" sz="2200" b="0" i="0" u="none" strike="noStrike" cap="none" normalizeH="0" baseline="0" dirty="0">
                 <a:ln>
                   <a:noFill/>
                 </a:ln>
@@ -8977,7 +8852,7 @@
               <a:t>(</a:t>
             </a:r>
             <a:r>
-              <a:rPr kumimoji="0" lang="en-US" sz="2200" b="0" i="0" u="none" strike="noStrike" cap="none" normalizeH="0" baseline="0" dirty="0" smtClean="0">
+              <a:rPr kumimoji="0" lang="en-US" sz="2200" b="0" i="0" u="none" strike="noStrike" cap="none" normalizeH="0" baseline="0" dirty="0">
                 <a:ln>
                   <a:noFill/>
                 </a:ln>
@@ -8990,7 +8865,7 @@
               <a:t>"3"</a:t>
             </a:r>
             <a:r>
-              <a:rPr kumimoji="0" lang="en-US" sz="2200" b="0" i="0" u="none" strike="noStrike" cap="none" normalizeH="0" baseline="0" dirty="0" smtClean="0">
+              <a:rPr kumimoji="0" lang="en-US" sz="2200" b="0" i="0" u="none" strike="noStrike" cap="none" normalizeH="0" baseline="0" dirty="0">
                 <a:ln>
                   <a:noFill/>
                 </a:ln>
@@ -9003,7 +8878,7 @@
               <a:t>)</a:t>
             </a:r>
             <a:br>
-              <a:rPr kumimoji="0" lang="en-US" sz="2200" b="0" i="0" u="none" strike="noStrike" cap="none" normalizeH="0" baseline="0" dirty="0" smtClean="0">
+              <a:rPr kumimoji="0" lang="en-US" sz="2200" b="0" i="0" u="none" strike="noStrike" cap="none" normalizeH="0" baseline="0" dirty="0">
                 <a:ln>
                   <a:noFill/>
                 </a:ln>
@@ -9015,7 +8890,7 @@
               </a:rPr>
             </a:br>
             <a:r>
-              <a:rPr kumimoji="0" lang="en-US" sz="2200" b="0" i="0" u="none" strike="noStrike" cap="none" normalizeH="0" baseline="0" dirty="0" smtClean="0">
+              <a:rPr kumimoji="0" lang="en-US" sz="2200" b="0" i="0" u="none" strike="noStrike" cap="none" normalizeH="0" baseline="0" dirty="0">
                 <a:ln>
                   <a:noFill/>
                 </a:ln>
@@ -9028,7 +8903,7 @@
               <a:t>    </a:t>
             </a:r>
             <a:r>
-              <a:rPr kumimoji="0" lang="en-US" sz="2200" b="0" i="0" u="none" strike="noStrike" cap="none" normalizeH="0" baseline="0" dirty="0" err="1" smtClean="0">
+              <a:rPr kumimoji="0" lang="en-US" sz="2200" b="0" i="0" u="none" strike="noStrike" cap="none" normalizeH="0" baseline="0" dirty="0" err="1">
                 <a:ln>
                   <a:noFill/>
                 </a:ln>
@@ -9041,7 +8916,7 @@
               <a:t>time.sleep</a:t>
             </a:r>
             <a:r>
-              <a:rPr kumimoji="0" lang="en-US" sz="2200" b="0" i="0" u="none" strike="noStrike" cap="none" normalizeH="0" baseline="0" dirty="0" smtClean="0">
+              <a:rPr kumimoji="0" lang="en-US" sz="2200" b="0" i="0" u="none" strike="noStrike" cap="none" normalizeH="0" baseline="0" dirty="0">
                 <a:ln>
                   <a:noFill/>
                 </a:ln>
@@ -9054,7 +8929,7 @@
               <a:t>(</a:t>
             </a:r>
             <a:r>
-              <a:rPr kumimoji="0" lang="en-US" sz="2200" b="0" i="0" u="none" strike="noStrike" cap="none" normalizeH="0" baseline="0" dirty="0" smtClean="0">
+              <a:rPr kumimoji="0" lang="en-US" sz="2200" b="0" i="0" u="none" strike="noStrike" cap="none" normalizeH="0" baseline="0" dirty="0">
                 <a:ln>
                   <a:noFill/>
                 </a:ln>
@@ -9067,7 +8942,7 @@
               <a:t>2</a:t>
             </a:r>
             <a:r>
-              <a:rPr kumimoji="0" lang="en-US" sz="2200" b="0" i="0" u="none" strike="noStrike" cap="none" normalizeH="0" baseline="0" dirty="0" smtClean="0">
+              <a:rPr kumimoji="0" lang="en-US" sz="2200" b="0" i="0" u="none" strike="noStrike" cap="none" normalizeH="0" baseline="0" dirty="0">
                 <a:ln>
                   <a:noFill/>
                 </a:ln>
@@ -9080,7 +8955,7 @@
               <a:t>)</a:t>
             </a:r>
             <a:br>
-              <a:rPr kumimoji="0" lang="en-US" sz="2200" b="0" i="0" u="none" strike="noStrike" cap="none" normalizeH="0" baseline="0" dirty="0" smtClean="0">
+              <a:rPr kumimoji="0" lang="en-US" sz="2200" b="0" i="0" u="none" strike="noStrike" cap="none" normalizeH="0" baseline="0" dirty="0">
                 <a:ln>
                   <a:noFill/>
                 </a:ln>
@@ -9092,7 +8967,7 @@
               </a:rPr>
             </a:br>
             <a:r>
-              <a:rPr kumimoji="0" lang="en-US" sz="2200" b="0" i="0" u="none" strike="noStrike" cap="none" normalizeH="0" baseline="0" dirty="0" smtClean="0">
+              <a:rPr kumimoji="0" lang="en-US" sz="2200" b="0" i="0" u="none" strike="noStrike" cap="none" normalizeH="0" baseline="0" dirty="0">
                 <a:ln>
                   <a:noFill/>
                 </a:ln>
@@ -9105,7 +8980,7 @@
               <a:t>    </a:t>
             </a:r>
             <a:r>
-              <a:rPr kumimoji="0" lang="en-US" sz="2200" b="0" i="0" u="none" strike="noStrike" cap="none" normalizeH="0" baseline="0" dirty="0" err="1" smtClean="0">
+              <a:rPr kumimoji="0" lang="en-US" sz="2200" b="0" i="0" u="none" strike="noStrike" cap="none" normalizeH="0" baseline="0" dirty="0" err="1">
                 <a:ln>
                   <a:noFill/>
                 </a:ln>
@@ -9118,7 +8993,7 @@
               <a:t>sendCommand</a:t>
             </a:r>
             <a:r>
-              <a:rPr kumimoji="0" lang="en-US" sz="2200" b="0" i="0" u="none" strike="noStrike" cap="none" normalizeH="0" baseline="0" dirty="0" smtClean="0">
+              <a:rPr kumimoji="0" lang="en-US" sz="2200" b="0" i="0" u="none" strike="noStrike" cap="none" normalizeH="0" baseline="0" dirty="0">
                 <a:ln>
                   <a:noFill/>
                 </a:ln>
@@ -9131,7 +9006,7 @@
               <a:t>(</a:t>
             </a:r>
             <a:r>
-              <a:rPr kumimoji="0" lang="en-US" sz="2200" b="0" i="0" u="none" strike="noStrike" cap="none" normalizeH="0" baseline="0" dirty="0" smtClean="0">
+              <a:rPr kumimoji="0" lang="en-US" sz="2200" b="0" i="0" u="none" strike="noStrike" cap="none" normalizeH="0" baseline="0" dirty="0">
                 <a:ln>
                   <a:noFill/>
                 </a:ln>
@@ -9144,7 +9019,7 @@
               <a:t>"4"</a:t>
             </a:r>
             <a:r>
-              <a:rPr kumimoji="0" lang="en-US" sz="2200" b="0" i="0" u="none" strike="noStrike" cap="none" normalizeH="0" baseline="0" dirty="0" smtClean="0">
+              <a:rPr kumimoji="0" lang="en-US" sz="2200" b="0" i="0" u="none" strike="noStrike" cap="none" normalizeH="0" baseline="0" dirty="0">
                 <a:ln>
                   <a:noFill/>
                 </a:ln>
@@ -9157,7 +9032,7 @@
               <a:t>)</a:t>
             </a:r>
             <a:br>
-              <a:rPr kumimoji="0" lang="en-US" sz="2200" b="0" i="0" u="none" strike="noStrike" cap="none" normalizeH="0" baseline="0" dirty="0" smtClean="0">
+              <a:rPr kumimoji="0" lang="en-US" sz="2200" b="0" i="0" u="none" strike="noStrike" cap="none" normalizeH="0" baseline="0" dirty="0">
                 <a:ln>
                   <a:noFill/>
                 </a:ln>
@@ -9169,7 +9044,7 @@
               </a:rPr>
             </a:br>
             <a:r>
-              <a:rPr kumimoji="0" lang="en-US" sz="2200" b="0" i="0" u="none" strike="noStrike" cap="none" normalizeH="0" baseline="0" dirty="0" smtClean="0">
+              <a:rPr kumimoji="0" lang="en-US" sz="2200" b="0" i="0" u="none" strike="noStrike" cap="none" normalizeH="0" baseline="0" dirty="0">
                 <a:ln>
                   <a:noFill/>
                 </a:ln>
@@ -9182,7 +9057,7 @@
               <a:t>    </a:t>
             </a:r>
             <a:r>
-              <a:rPr kumimoji="0" lang="en-US" sz="2200" b="0" i="0" u="none" strike="noStrike" cap="none" normalizeH="0" baseline="0" dirty="0" err="1" smtClean="0">
+              <a:rPr kumimoji="0" lang="en-US" sz="2200" b="0" i="0" u="none" strike="noStrike" cap="none" normalizeH="0" baseline="0" dirty="0" err="1">
                 <a:ln>
                   <a:noFill/>
                 </a:ln>
@@ -9195,7 +9070,7 @@
               <a:t>time.sleep</a:t>
             </a:r>
             <a:r>
-              <a:rPr kumimoji="0" lang="en-US" sz="2200" b="0" i="0" u="none" strike="noStrike" cap="none" normalizeH="0" baseline="0" dirty="0" smtClean="0">
+              <a:rPr kumimoji="0" lang="en-US" sz="2200" b="0" i="0" u="none" strike="noStrike" cap="none" normalizeH="0" baseline="0" dirty="0">
                 <a:ln>
                   <a:noFill/>
                 </a:ln>
@@ -9208,7 +9083,7 @@
               <a:t>(</a:t>
             </a:r>
             <a:r>
-              <a:rPr kumimoji="0" lang="en-US" sz="2200" b="0" i="0" u="none" strike="noStrike" cap="none" normalizeH="0" baseline="0" dirty="0" smtClean="0">
+              <a:rPr kumimoji="0" lang="en-US" sz="2200" b="0" i="0" u="none" strike="noStrike" cap="none" normalizeH="0" baseline="0" dirty="0">
                 <a:ln>
                   <a:noFill/>
                 </a:ln>
@@ -9221,7 +9096,7 @@
               <a:t>2</a:t>
             </a:r>
             <a:r>
-              <a:rPr kumimoji="0" lang="en-US" sz="2200" b="0" i="0" u="none" strike="noStrike" cap="none" normalizeH="0" baseline="0" dirty="0" smtClean="0">
+              <a:rPr kumimoji="0" lang="en-US" sz="2200" b="0" i="0" u="none" strike="noStrike" cap="none" normalizeH="0" baseline="0" dirty="0">
                 <a:ln>
                   <a:noFill/>
                 </a:ln>
@@ -9234,7 +9109,7 @@
               <a:t>)</a:t>
             </a:r>
             <a:br>
-              <a:rPr kumimoji="0" lang="en-US" sz="2200" b="0" i="0" u="none" strike="noStrike" cap="none" normalizeH="0" baseline="0" dirty="0" smtClean="0">
+              <a:rPr kumimoji="0" lang="en-US" sz="2200" b="0" i="0" u="none" strike="noStrike" cap="none" normalizeH="0" baseline="0" dirty="0">
                 <a:ln>
                   <a:noFill/>
                 </a:ln>
@@ -9246,7 +9121,7 @@
               </a:rPr>
             </a:br>
             <a:r>
-              <a:rPr kumimoji="0" lang="en-US" sz="2200" b="0" i="0" u="none" strike="noStrike" cap="none" normalizeH="0" baseline="0" dirty="0" smtClean="0">
+              <a:rPr kumimoji="0" lang="en-US" sz="2200" b="0" i="0" u="none" strike="noStrike" cap="none" normalizeH="0" baseline="0" dirty="0">
                 <a:ln>
                   <a:noFill/>
                 </a:ln>
@@ -9259,7 +9134,7 @@
               <a:t>    </a:t>
             </a:r>
             <a:r>
-              <a:rPr kumimoji="0" lang="en-US" sz="2200" b="0" i="0" u="none" strike="noStrike" cap="none" normalizeH="0" baseline="0" dirty="0" err="1" smtClean="0">
+              <a:rPr kumimoji="0" lang="en-US" sz="2200" b="0" i="0" u="none" strike="noStrike" cap="none" normalizeH="0" baseline="0" dirty="0" err="1">
                 <a:ln>
                   <a:noFill/>
                 </a:ln>
@@ -9272,7 +9147,7 @@
               <a:t>sendCommand</a:t>
             </a:r>
             <a:r>
-              <a:rPr kumimoji="0" lang="en-US" sz="2200" b="0" i="0" u="none" strike="noStrike" cap="none" normalizeH="0" baseline="0" dirty="0" smtClean="0">
+              <a:rPr kumimoji="0" lang="en-US" sz="2200" b="0" i="0" u="none" strike="noStrike" cap="none" normalizeH="0" baseline="0" dirty="0">
                 <a:ln>
                   <a:noFill/>
                 </a:ln>
@@ -9285,7 +9160,7 @@
               <a:t>(</a:t>
             </a:r>
             <a:r>
-              <a:rPr kumimoji="0" lang="en-US" sz="2200" b="0" i="0" u="none" strike="noStrike" cap="none" normalizeH="0" baseline="0" dirty="0" smtClean="0">
+              <a:rPr kumimoji="0" lang="en-US" sz="2200" b="0" i="0" u="none" strike="noStrike" cap="none" normalizeH="0" baseline="0" dirty="0">
                 <a:ln>
                   <a:noFill/>
                 </a:ln>
@@ -9298,7 +9173,7 @@
               <a:t>"5"</a:t>
             </a:r>
             <a:r>
-              <a:rPr kumimoji="0" lang="en-US" sz="2200" b="0" i="0" u="none" strike="noStrike" cap="none" normalizeH="0" baseline="0" dirty="0" smtClean="0">
+              <a:rPr kumimoji="0" lang="en-US" sz="2200" b="0" i="0" u="none" strike="noStrike" cap="none" normalizeH="0" baseline="0" dirty="0">
                 <a:ln>
                   <a:noFill/>
                 </a:ln>
@@ -9311,7 +9186,7 @@
               <a:t>)</a:t>
             </a:r>
             <a:br>
-              <a:rPr kumimoji="0" lang="en-US" sz="2200" b="0" i="0" u="none" strike="noStrike" cap="none" normalizeH="0" baseline="0" dirty="0" smtClean="0">
+              <a:rPr kumimoji="0" lang="en-US" sz="2200" b="0" i="0" u="none" strike="noStrike" cap="none" normalizeH="0" baseline="0" dirty="0">
                 <a:ln>
                   <a:noFill/>
                 </a:ln>
@@ -9323,7 +9198,7 @@
               </a:rPr>
             </a:br>
             <a:r>
-              <a:rPr kumimoji="0" lang="en-US" sz="2200" b="0" i="0" u="none" strike="noStrike" cap="none" normalizeH="0" baseline="0" dirty="0" smtClean="0">
+              <a:rPr kumimoji="0" lang="en-US" sz="2200" b="0" i="0" u="none" strike="noStrike" cap="none" normalizeH="0" baseline="0" dirty="0">
                 <a:ln>
                   <a:noFill/>
                 </a:ln>
@@ -9336,7 +9211,7 @@
               <a:t>    </a:t>
             </a:r>
             <a:r>
-              <a:rPr kumimoji="0" lang="en-US" sz="2200" b="0" i="0" u="none" strike="noStrike" cap="none" normalizeH="0" baseline="0" dirty="0" err="1" smtClean="0">
+              <a:rPr kumimoji="0" lang="en-US" sz="2200" b="0" i="0" u="none" strike="noStrike" cap="none" normalizeH="0" baseline="0" dirty="0" err="1">
                 <a:ln>
                   <a:noFill/>
                 </a:ln>
@@ -9349,7 +9224,7 @@
               <a:t>time.sleep</a:t>
             </a:r>
             <a:r>
-              <a:rPr kumimoji="0" lang="en-US" sz="2200" b="0" i="0" u="none" strike="noStrike" cap="none" normalizeH="0" baseline="0" dirty="0" smtClean="0">
+              <a:rPr kumimoji="0" lang="en-US" sz="2200" b="0" i="0" u="none" strike="noStrike" cap="none" normalizeH="0" baseline="0" dirty="0">
                 <a:ln>
                   <a:noFill/>
                 </a:ln>
@@ -9362,7 +9237,7 @@
               <a:t>(</a:t>
             </a:r>
             <a:r>
-              <a:rPr kumimoji="0" lang="en-US" sz="2200" b="0" i="0" u="none" strike="noStrike" cap="none" normalizeH="0" baseline="0" dirty="0" smtClean="0">
+              <a:rPr kumimoji="0" lang="en-US" sz="2200" b="0" i="0" u="none" strike="noStrike" cap="none" normalizeH="0" baseline="0" dirty="0">
                 <a:ln>
                   <a:noFill/>
                 </a:ln>
@@ -9375,7 +9250,7 @@
               <a:t>2</a:t>
             </a:r>
             <a:r>
-              <a:rPr kumimoji="0" lang="en-US" sz="2200" b="0" i="0" u="none" strike="noStrike" cap="none" normalizeH="0" baseline="0" dirty="0" smtClean="0">
+              <a:rPr kumimoji="0" lang="en-US" sz="2200" b="0" i="0" u="none" strike="noStrike" cap="none" normalizeH="0" baseline="0" dirty="0">
                 <a:ln>
                   <a:noFill/>
                 </a:ln>
@@ -9387,7 +9262,7 @@
               </a:rPr>
               <a:t>)</a:t>
             </a:r>
-            <a:endParaRPr kumimoji="0" lang="en-US" sz="1800" b="0" i="0" u="none" strike="noStrike" cap="none" normalizeH="0" baseline="0" dirty="0" smtClean="0">
+            <a:endParaRPr kumimoji="0" lang="en-US" sz="1800" b="0" i="0" u="none" strike="noStrike" cap="none" normalizeH="0" baseline="0" dirty="0">
               <a:ln>
                 <a:noFill/>
               </a:ln>
@@ -9425,8 +9300,20 @@
                 <a:tableStyleId>{5C22544A-7EE6-4342-B048-85BDC9FD1C3A}</a:tableStyleId>
               </a:tblPr>
               <a:tblGrid>
-                <a:gridCol w="1672542"/>
-                <a:gridCol w="1672542"/>
+                <a:gridCol w="1672542">
+                  <a:extLst>
+                    <a:ext uri="{9D8B030D-6E8A-4147-A177-3AD203B41FA5}">
+                      <a16:colId xmlns:a16="http://schemas.microsoft.com/office/drawing/2014/main" val="20000"/>
+                    </a:ext>
+                  </a:extLst>
+                </a:gridCol>
+                <a:gridCol w="1672542">
+                  <a:extLst>
+                    <a:ext uri="{9D8B030D-6E8A-4147-A177-3AD203B41FA5}">
+                      <a16:colId xmlns:a16="http://schemas.microsoft.com/office/drawing/2014/main" val="20001"/>
+                    </a:ext>
+                  </a:extLst>
+                </a:gridCol>
               </a:tblGrid>
               <a:tr h="564237">
                 <a:tc>
@@ -9435,10 +9322,9 @@
                     <a:lstStyle/>
                     <a:p>
                       <a:r>
-                        <a:rPr lang="en-US" dirty="0" smtClean="0"/>
+                        <a:rPr lang="en-US" dirty="0"/>
                         <a:t>Command</a:t>
                       </a:r>
-                      <a:endParaRPr lang="en-US" dirty="0"/>
                     </a:p>
                   </a:txBody>
                   <a:tcPr/>
@@ -9449,14 +9335,18 @@
                     <a:lstStyle/>
                     <a:p>
                       <a:r>
-                        <a:rPr lang="en-US" dirty="0" smtClean="0"/>
+                        <a:rPr lang="en-US" dirty="0"/>
                         <a:t>Device</a:t>
                       </a:r>
-                      <a:endParaRPr lang="en-US" dirty="0"/>
                     </a:p>
                   </a:txBody>
                   <a:tcPr/>
                 </a:tc>
+                <a:extLst>
+                  <a:ext uri="{0D108BD9-81ED-4DB2-BD59-A6C34878D82A}">
+                    <a16:rowId xmlns:a16="http://schemas.microsoft.com/office/drawing/2014/main" val="10000"/>
+                  </a:ext>
+                </a:extLst>
               </a:tr>
               <a:tr h="973888">
                 <a:tc>
@@ -9465,10 +9355,9 @@
                     <a:lstStyle/>
                     <a:p>
                       <a:r>
-                        <a:rPr lang="en-US" dirty="0" smtClean="0"/>
+                        <a:rPr lang="en-US" dirty="0"/>
                         <a:t>2</a:t>
                       </a:r>
-                      <a:endParaRPr lang="en-US" dirty="0"/>
                     </a:p>
                   </a:txBody>
                   <a:tcPr/>
@@ -9479,11 +9368,11 @@
                     <a:lstStyle/>
                     <a:p>
                       <a:r>
-                        <a:rPr lang="en-US" dirty="0" smtClean="0"/>
+                        <a:rPr lang="en-US" dirty="0"/>
                         <a:t>Turn</a:t>
                       </a:r>
                       <a:r>
-                        <a:rPr lang="en-US" baseline="0" dirty="0" smtClean="0"/>
+                        <a:rPr lang="en-US" baseline="0" dirty="0"/>
                         <a:t> on LED</a:t>
                       </a:r>
                       <a:endParaRPr lang="en-US" dirty="0"/>
@@ -9491,6 +9380,11 @@
                   </a:txBody>
                   <a:tcPr/>
                 </a:tc>
+                <a:extLst>
+                  <a:ext uri="{0D108BD9-81ED-4DB2-BD59-A6C34878D82A}">
+                    <a16:rowId xmlns:a16="http://schemas.microsoft.com/office/drawing/2014/main" val="10001"/>
+                  </a:ext>
+                </a:extLst>
               </a:tr>
               <a:tr h="973888">
                 <a:tc>
@@ -9499,10 +9393,9 @@
                     <a:lstStyle/>
                     <a:p>
                       <a:r>
-                        <a:rPr lang="en-US" dirty="0" smtClean="0"/>
+                        <a:rPr lang="en-US" dirty="0"/>
                         <a:t>3</a:t>
                       </a:r>
-                      <a:endParaRPr lang="en-US" dirty="0"/>
                     </a:p>
                   </a:txBody>
                   <a:tcPr/>
@@ -9513,11 +9406,11 @@
                     <a:lstStyle/>
                     <a:p>
                       <a:r>
-                        <a:rPr lang="en-US" dirty="0" smtClean="0"/>
+                        <a:rPr lang="en-US" dirty="0"/>
                         <a:t>Turn</a:t>
                       </a:r>
                       <a:r>
-                        <a:rPr lang="en-US" baseline="0" dirty="0" smtClean="0"/>
+                        <a:rPr lang="en-US" baseline="0" dirty="0"/>
                         <a:t> off LED</a:t>
                       </a:r>
                       <a:endParaRPr lang="en-US" dirty="0"/>
@@ -9525,6 +9418,11 @@
                   </a:txBody>
                   <a:tcPr/>
                 </a:tc>
+                <a:extLst>
+                  <a:ext uri="{0D108BD9-81ED-4DB2-BD59-A6C34878D82A}">
+                    <a16:rowId xmlns:a16="http://schemas.microsoft.com/office/drawing/2014/main" val="10002"/>
+                  </a:ext>
+                </a:extLst>
               </a:tr>
               <a:tr h="973888">
                 <a:tc>
@@ -9533,10 +9431,9 @@
                     <a:lstStyle/>
                     <a:p>
                       <a:r>
-                        <a:rPr lang="en-US" dirty="0" smtClean="0"/>
+                        <a:rPr lang="en-US" dirty="0"/>
                         <a:t>4</a:t>
                       </a:r>
-                      <a:endParaRPr lang="en-US" dirty="0"/>
                     </a:p>
                   </a:txBody>
                   <a:tcPr/>
@@ -9547,11 +9444,11 @@
                     <a:lstStyle/>
                     <a:p>
                       <a:r>
-                        <a:rPr lang="en-US" dirty="0" smtClean="0"/>
+                        <a:rPr lang="en-US" dirty="0"/>
                         <a:t>Turn</a:t>
                       </a:r>
                       <a:r>
-                        <a:rPr lang="en-US" baseline="0" dirty="0" smtClean="0"/>
+                        <a:rPr lang="en-US" baseline="0" dirty="0"/>
                         <a:t> on Relay</a:t>
                       </a:r>
                       <a:endParaRPr lang="en-US" dirty="0"/>
@@ -9559,6 +9456,11 @@
                   </a:txBody>
                   <a:tcPr/>
                 </a:tc>
+                <a:extLst>
+                  <a:ext uri="{0D108BD9-81ED-4DB2-BD59-A6C34878D82A}">
+                    <a16:rowId xmlns:a16="http://schemas.microsoft.com/office/drawing/2014/main" val="10003"/>
+                  </a:ext>
+                </a:extLst>
               </a:tr>
               <a:tr h="973888">
                 <a:tc>
@@ -9567,10 +9469,9 @@
                     <a:lstStyle/>
                     <a:p>
                       <a:r>
-                        <a:rPr lang="en-US" dirty="0" smtClean="0"/>
+                        <a:rPr lang="en-US" dirty="0"/>
                         <a:t>5</a:t>
                       </a:r>
-                      <a:endParaRPr lang="en-US" dirty="0"/>
                     </a:p>
                   </a:txBody>
                   <a:tcPr/>
@@ -9581,11 +9482,11 @@
                     <a:lstStyle/>
                     <a:p>
                       <a:r>
-                        <a:rPr lang="en-US" dirty="0" smtClean="0"/>
+                        <a:rPr lang="en-US" dirty="0"/>
                         <a:t>Turn</a:t>
                       </a:r>
                       <a:r>
-                        <a:rPr lang="en-US" baseline="0" dirty="0" smtClean="0"/>
+                        <a:rPr lang="en-US" baseline="0" dirty="0"/>
                         <a:t> of Relay</a:t>
                       </a:r>
                       <a:endParaRPr lang="en-US" dirty="0"/>
@@ -9593,6 +9494,11 @@
                   </a:txBody>
                   <a:tcPr/>
                 </a:tc>
+                <a:extLst>
+                  <a:ext uri="{0D108BD9-81ED-4DB2-BD59-A6C34878D82A}">
+                    <a16:rowId xmlns:a16="http://schemas.microsoft.com/office/drawing/2014/main" val="10004"/>
+                  </a:ext>
+                </a:extLst>
               </a:tr>
             </a:tbl>
           </a:graphicData>
@@ -9608,13 +9514,13 @@
   <p:clrMapOvr>
     <a:masterClrMapping/>
   </p:clrMapOvr>
-  <mc:AlternateContent xmlns:mc="http://schemas.openxmlformats.org/markup-compatibility/2006">
-    <mc:Choice xmlns:p14="http://schemas.microsoft.com/office/powerpoint/2010/main" Requires="p14">
+  <mc:AlternateContent xmlns:mc="http://schemas.openxmlformats.org/markup-compatibility/2006" xmlns:p14="http://schemas.microsoft.com/office/powerpoint/2010/main">
+    <mc:Choice Requires="p14">
       <p:transition spd="med" p14:dur="700">
         <p:fade/>
       </p:transition>
     </mc:Choice>
-    <mc:Fallback>
+    <mc:Fallback xmlns="">
       <p:transition spd="med">
         <p:fade/>
       </p:transition>
@@ -9661,10 +9567,9 @@
           <a:lstStyle/>
           <a:p>
             <a:r>
-              <a:rPr lang="en-US" dirty="0" smtClean="0"/>
+              <a:rPr lang="en-US" dirty="0"/>
               <a:t>Full program</a:t>
             </a:r>
-            <a:endParaRPr lang="en-US" dirty="0"/>
           </a:p>
         </p:txBody>
       </p:sp>
@@ -9739,7 +9644,7 @@
               <a:tabLst/>
             </a:pPr>
             <a:r>
-              <a:rPr kumimoji="0" lang="en-US" sz="1600" b="0" i="0" u="none" strike="noStrike" cap="none" normalizeH="0" baseline="0" dirty="0" smtClean="0">
+              <a:rPr kumimoji="0" lang="en-US" sz="1600" b="0" i="0" u="none" strike="noStrike" cap="none" normalizeH="0" baseline="0" dirty="0">
                 <a:ln>
                   <a:noFill/>
                 </a:ln>
@@ -9752,7 +9657,7 @@
               <a:t>print</a:t>
             </a:r>
             <a:r>
-              <a:rPr kumimoji="0" lang="en-US" sz="1600" b="0" i="0" u="none" strike="noStrike" cap="none" normalizeH="0" baseline="0" dirty="0" smtClean="0">
+              <a:rPr kumimoji="0" lang="en-US" sz="1600" b="0" i="0" u="none" strike="noStrike" cap="none" normalizeH="0" baseline="0" dirty="0">
                 <a:ln>
                   <a:noFill/>
                 </a:ln>
@@ -9765,7 +9670,7 @@
               <a:t>(</a:t>
             </a:r>
             <a:r>
-              <a:rPr kumimoji="0" lang="en-US" sz="1600" b="0" i="0" u="none" strike="noStrike" cap="none" normalizeH="0" baseline="0" dirty="0" smtClean="0">
+              <a:rPr kumimoji="0" lang="en-US" sz="1600" b="0" i="0" u="none" strike="noStrike" cap="none" normalizeH="0" baseline="0" dirty="0">
                 <a:ln>
                   <a:noFill/>
                 </a:ln>
@@ -9778,7 +9683,7 @@
               <a:t>"Sensors and Actuators"</a:t>
             </a:r>
             <a:r>
-              <a:rPr kumimoji="0" lang="en-US" sz="1600" b="0" i="0" u="none" strike="noStrike" cap="none" normalizeH="0" baseline="0" dirty="0" smtClean="0">
+              <a:rPr kumimoji="0" lang="en-US" sz="1600" b="0" i="0" u="none" strike="noStrike" cap="none" normalizeH="0" baseline="0" dirty="0">
                 <a:ln>
                   <a:noFill/>
                 </a:ln>
@@ -9791,7 +9696,7 @@
               <a:t>)</a:t>
             </a:r>
             <a:br>
-              <a:rPr kumimoji="0" lang="en-US" sz="1600" b="0" i="0" u="none" strike="noStrike" cap="none" normalizeH="0" baseline="0" dirty="0" smtClean="0">
+              <a:rPr kumimoji="0" lang="en-US" sz="1600" b="0" i="0" u="none" strike="noStrike" cap="none" normalizeH="0" baseline="0" dirty="0">
                 <a:ln>
                   <a:noFill/>
                 </a:ln>
@@ -9802,21 +9707,8 @@
                 <a:latin typeface="JetBrains Mono"/>
               </a:rPr>
             </a:br>
-            <a:r>
-              <a:rPr kumimoji="0" lang="en-US" sz="1600" b="0" i="0" u="none" strike="noStrike" cap="none" normalizeH="0" baseline="0" dirty="0" smtClean="0">
-                <a:ln>
-                  <a:noFill/>
-                </a:ln>
-                <a:solidFill>
-                  <a:srgbClr val="080808"/>
-                </a:solidFill>
-                <a:effectLst/>
-                <a:latin typeface="JetBrains Mono"/>
-              </a:rPr>
-              <a:t/>
-            </a:r>
             <a:br>
-              <a:rPr kumimoji="0" lang="en-US" sz="1600" b="0" i="0" u="none" strike="noStrike" cap="none" normalizeH="0" baseline="0" dirty="0" smtClean="0">
+              <a:rPr kumimoji="0" lang="en-US" sz="1600" b="0" i="0" u="none" strike="noStrike" cap="none" normalizeH="0" baseline="0" dirty="0">
                 <a:ln>
                   <a:noFill/>
                 </a:ln>
@@ -9828,7 +9720,7 @@
               </a:rPr>
             </a:br>
             <a:r>
-              <a:rPr kumimoji="0" lang="en-US" sz="1600" b="0" i="0" u="none" strike="noStrike" cap="none" normalizeH="0" baseline="0" dirty="0" smtClean="0">
+              <a:rPr kumimoji="0" lang="en-US" sz="1600" b="0" i="0" u="none" strike="noStrike" cap="none" normalizeH="0" baseline="0" dirty="0">
                 <a:ln>
                   <a:noFill/>
                 </a:ln>
@@ -9841,7 +9733,7 @@
               <a:t>import </a:t>
             </a:r>
             <a:r>
-              <a:rPr kumimoji="0" lang="en-US" sz="1600" b="0" i="0" u="none" strike="noStrike" cap="none" normalizeH="0" baseline="0" dirty="0" smtClean="0">
+              <a:rPr kumimoji="0" lang="en-US" sz="1600" b="0" i="0" u="none" strike="noStrike" cap="none" normalizeH="0" baseline="0" dirty="0">
                 <a:ln>
                   <a:noFill/>
                 </a:ln>
@@ -9854,7 +9746,7 @@
               <a:t>time</a:t>
             </a:r>
             <a:br>
-              <a:rPr kumimoji="0" lang="en-US" sz="1600" b="0" i="0" u="none" strike="noStrike" cap="none" normalizeH="0" baseline="0" dirty="0" smtClean="0">
+              <a:rPr kumimoji="0" lang="en-US" sz="1600" b="0" i="0" u="none" strike="noStrike" cap="none" normalizeH="0" baseline="0" dirty="0">
                 <a:ln>
                   <a:noFill/>
                 </a:ln>
@@ -9866,7 +9758,7 @@
               </a:rPr>
             </a:br>
             <a:r>
-              <a:rPr kumimoji="0" lang="en-US" sz="1600" b="0" i="0" u="none" strike="noStrike" cap="none" normalizeH="0" baseline="0" dirty="0" smtClean="0">
+              <a:rPr kumimoji="0" lang="en-US" sz="1600" b="0" i="0" u="none" strike="noStrike" cap="none" normalizeH="0" baseline="0" dirty="0">
                 <a:ln>
                   <a:noFill/>
                 </a:ln>
@@ -9879,7 +9771,7 @@
               <a:t>import </a:t>
             </a:r>
             <a:r>
-              <a:rPr kumimoji="0" lang="en-US" sz="1600" b="0" i="0" u="none" strike="noStrike" cap="none" normalizeH="0" baseline="0" dirty="0" err="1" smtClean="0">
+              <a:rPr kumimoji="0" lang="en-US" sz="1600" b="0" i="0" u="none" strike="noStrike" cap="none" normalizeH="0" baseline="0" dirty="0" err="1">
                 <a:ln>
                   <a:noFill/>
                 </a:ln>
@@ -9891,21 +9783,8 @@
               </a:rPr>
               <a:t>serial.tools.list_ports</a:t>
             </a:r>
-            <a:r>
-              <a:rPr kumimoji="0" lang="en-US" sz="1600" b="0" i="0" u="none" strike="noStrike" cap="none" normalizeH="0" baseline="0" dirty="0" smtClean="0">
-                <a:ln>
-                  <a:noFill/>
-                </a:ln>
-                <a:solidFill>
-                  <a:srgbClr val="080808"/>
-                </a:solidFill>
-                <a:effectLst/>
-                <a:latin typeface="JetBrains Mono"/>
-              </a:rPr>
-              <a:t/>
-            </a:r>
             <a:br>
-              <a:rPr kumimoji="0" lang="en-US" sz="1600" b="0" i="0" u="none" strike="noStrike" cap="none" normalizeH="0" baseline="0" dirty="0" smtClean="0">
+              <a:rPr kumimoji="0" lang="en-US" sz="1600" b="0" i="0" u="none" strike="noStrike" cap="none" normalizeH="0" baseline="0" dirty="0">
                 <a:ln>
                   <a:noFill/>
                 </a:ln>
@@ -9916,21 +9795,8 @@
                 <a:latin typeface="JetBrains Mono"/>
               </a:rPr>
             </a:br>
-            <a:r>
-              <a:rPr kumimoji="0" lang="en-US" sz="1600" b="0" i="0" u="none" strike="noStrike" cap="none" normalizeH="0" baseline="0" dirty="0" smtClean="0">
-                <a:ln>
-                  <a:noFill/>
-                </a:ln>
-                <a:solidFill>
-                  <a:srgbClr val="080808"/>
-                </a:solidFill>
-                <a:effectLst/>
-                <a:latin typeface="JetBrains Mono"/>
-              </a:rPr>
-              <a:t/>
-            </a:r>
             <a:br>
-              <a:rPr kumimoji="0" lang="en-US" sz="1600" b="0" i="0" u="none" strike="noStrike" cap="none" normalizeH="0" baseline="0" dirty="0" smtClean="0">
+              <a:rPr kumimoji="0" lang="en-US" sz="1600" b="0" i="0" u="none" strike="noStrike" cap="none" normalizeH="0" baseline="0" dirty="0">
                 <a:ln>
                   <a:noFill/>
                 </a:ln>
@@ -9942,7 +9808,7 @@
               </a:rPr>
             </a:br>
             <a:r>
-              <a:rPr kumimoji="0" lang="en-US" sz="1600" b="0" i="0" u="none" strike="noStrike" cap="none" normalizeH="0" baseline="0" dirty="0" smtClean="0">
+              <a:rPr kumimoji="0" lang="en-US" sz="1600" b="0" i="0" u="none" strike="noStrike" cap="none" normalizeH="0" baseline="0" dirty="0">
                 <a:ln>
                   <a:noFill/>
                 </a:ln>
@@ -9955,7 +9821,7 @@
               <a:t>try</a:t>
             </a:r>
             <a:r>
-              <a:rPr kumimoji="0" lang="en-US" sz="1600" b="0" i="0" u="none" strike="noStrike" cap="none" normalizeH="0" baseline="0" dirty="0" smtClean="0">
+              <a:rPr kumimoji="0" lang="en-US" sz="1600" b="0" i="0" u="none" strike="noStrike" cap="none" normalizeH="0" baseline="0" dirty="0">
                 <a:ln>
                   <a:noFill/>
                 </a:ln>
@@ -9968,7 +9834,7 @@
               <a:t>:</a:t>
             </a:r>
             <a:br>
-              <a:rPr kumimoji="0" lang="en-US" sz="1600" b="0" i="0" u="none" strike="noStrike" cap="none" normalizeH="0" baseline="0" dirty="0" smtClean="0">
+              <a:rPr kumimoji="0" lang="en-US" sz="1600" b="0" i="0" u="none" strike="noStrike" cap="none" normalizeH="0" baseline="0" dirty="0">
                 <a:ln>
                   <a:noFill/>
                 </a:ln>
@@ -9980,7 +9846,7 @@
               </a:rPr>
             </a:br>
             <a:r>
-              <a:rPr kumimoji="0" lang="en-US" sz="1600" b="0" i="0" u="none" strike="noStrike" cap="none" normalizeH="0" baseline="0" dirty="0" smtClean="0">
+              <a:rPr kumimoji="0" lang="en-US" sz="1600" b="0" i="0" u="none" strike="noStrike" cap="none" normalizeH="0" baseline="0" dirty="0">
                 <a:ln>
                   <a:noFill/>
                 </a:ln>
@@ -9993,7 +9859,7 @@
               <a:t>    </a:t>
             </a:r>
             <a:r>
-              <a:rPr kumimoji="0" lang="en-US" sz="1600" b="0" i="0" u="none" strike="noStrike" cap="none" normalizeH="0" baseline="0" dirty="0" err="1" smtClean="0">
+              <a:rPr kumimoji="0" lang="en-US" sz="1600" b="0" i="0" u="none" strike="noStrike" cap="none" normalizeH="0" baseline="0" dirty="0" err="1">
                 <a:ln>
                   <a:noFill/>
                 </a:ln>
@@ -10006,7 +9872,7 @@
               <a:t>ser</a:t>
             </a:r>
             <a:r>
-              <a:rPr kumimoji="0" lang="en-US" sz="1600" b="0" i="0" u="none" strike="noStrike" cap="none" normalizeH="0" baseline="0" dirty="0" smtClean="0">
+              <a:rPr kumimoji="0" lang="en-US" sz="1600" b="0" i="0" u="none" strike="noStrike" cap="none" normalizeH="0" baseline="0" dirty="0">
                 <a:ln>
                   <a:noFill/>
                 </a:ln>
@@ -10019,7 +9885,7 @@
               <a:t> = </a:t>
             </a:r>
             <a:r>
-              <a:rPr kumimoji="0" lang="en-US" sz="1600" b="0" i="0" u="none" strike="noStrike" cap="none" normalizeH="0" baseline="0" dirty="0" err="1" smtClean="0">
+              <a:rPr kumimoji="0" lang="en-US" sz="1600" b="0" i="0" u="none" strike="noStrike" cap="none" normalizeH="0" baseline="0" dirty="0" err="1">
                 <a:ln>
                   <a:noFill/>
                 </a:ln>
@@ -10032,7 +9898,7 @@
               <a:t>serial.Serial</a:t>
             </a:r>
             <a:r>
-              <a:rPr kumimoji="0" lang="en-US" sz="1600" b="0" i="0" u="none" strike="noStrike" cap="none" normalizeH="0" baseline="0" dirty="0" smtClean="0">
+              <a:rPr kumimoji="0" lang="en-US" sz="1600" b="0" i="0" u="none" strike="noStrike" cap="none" normalizeH="0" baseline="0" dirty="0">
                 <a:ln>
                   <a:noFill/>
                 </a:ln>
@@ -10045,7 +9911,7 @@
               <a:t>(</a:t>
             </a:r>
             <a:r>
-              <a:rPr kumimoji="0" lang="en-US" sz="1600" b="0" i="0" u="none" strike="noStrike" cap="none" normalizeH="0" baseline="0" dirty="0" smtClean="0">
+              <a:rPr kumimoji="0" lang="en-US" sz="1600" b="0" i="0" u="none" strike="noStrike" cap="none" normalizeH="0" baseline="0" dirty="0">
                 <a:ln>
                   <a:noFill/>
                 </a:ln>
@@ -10058,7 +9924,7 @@
               <a:t>port</a:t>
             </a:r>
             <a:r>
-              <a:rPr kumimoji="0" lang="en-US" sz="1600" b="0" i="0" u="none" strike="noStrike" cap="none" normalizeH="0" baseline="0" dirty="0" smtClean="0">
+              <a:rPr kumimoji="0" lang="en-US" sz="1600" b="0" i="0" u="none" strike="noStrike" cap="none" normalizeH="0" baseline="0" dirty="0">
                 <a:ln>
                   <a:noFill/>
                 </a:ln>
@@ -10071,7 +9937,7 @@
               <a:t>=</a:t>
             </a:r>
             <a:r>
-              <a:rPr kumimoji="0" lang="en-US" sz="1600" b="0" i="0" u="none" strike="noStrike" cap="none" normalizeH="0" baseline="0" dirty="0" smtClean="0">
+              <a:rPr kumimoji="0" lang="en-US" sz="1600" b="0" i="0" u="none" strike="noStrike" cap="none" normalizeH="0" baseline="0" dirty="0">
                 <a:ln>
                   <a:noFill/>
                 </a:ln>
@@ -10084,7 +9950,7 @@
               <a:t>"COM8"</a:t>
             </a:r>
             <a:r>
-              <a:rPr kumimoji="0" lang="en-US" sz="1600" b="0" i="0" u="none" strike="noStrike" cap="none" normalizeH="0" baseline="0" dirty="0" smtClean="0">
+              <a:rPr kumimoji="0" lang="en-US" sz="1600" b="0" i="0" u="none" strike="noStrike" cap="none" normalizeH="0" baseline="0" dirty="0">
                 <a:ln>
                   <a:noFill/>
                 </a:ln>
@@ -10097,7 +9963,7 @@
               <a:t>, </a:t>
             </a:r>
             <a:r>
-              <a:rPr kumimoji="0" lang="en-US" sz="1600" b="0" i="0" u="none" strike="noStrike" cap="none" normalizeH="0" baseline="0" dirty="0" err="1" smtClean="0">
+              <a:rPr kumimoji="0" lang="en-US" sz="1600" b="0" i="0" u="none" strike="noStrike" cap="none" normalizeH="0" baseline="0" dirty="0" err="1">
                 <a:ln>
                   <a:noFill/>
                 </a:ln>
@@ -10110,7 +9976,7 @@
               <a:t>baudrate</a:t>
             </a:r>
             <a:r>
-              <a:rPr kumimoji="0" lang="en-US" sz="1600" b="0" i="0" u="none" strike="noStrike" cap="none" normalizeH="0" baseline="0" dirty="0" smtClean="0">
+              <a:rPr kumimoji="0" lang="en-US" sz="1600" b="0" i="0" u="none" strike="noStrike" cap="none" normalizeH="0" baseline="0" dirty="0">
                 <a:ln>
                   <a:noFill/>
                 </a:ln>
@@ -10123,7 +9989,7 @@
               <a:t>=</a:t>
             </a:r>
             <a:r>
-              <a:rPr kumimoji="0" lang="en-US" sz="1600" b="0" i="0" u="none" strike="noStrike" cap="none" normalizeH="0" baseline="0" dirty="0" smtClean="0">
+              <a:rPr kumimoji="0" lang="en-US" sz="1600" b="0" i="0" u="none" strike="noStrike" cap="none" normalizeH="0" baseline="0" dirty="0">
                 <a:ln>
                   <a:noFill/>
                 </a:ln>
@@ -10136,7 +10002,7 @@
               <a:t>115200</a:t>
             </a:r>
             <a:r>
-              <a:rPr kumimoji="0" lang="en-US" sz="1600" b="0" i="0" u="none" strike="noStrike" cap="none" normalizeH="0" baseline="0" dirty="0" smtClean="0">
+              <a:rPr kumimoji="0" lang="en-US" sz="1600" b="0" i="0" u="none" strike="noStrike" cap="none" normalizeH="0" baseline="0" dirty="0">
                 <a:ln>
                   <a:noFill/>
                 </a:ln>
@@ -10149,7 +10015,7 @@
               <a:t>)</a:t>
             </a:r>
             <a:br>
-              <a:rPr kumimoji="0" lang="en-US" sz="1600" b="0" i="0" u="none" strike="noStrike" cap="none" normalizeH="0" baseline="0" dirty="0" smtClean="0">
+              <a:rPr kumimoji="0" lang="en-US" sz="1600" b="0" i="0" u="none" strike="noStrike" cap="none" normalizeH="0" baseline="0" dirty="0">
                 <a:ln>
                   <a:noFill/>
                 </a:ln>
@@ -10161,7 +10027,7 @@
               </a:rPr>
             </a:br>
             <a:r>
-              <a:rPr kumimoji="0" lang="en-US" sz="1600" b="0" i="0" u="none" strike="noStrike" cap="none" normalizeH="0" baseline="0" dirty="0" smtClean="0">
+              <a:rPr kumimoji="0" lang="en-US" sz="1600" b="0" i="0" u="none" strike="noStrike" cap="none" normalizeH="0" baseline="0" dirty="0">
                 <a:ln>
                   <a:noFill/>
                 </a:ln>
@@ -10174,7 +10040,7 @@
               <a:t>except</a:t>
             </a:r>
             <a:r>
-              <a:rPr kumimoji="0" lang="en-US" sz="1600" b="0" i="0" u="none" strike="noStrike" cap="none" normalizeH="0" baseline="0" dirty="0" smtClean="0">
+              <a:rPr kumimoji="0" lang="en-US" sz="1600" b="0" i="0" u="none" strike="noStrike" cap="none" normalizeH="0" baseline="0" dirty="0">
                 <a:ln>
                   <a:noFill/>
                 </a:ln>
@@ -10187,7 +10053,7 @@
               <a:t>:</a:t>
             </a:r>
             <a:br>
-              <a:rPr kumimoji="0" lang="en-US" sz="1600" b="0" i="0" u="none" strike="noStrike" cap="none" normalizeH="0" baseline="0" dirty="0" smtClean="0">
+              <a:rPr kumimoji="0" lang="en-US" sz="1600" b="0" i="0" u="none" strike="noStrike" cap="none" normalizeH="0" baseline="0" dirty="0">
                 <a:ln>
                   <a:noFill/>
                 </a:ln>
@@ -10199,7 +10065,7 @@
               </a:rPr>
             </a:br>
             <a:r>
-              <a:rPr kumimoji="0" lang="en-US" sz="1600" b="0" i="0" u="none" strike="noStrike" cap="none" normalizeH="0" baseline="0" dirty="0" smtClean="0">
+              <a:rPr kumimoji="0" lang="en-US" sz="1600" b="0" i="0" u="none" strike="noStrike" cap="none" normalizeH="0" baseline="0" dirty="0">
                 <a:ln>
                   <a:noFill/>
                 </a:ln>
@@ -10212,7 +10078,7 @@
               <a:t>    </a:t>
             </a:r>
             <a:r>
-              <a:rPr kumimoji="0" lang="en-US" sz="1600" b="0" i="0" u="none" strike="noStrike" cap="none" normalizeH="0" baseline="0" dirty="0" smtClean="0">
+              <a:rPr kumimoji="0" lang="en-US" sz="1600" b="0" i="0" u="none" strike="noStrike" cap="none" normalizeH="0" baseline="0" dirty="0">
                 <a:ln>
                   <a:noFill/>
                 </a:ln>
@@ -10225,7 +10091,7 @@
               <a:t>print</a:t>
             </a:r>
             <a:r>
-              <a:rPr kumimoji="0" lang="en-US" sz="1600" b="0" i="0" u="none" strike="noStrike" cap="none" normalizeH="0" baseline="0" dirty="0" smtClean="0">
+              <a:rPr kumimoji="0" lang="en-US" sz="1600" b="0" i="0" u="none" strike="noStrike" cap="none" normalizeH="0" baseline="0" dirty="0">
                 <a:ln>
                   <a:noFill/>
                 </a:ln>
@@ -10238,7 +10104,7 @@
               <a:t>(</a:t>
             </a:r>
             <a:r>
-              <a:rPr kumimoji="0" lang="en-US" sz="1600" b="0" i="0" u="none" strike="noStrike" cap="none" normalizeH="0" baseline="0" dirty="0" smtClean="0">
+              <a:rPr kumimoji="0" lang="en-US" sz="1600" b="0" i="0" u="none" strike="noStrike" cap="none" normalizeH="0" baseline="0" dirty="0">
                 <a:ln>
                   <a:noFill/>
                 </a:ln>
@@ -10251,7 +10117,7 @@
               <a:t>"Can not open the port"</a:t>
             </a:r>
             <a:r>
-              <a:rPr kumimoji="0" lang="en-US" sz="1600" b="0" i="0" u="none" strike="noStrike" cap="none" normalizeH="0" baseline="0" dirty="0" smtClean="0">
+              <a:rPr kumimoji="0" lang="en-US" sz="1600" b="0" i="0" u="none" strike="noStrike" cap="none" normalizeH="0" baseline="0" dirty="0">
                 <a:ln>
                   <a:noFill/>
                 </a:ln>
@@ -10264,7 +10130,7 @@
               <a:t>)</a:t>
             </a:r>
             <a:br>
-              <a:rPr kumimoji="0" lang="en-US" sz="1600" b="0" i="0" u="none" strike="noStrike" cap="none" normalizeH="0" baseline="0" dirty="0" smtClean="0">
+              <a:rPr kumimoji="0" lang="en-US" sz="1600" b="0" i="0" u="none" strike="noStrike" cap="none" normalizeH="0" baseline="0" dirty="0">
                 <a:ln>
                   <a:noFill/>
                 </a:ln>
@@ -10275,21 +10141,8 @@
                 <a:latin typeface="JetBrains Mono"/>
               </a:rPr>
             </a:br>
-            <a:r>
-              <a:rPr kumimoji="0" lang="en-US" sz="1600" b="0" i="0" u="none" strike="noStrike" cap="none" normalizeH="0" baseline="0" dirty="0" smtClean="0">
-                <a:ln>
-                  <a:noFill/>
-                </a:ln>
-                <a:solidFill>
-                  <a:srgbClr val="080808"/>
-                </a:solidFill>
-                <a:effectLst/>
-                <a:latin typeface="JetBrains Mono"/>
-              </a:rPr>
-              <a:t/>
-            </a:r>
             <a:br>
-              <a:rPr kumimoji="0" lang="en-US" sz="1600" b="0" i="0" u="none" strike="noStrike" cap="none" normalizeH="0" baseline="0" dirty="0" smtClean="0">
+              <a:rPr kumimoji="0" lang="en-US" sz="1600" b="0" i="0" u="none" strike="noStrike" cap="none" normalizeH="0" baseline="0" dirty="0">
                 <a:ln>
                   <a:noFill/>
                 </a:ln>
@@ -10301,7 +10154,7 @@
               </a:rPr>
             </a:br>
             <a:r>
-              <a:rPr kumimoji="0" lang="en-US" sz="1600" b="0" i="0" u="none" strike="noStrike" cap="none" normalizeH="0" baseline="0" dirty="0" err="1" smtClean="0">
+              <a:rPr kumimoji="0" lang="en-US" sz="1600" b="0" i="0" u="none" strike="noStrike" cap="none" normalizeH="0" baseline="0" dirty="0" err="1">
                 <a:ln>
                   <a:noFill/>
                 </a:ln>
@@ -10314,7 +10167,7 @@
               <a:t>def</a:t>
             </a:r>
             <a:r>
-              <a:rPr kumimoji="0" lang="en-US" sz="1600" b="0" i="0" u="none" strike="noStrike" cap="none" normalizeH="0" baseline="0" dirty="0" smtClean="0">
+              <a:rPr kumimoji="0" lang="en-US" sz="1600" b="0" i="0" u="none" strike="noStrike" cap="none" normalizeH="0" baseline="0" dirty="0">
                 <a:ln>
                   <a:noFill/>
                 </a:ln>
@@ -10327,7 +10180,7 @@
               <a:t> </a:t>
             </a:r>
             <a:r>
-              <a:rPr kumimoji="0" lang="en-US" sz="1600" b="0" i="0" u="none" strike="noStrike" cap="none" normalizeH="0" baseline="0" dirty="0" err="1" smtClean="0">
+              <a:rPr kumimoji="0" lang="en-US" sz="1600" b="0" i="0" u="none" strike="noStrike" cap="none" normalizeH="0" baseline="0" dirty="0" err="1">
                 <a:ln>
                   <a:noFill/>
                 </a:ln>
@@ -10340,7 +10193,7 @@
               <a:t>sendCommand</a:t>
             </a:r>
             <a:r>
-              <a:rPr kumimoji="0" lang="en-US" sz="1600" b="0" i="0" u="none" strike="noStrike" cap="none" normalizeH="0" baseline="0" dirty="0" smtClean="0">
+              <a:rPr kumimoji="0" lang="en-US" sz="1600" b="0" i="0" u="none" strike="noStrike" cap="none" normalizeH="0" baseline="0" dirty="0">
                 <a:ln>
                   <a:noFill/>
                 </a:ln>
@@ -10353,7 +10206,7 @@
               <a:t>(</a:t>
             </a:r>
             <a:r>
-              <a:rPr kumimoji="0" lang="en-US" sz="1600" b="0" i="0" u="none" strike="noStrike" cap="none" normalizeH="0" baseline="0" dirty="0" err="1" smtClean="0">
+              <a:rPr kumimoji="0" lang="en-US" sz="1600" b="0" i="0" u="none" strike="noStrike" cap="none" normalizeH="0" baseline="0" dirty="0" err="1">
                 <a:ln>
                   <a:noFill/>
                 </a:ln>
@@ -10366,7 +10219,7 @@
               <a:t>cmd</a:t>
             </a:r>
             <a:r>
-              <a:rPr kumimoji="0" lang="en-US" sz="1600" b="0" i="0" u="none" strike="noStrike" cap="none" normalizeH="0" baseline="0" dirty="0" smtClean="0">
+              <a:rPr kumimoji="0" lang="en-US" sz="1600" b="0" i="0" u="none" strike="noStrike" cap="none" normalizeH="0" baseline="0" dirty="0">
                 <a:ln>
                   <a:noFill/>
                 </a:ln>
@@ -10379,7 +10232,7 @@
               <a:t>):</a:t>
             </a:r>
             <a:br>
-              <a:rPr kumimoji="0" lang="en-US" sz="1600" b="0" i="0" u="none" strike="noStrike" cap="none" normalizeH="0" baseline="0" dirty="0" smtClean="0">
+              <a:rPr kumimoji="0" lang="en-US" sz="1600" b="0" i="0" u="none" strike="noStrike" cap="none" normalizeH="0" baseline="0" dirty="0">
                 <a:ln>
                   <a:noFill/>
                 </a:ln>
@@ -10391,7 +10244,7 @@
               </a:rPr>
             </a:br>
             <a:r>
-              <a:rPr kumimoji="0" lang="en-US" sz="1600" b="0" i="0" u="none" strike="noStrike" cap="none" normalizeH="0" baseline="0" dirty="0" smtClean="0">
+              <a:rPr kumimoji="0" lang="en-US" sz="1600" b="0" i="0" u="none" strike="noStrike" cap="none" normalizeH="0" baseline="0" dirty="0">
                 <a:ln>
                   <a:noFill/>
                 </a:ln>
@@ -10404,7 +10257,7 @@
               <a:t>    </a:t>
             </a:r>
             <a:r>
-              <a:rPr kumimoji="0" lang="en-US" sz="1600" b="0" i="0" u="none" strike="noStrike" cap="none" normalizeH="0" baseline="0" dirty="0" err="1" smtClean="0">
+              <a:rPr kumimoji="0" lang="en-US" sz="1600" b="0" i="0" u="none" strike="noStrike" cap="none" normalizeH="0" baseline="0" dirty="0" err="1">
                 <a:ln>
                   <a:noFill/>
                 </a:ln>
@@ -10417,7 +10270,7 @@
               <a:t>ser.write</a:t>
             </a:r>
             <a:r>
-              <a:rPr kumimoji="0" lang="en-US" sz="1600" b="0" i="0" u="none" strike="noStrike" cap="none" normalizeH="0" baseline="0" dirty="0" smtClean="0">
+              <a:rPr kumimoji="0" lang="en-US" sz="1600" b="0" i="0" u="none" strike="noStrike" cap="none" normalizeH="0" baseline="0" dirty="0">
                 <a:ln>
                   <a:noFill/>
                 </a:ln>
@@ -10430,7 +10283,7 @@
               <a:t>(</a:t>
             </a:r>
             <a:r>
-              <a:rPr kumimoji="0" lang="en-US" sz="1600" b="0" i="0" u="none" strike="noStrike" cap="none" normalizeH="0" baseline="0" dirty="0" err="1" smtClean="0">
+              <a:rPr kumimoji="0" lang="en-US" sz="1600" b="0" i="0" u="none" strike="noStrike" cap="none" normalizeH="0" baseline="0" dirty="0" err="1">
                 <a:ln>
                   <a:noFill/>
                 </a:ln>
@@ -10443,7 +10296,7 @@
               <a:t>cmd.encode</a:t>
             </a:r>
             <a:r>
-              <a:rPr kumimoji="0" lang="en-US" sz="1600" b="0" i="0" u="none" strike="noStrike" cap="none" normalizeH="0" baseline="0" dirty="0" smtClean="0">
+              <a:rPr kumimoji="0" lang="en-US" sz="1600" b="0" i="0" u="none" strike="noStrike" cap="none" normalizeH="0" baseline="0" dirty="0">
                 <a:ln>
                   <a:noFill/>
                 </a:ln>
@@ -10456,7 +10309,7 @@
               <a:t>())</a:t>
             </a:r>
             <a:br>
-              <a:rPr kumimoji="0" lang="en-US" sz="1600" b="0" i="0" u="none" strike="noStrike" cap="none" normalizeH="0" baseline="0" dirty="0" smtClean="0">
+              <a:rPr kumimoji="0" lang="en-US" sz="1600" b="0" i="0" u="none" strike="noStrike" cap="none" normalizeH="0" baseline="0" dirty="0">
                 <a:ln>
                   <a:noFill/>
                 </a:ln>
@@ -10467,21 +10320,8 @@
                 <a:latin typeface="JetBrains Mono"/>
               </a:rPr>
             </a:br>
-            <a:r>
-              <a:rPr kumimoji="0" lang="en-US" sz="1600" b="0" i="0" u="none" strike="noStrike" cap="none" normalizeH="0" baseline="0" dirty="0" smtClean="0">
-                <a:ln>
-                  <a:noFill/>
-                </a:ln>
-                <a:solidFill>
-                  <a:srgbClr val="080808"/>
-                </a:solidFill>
-                <a:effectLst/>
-                <a:latin typeface="JetBrains Mono"/>
-              </a:rPr>
-              <a:t/>
-            </a:r>
             <a:br>
-              <a:rPr kumimoji="0" lang="en-US" sz="1600" b="0" i="0" u="none" strike="noStrike" cap="none" normalizeH="0" baseline="0" dirty="0" smtClean="0">
+              <a:rPr kumimoji="0" lang="en-US" sz="1600" b="0" i="0" u="none" strike="noStrike" cap="none" normalizeH="0" baseline="0" dirty="0">
                 <a:ln>
                   <a:noFill/>
                 </a:ln>
@@ -10493,7 +10333,7 @@
               </a:rPr>
             </a:br>
             <a:r>
-              <a:rPr kumimoji="0" lang="en-US" sz="1600" b="0" i="0" u="none" strike="noStrike" cap="none" normalizeH="0" baseline="0" dirty="0" smtClean="0">
+              <a:rPr kumimoji="0" lang="en-US" sz="1600" b="0" i="0" u="none" strike="noStrike" cap="none" normalizeH="0" baseline="0" dirty="0">
                 <a:ln>
                   <a:noFill/>
                 </a:ln>
@@ -10506,7 +10346,7 @@
               <a:t>while True</a:t>
             </a:r>
             <a:r>
-              <a:rPr kumimoji="0" lang="en-US" sz="1600" b="0" i="0" u="none" strike="noStrike" cap="none" normalizeH="0" baseline="0" dirty="0" smtClean="0">
+              <a:rPr kumimoji="0" lang="en-US" sz="1600" b="0" i="0" u="none" strike="noStrike" cap="none" normalizeH="0" baseline="0" dirty="0">
                 <a:ln>
                   <a:noFill/>
                 </a:ln>
@@ -10519,7 +10359,7 @@
               <a:t>:</a:t>
             </a:r>
             <a:br>
-              <a:rPr kumimoji="0" lang="en-US" sz="1600" b="0" i="0" u="none" strike="noStrike" cap="none" normalizeH="0" baseline="0" dirty="0" smtClean="0">
+              <a:rPr kumimoji="0" lang="en-US" sz="1600" b="0" i="0" u="none" strike="noStrike" cap="none" normalizeH="0" baseline="0" dirty="0">
                 <a:ln>
                   <a:noFill/>
                 </a:ln>
@@ -10531,7 +10371,7 @@
               </a:rPr>
             </a:br>
             <a:r>
-              <a:rPr kumimoji="0" lang="en-US" sz="1600" b="0" i="0" u="none" strike="noStrike" cap="none" normalizeH="0" baseline="0" dirty="0" smtClean="0">
+              <a:rPr kumimoji="0" lang="en-US" sz="1600" b="0" i="0" u="none" strike="noStrike" cap="none" normalizeH="0" baseline="0" dirty="0">
                 <a:ln>
                   <a:noFill/>
                 </a:ln>
@@ -10544,7 +10384,7 @@
               <a:t>    </a:t>
             </a:r>
             <a:r>
-              <a:rPr kumimoji="0" lang="en-US" sz="1600" b="0" i="0" u="none" strike="noStrike" cap="none" normalizeH="0" baseline="0" dirty="0" smtClean="0">
+              <a:rPr kumimoji="0" lang="en-US" sz="1600" b="0" i="0" u="none" strike="noStrike" cap="none" normalizeH="0" baseline="0" dirty="0">
                 <a:ln>
                   <a:noFill/>
                 </a:ln>
@@ -10557,7 +10397,7 @@
               <a:t>print</a:t>
             </a:r>
             <a:r>
-              <a:rPr kumimoji="0" lang="en-US" sz="1600" b="0" i="0" u="none" strike="noStrike" cap="none" normalizeH="0" baseline="0" dirty="0" smtClean="0">
+              <a:rPr kumimoji="0" lang="en-US" sz="1600" b="0" i="0" u="none" strike="noStrike" cap="none" normalizeH="0" baseline="0" dirty="0">
                 <a:ln>
                   <a:noFill/>
                 </a:ln>
@@ -10570,7 +10410,7 @@
               <a:t>(</a:t>
             </a:r>
             <a:r>
-              <a:rPr kumimoji="0" lang="en-US" sz="1600" b="0" i="0" u="none" strike="noStrike" cap="none" normalizeH="0" baseline="0" dirty="0" smtClean="0">
+              <a:rPr kumimoji="0" lang="en-US" sz="1600" b="0" i="0" u="none" strike="noStrike" cap="none" normalizeH="0" baseline="0" dirty="0">
                 <a:ln>
                   <a:noFill/>
                 </a:ln>
@@ -10583,7 +10423,7 @@
               <a:t>"Testing commands"</a:t>
             </a:r>
             <a:r>
-              <a:rPr kumimoji="0" lang="en-US" sz="1600" b="0" i="0" u="none" strike="noStrike" cap="none" normalizeH="0" baseline="0" dirty="0" smtClean="0">
+              <a:rPr kumimoji="0" lang="en-US" sz="1600" b="0" i="0" u="none" strike="noStrike" cap="none" normalizeH="0" baseline="0" dirty="0">
                 <a:ln>
                   <a:noFill/>
                 </a:ln>
@@ -10596,7 +10436,7 @@
               <a:t>)</a:t>
             </a:r>
             <a:br>
-              <a:rPr kumimoji="0" lang="en-US" sz="1600" b="0" i="0" u="none" strike="noStrike" cap="none" normalizeH="0" baseline="0" dirty="0" smtClean="0">
+              <a:rPr kumimoji="0" lang="en-US" sz="1600" b="0" i="0" u="none" strike="noStrike" cap="none" normalizeH="0" baseline="0" dirty="0">
                 <a:ln>
                   <a:noFill/>
                 </a:ln>
@@ -10608,7 +10448,7 @@
               </a:rPr>
             </a:br>
             <a:r>
-              <a:rPr kumimoji="0" lang="en-US" sz="1600" b="0" i="0" u="none" strike="noStrike" cap="none" normalizeH="0" baseline="0" dirty="0" smtClean="0">
+              <a:rPr kumimoji="0" lang="en-US" sz="1600" b="0" i="0" u="none" strike="noStrike" cap="none" normalizeH="0" baseline="0" dirty="0">
                 <a:ln>
                   <a:noFill/>
                 </a:ln>
@@ -10621,7 +10461,7 @@
               <a:t>    </a:t>
             </a:r>
             <a:r>
-              <a:rPr kumimoji="0" lang="en-US" sz="1600" b="0" i="0" u="none" strike="noStrike" cap="none" normalizeH="0" baseline="0" dirty="0" err="1" smtClean="0">
+              <a:rPr kumimoji="0" lang="en-US" sz="1600" b="0" i="0" u="none" strike="noStrike" cap="none" normalizeH="0" baseline="0" dirty="0" err="1">
                 <a:ln>
                   <a:noFill/>
                 </a:ln>
@@ -10634,7 +10474,7 @@
               <a:t>sendCommand</a:t>
             </a:r>
             <a:r>
-              <a:rPr kumimoji="0" lang="en-US" sz="1600" b="0" i="0" u="none" strike="noStrike" cap="none" normalizeH="0" baseline="0" dirty="0" smtClean="0">
+              <a:rPr kumimoji="0" lang="en-US" sz="1600" b="0" i="0" u="none" strike="noStrike" cap="none" normalizeH="0" baseline="0" dirty="0">
                 <a:ln>
                   <a:noFill/>
                 </a:ln>
@@ -10647,7 +10487,7 @@
               <a:t>(</a:t>
             </a:r>
             <a:r>
-              <a:rPr kumimoji="0" lang="en-US" sz="1600" b="0" i="0" u="none" strike="noStrike" cap="none" normalizeH="0" baseline="0" dirty="0" smtClean="0">
+              <a:rPr kumimoji="0" lang="en-US" sz="1600" b="0" i="0" u="none" strike="noStrike" cap="none" normalizeH="0" baseline="0" dirty="0">
                 <a:ln>
                   <a:noFill/>
                 </a:ln>
@@ -10660,7 +10500,7 @@
               <a:t>"2"</a:t>
             </a:r>
             <a:r>
-              <a:rPr kumimoji="0" lang="en-US" sz="1600" b="0" i="0" u="none" strike="noStrike" cap="none" normalizeH="0" baseline="0" dirty="0" smtClean="0">
+              <a:rPr kumimoji="0" lang="en-US" sz="1600" b="0" i="0" u="none" strike="noStrike" cap="none" normalizeH="0" baseline="0" dirty="0">
                 <a:ln>
                   <a:noFill/>
                 </a:ln>
@@ -10673,7 +10513,7 @@
               <a:t>)</a:t>
             </a:r>
             <a:br>
-              <a:rPr kumimoji="0" lang="en-US" sz="1600" b="0" i="0" u="none" strike="noStrike" cap="none" normalizeH="0" baseline="0" dirty="0" smtClean="0">
+              <a:rPr kumimoji="0" lang="en-US" sz="1600" b="0" i="0" u="none" strike="noStrike" cap="none" normalizeH="0" baseline="0" dirty="0">
                 <a:ln>
                   <a:noFill/>
                 </a:ln>
@@ -10685,7 +10525,7 @@
               </a:rPr>
             </a:br>
             <a:r>
-              <a:rPr kumimoji="0" lang="en-US" sz="1600" b="0" i="0" u="none" strike="noStrike" cap="none" normalizeH="0" baseline="0" dirty="0" smtClean="0">
+              <a:rPr kumimoji="0" lang="en-US" sz="1600" b="0" i="0" u="none" strike="noStrike" cap="none" normalizeH="0" baseline="0" dirty="0">
                 <a:ln>
                   <a:noFill/>
                 </a:ln>
@@ -10698,7 +10538,7 @@
               <a:t>    </a:t>
             </a:r>
             <a:r>
-              <a:rPr kumimoji="0" lang="en-US" sz="1600" b="0" i="0" u="none" strike="noStrike" cap="none" normalizeH="0" baseline="0" dirty="0" err="1" smtClean="0">
+              <a:rPr kumimoji="0" lang="en-US" sz="1600" b="0" i="0" u="none" strike="noStrike" cap="none" normalizeH="0" baseline="0" dirty="0" err="1">
                 <a:ln>
                   <a:noFill/>
                 </a:ln>
@@ -10711,7 +10551,7 @@
               <a:t>time.sleep</a:t>
             </a:r>
             <a:r>
-              <a:rPr kumimoji="0" lang="en-US" sz="1600" b="0" i="0" u="none" strike="noStrike" cap="none" normalizeH="0" baseline="0" dirty="0" smtClean="0">
+              <a:rPr kumimoji="0" lang="en-US" sz="1600" b="0" i="0" u="none" strike="noStrike" cap="none" normalizeH="0" baseline="0" dirty="0">
                 <a:ln>
                   <a:noFill/>
                 </a:ln>
@@ -10724,7 +10564,7 @@
               <a:t>(</a:t>
             </a:r>
             <a:r>
-              <a:rPr kumimoji="0" lang="en-US" sz="1600" b="0" i="0" u="none" strike="noStrike" cap="none" normalizeH="0" baseline="0" dirty="0" smtClean="0">
+              <a:rPr kumimoji="0" lang="en-US" sz="1600" b="0" i="0" u="none" strike="noStrike" cap="none" normalizeH="0" baseline="0" dirty="0">
                 <a:ln>
                   <a:noFill/>
                 </a:ln>
@@ -10737,7 +10577,7 @@
               <a:t>2</a:t>
             </a:r>
             <a:r>
-              <a:rPr kumimoji="0" lang="en-US" sz="1600" b="0" i="0" u="none" strike="noStrike" cap="none" normalizeH="0" baseline="0" dirty="0" smtClean="0">
+              <a:rPr kumimoji="0" lang="en-US" sz="1600" b="0" i="0" u="none" strike="noStrike" cap="none" normalizeH="0" baseline="0" dirty="0">
                 <a:ln>
                   <a:noFill/>
                 </a:ln>
@@ -10750,7 +10590,7 @@
               <a:t>)</a:t>
             </a:r>
             <a:br>
-              <a:rPr kumimoji="0" lang="en-US" sz="1600" b="0" i="0" u="none" strike="noStrike" cap="none" normalizeH="0" baseline="0" dirty="0" smtClean="0">
+              <a:rPr kumimoji="0" lang="en-US" sz="1600" b="0" i="0" u="none" strike="noStrike" cap="none" normalizeH="0" baseline="0" dirty="0">
                 <a:ln>
                   <a:noFill/>
                 </a:ln>
@@ -10762,7 +10602,7 @@
               </a:rPr>
             </a:br>
             <a:r>
-              <a:rPr kumimoji="0" lang="en-US" sz="1600" b="0" i="0" u="none" strike="noStrike" cap="none" normalizeH="0" baseline="0" dirty="0" smtClean="0">
+              <a:rPr kumimoji="0" lang="en-US" sz="1600" b="0" i="0" u="none" strike="noStrike" cap="none" normalizeH="0" baseline="0" dirty="0">
                 <a:ln>
                   <a:noFill/>
                 </a:ln>
@@ -10775,7 +10615,7 @@
               <a:t>    </a:t>
             </a:r>
             <a:r>
-              <a:rPr kumimoji="0" lang="en-US" sz="1600" b="0" i="0" u="none" strike="noStrike" cap="none" normalizeH="0" baseline="0" dirty="0" err="1" smtClean="0">
+              <a:rPr kumimoji="0" lang="en-US" sz="1600" b="0" i="0" u="none" strike="noStrike" cap="none" normalizeH="0" baseline="0" dirty="0" err="1">
                 <a:ln>
                   <a:noFill/>
                 </a:ln>
@@ -10788,7 +10628,7 @@
               <a:t>sendCommand</a:t>
             </a:r>
             <a:r>
-              <a:rPr kumimoji="0" lang="en-US" sz="1600" b="0" i="0" u="none" strike="noStrike" cap="none" normalizeH="0" baseline="0" dirty="0" smtClean="0">
+              <a:rPr kumimoji="0" lang="en-US" sz="1600" b="0" i="0" u="none" strike="noStrike" cap="none" normalizeH="0" baseline="0" dirty="0">
                 <a:ln>
                   <a:noFill/>
                 </a:ln>
@@ -10801,7 +10641,7 @@
               <a:t>(</a:t>
             </a:r>
             <a:r>
-              <a:rPr kumimoji="0" lang="en-US" sz="1600" b="0" i="0" u="none" strike="noStrike" cap="none" normalizeH="0" baseline="0" dirty="0" smtClean="0">
+              <a:rPr kumimoji="0" lang="en-US" sz="1600" b="0" i="0" u="none" strike="noStrike" cap="none" normalizeH="0" baseline="0" dirty="0">
                 <a:ln>
                   <a:noFill/>
                 </a:ln>
@@ -10814,7 +10654,7 @@
               <a:t>"3"</a:t>
             </a:r>
             <a:r>
-              <a:rPr kumimoji="0" lang="en-US" sz="1600" b="0" i="0" u="none" strike="noStrike" cap="none" normalizeH="0" baseline="0" dirty="0" smtClean="0">
+              <a:rPr kumimoji="0" lang="en-US" sz="1600" b="0" i="0" u="none" strike="noStrike" cap="none" normalizeH="0" baseline="0" dirty="0">
                 <a:ln>
                   <a:noFill/>
                 </a:ln>
@@ -10827,7 +10667,7 @@
               <a:t>)</a:t>
             </a:r>
             <a:br>
-              <a:rPr kumimoji="0" lang="en-US" sz="1600" b="0" i="0" u="none" strike="noStrike" cap="none" normalizeH="0" baseline="0" dirty="0" smtClean="0">
+              <a:rPr kumimoji="0" lang="en-US" sz="1600" b="0" i="0" u="none" strike="noStrike" cap="none" normalizeH="0" baseline="0" dirty="0">
                 <a:ln>
                   <a:noFill/>
                 </a:ln>
@@ -10839,7 +10679,7 @@
               </a:rPr>
             </a:br>
             <a:r>
-              <a:rPr kumimoji="0" lang="en-US" sz="1600" b="0" i="0" u="none" strike="noStrike" cap="none" normalizeH="0" baseline="0" dirty="0" smtClean="0">
+              <a:rPr kumimoji="0" lang="en-US" sz="1600" b="0" i="0" u="none" strike="noStrike" cap="none" normalizeH="0" baseline="0" dirty="0">
                 <a:ln>
                   <a:noFill/>
                 </a:ln>
@@ -10852,7 +10692,7 @@
               <a:t>    </a:t>
             </a:r>
             <a:r>
-              <a:rPr kumimoji="0" lang="en-US" sz="1600" b="0" i="0" u="none" strike="noStrike" cap="none" normalizeH="0" baseline="0" dirty="0" err="1" smtClean="0">
+              <a:rPr kumimoji="0" lang="en-US" sz="1600" b="0" i="0" u="none" strike="noStrike" cap="none" normalizeH="0" baseline="0" dirty="0" err="1">
                 <a:ln>
                   <a:noFill/>
                 </a:ln>
@@ -10865,7 +10705,7 @@
               <a:t>time.sleep</a:t>
             </a:r>
             <a:r>
-              <a:rPr kumimoji="0" lang="en-US" sz="1600" b="0" i="0" u="none" strike="noStrike" cap="none" normalizeH="0" baseline="0" dirty="0" smtClean="0">
+              <a:rPr kumimoji="0" lang="en-US" sz="1600" b="0" i="0" u="none" strike="noStrike" cap="none" normalizeH="0" baseline="0" dirty="0">
                 <a:ln>
                   <a:noFill/>
                 </a:ln>
@@ -10878,7 +10718,7 @@
               <a:t>(</a:t>
             </a:r>
             <a:r>
-              <a:rPr kumimoji="0" lang="en-US" sz="1600" b="0" i="0" u="none" strike="noStrike" cap="none" normalizeH="0" baseline="0" dirty="0" smtClean="0">
+              <a:rPr kumimoji="0" lang="en-US" sz="1600" b="0" i="0" u="none" strike="noStrike" cap="none" normalizeH="0" baseline="0" dirty="0">
                 <a:ln>
                   <a:noFill/>
                 </a:ln>
@@ -10891,7 +10731,7 @@
               <a:t>2</a:t>
             </a:r>
             <a:r>
-              <a:rPr kumimoji="0" lang="en-US" sz="1600" b="0" i="0" u="none" strike="noStrike" cap="none" normalizeH="0" baseline="0" dirty="0" smtClean="0">
+              <a:rPr kumimoji="0" lang="en-US" sz="1600" b="0" i="0" u="none" strike="noStrike" cap="none" normalizeH="0" baseline="0" dirty="0">
                 <a:ln>
                   <a:noFill/>
                 </a:ln>
@@ -10904,7 +10744,7 @@
               <a:t>)</a:t>
             </a:r>
             <a:br>
-              <a:rPr kumimoji="0" lang="en-US" sz="1600" b="0" i="0" u="none" strike="noStrike" cap="none" normalizeH="0" baseline="0" dirty="0" smtClean="0">
+              <a:rPr kumimoji="0" lang="en-US" sz="1600" b="0" i="0" u="none" strike="noStrike" cap="none" normalizeH="0" baseline="0" dirty="0">
                 <a:ln>
                   <a:noFill/>
                 </a:ln>
@@ -10916,7 +10756,7 @@
               </a:rPr>
             </a:br>
             <a:r>
-              <a:rPr kumimoji="0" lang="en-US" sz="1600" b="0" i="0" u="none" strike="noStrike" cap="none" normalizeH="0" baseline="0" dirty="0" smtClean="0">
+              <a:rPr kumimoji="0" lang="en-US" sz="1600" b="0" i="0" u="none" strike="noStrike" cap="none" normalizeH="0" baseline="0" dirty="0">
                 <a:ln>
                   <a:noFill/>
                 </a:ln>
@@ -10929,7 +10769,7 @@
               <a:t>    </a:t>
             </a:r>
             <a:r>
-              <a:rPr kumimoji="0" lang="en-US" sz="1600" b="0" i="0" u="none" strike="noStrike" cap="none" normalizeH="0" baseline="0" dirty="0" err="1" smtClean="0">
+              <a:rPr kumimoji="0" lang="en-US" sz="1600" b="0" i="0" u="none" strike="noStrike" cap="none" normalizeH="0" baseline="0" dirty="0" err="1">
                 <a:ln>
                   <a:noFill/>
                 </a:ln>
@@ -10942,7 +10782,7 @@
               <a:t>sendCommand</a:t>
             </a:r>
             <a:r>
-              <a:rPr kumimoji="0" lang="en-US" sz="1600" b="0" i="0" u="none" strike="noStrike" cap="none" normalizeH="0" baseline="0" dirty="0" smtClean="0">
+              <a:rPr kumimoji="0" lang="en-US" sz="1600" b="0" i="0" u="none" strike="noStrike" cap="none" normalizeH="0" baseline="0" dirty="0">
                 <a:ln>
                   <a:noFill/>
                 </a:ln>
@@ -10955,7 +10795,7 @@
               <a:t>(</a:t>
             </a:r>
             <a:r>
-              <a:rPr kumimoji="0" lang="en-US" sz="1600" b="0" i="0" u="none" strike="noStrike" cap="none" normalizeH="0" baseline="0" dirty="0" smtClean="0">
+              <a:rPr kumimoji="0" lang="en-US" sz="1600" b="0" i="0" u="none" strike="noStrike" cap="none" normalizeH="0" baseline="0" dirty="0">
                 <a:ln>
                   <a:noFill/>
                 </a:ln>
@@ -10968,7 +10808,7 @@
               <a:t>"4"</a:t>
             </a:r>
             <a:r>
-              <a:rPr kumimoji="0" lang="en-US" sz="1600" b="0" i="0" u="none" strike="noStrike" cap="none" normalizeH="0" baseline="0" dirty="0" smtClean="0">
+              <a:rPr kumimoji="0" lang="en-US" sz="1600" b="0" i="0" u="none" strike="noStrike" cap="none" normalizeH="0" baseline="0" dirty="0">
                 <a:ln>
                   <a:noFill/>
                 </a:ln>
@@ -10981,7 +10821,7 @@
               <a:t>)</a:t>
             </a:r>
             <a:br>
-              <a:rPr kumimoji="0" lang="en-US" sz="1600" b="0" i="0" u="none" strike="noStrike" cap="none" normalizeH="0" baseline="0" dirty="0" smtClean="0">
+              <a:rPr kumimoji="0" lang="en-US" sz="1600" b="0" i="0" u="none" strike="noStrike" cap="none" normalizeH="0" baseline="0" dirty="0">
                 <a:ln>
                   <a:noFill/>
                 </a:ln>
@@ -10993,7 +10833,7 @@
               </a:rPr>
             </a:br>
             <a:r>
-              <a:rPr kumimoji="0" lang="en-US" sz="1600" b="0" i="0" u="none" strike="noStrike" cap="none" normalizeH="0" baseline="0" dirty="0" smtClean="0">
+              <a:rPr kumimoji="0" lang="en-US" sz="1600" b="0" i="0" u="none" strike="noStrike" cap="none" normalizeH="0" baseline="0" dirty="0">
                 <a:ln>
                   <a:noFill/>
                 </a:ln>
@@ -11006,7 +10846,7 @@
               <a:t>    </a:t>
             </a:r>
             <a:r>
-              <a:rPr kumimoji="0" lang="en-US" sz="1600" b="0" i="0" u="none" strike="noStrike" cap="none" normalizeH="0" baseline="0" dirty="0" err="1" smtClean="0">
+              <a:rPr kumimoji="0" lang="en-US" sz="1600" b="0" i="0" u="none" strike="noStrike" cap="none" normalizeH="0" baseline="0" dirty="0" err="1">
                 <a:ln>
                   <a:noFill/>
                 </a:ln>
@@ -11019,7 +10859,7 @@
               <a:t>time.sleep</a:t>
             </a:r>
             <a:r>
-              <a:rPr kumimoji="0" lang="en-US" sz="1600" b="0" i="0" u="none" strike="noStrike" cap="none" normalizeH="0" baseline="0" dirty="0" smtClean="0">
+              <a:rPr kumimoji="0" lang="en-US" sz="1600" b="0" i="0" u="none" strike="noStrike" cap="none" normalizeH="0" baseline="0" dirty="0">
                 <a:ln>
                   <a:noFill/>
                 </a:ln>
@@ -11032,7 +10872,7 @@
               <a:t>(</a:t>
             </a:r>
             <a:r>
-              <a:rPr kumimoji="0" lang="en-US" sz="1600" b="0" i="0" u="none" strike="noStrike" cap="none" normalizeH="0" baseline="0" dirty="0" smtClean="0">
+              <a:rPr kumimoji="0" lang="en-US" sz="1600" b="0" i="0" u="none" strike="noStrike" cap="none" normalizeH="0" baseline="0" dirty="0">
                 <a:ln>
                   <a:noFill/>
                 </a:ln>
@@ -11045,7 +10885,7 @@
               <a:t>2</a:t>
             </a:r>
             <a:r>
-              <a:rPr kumimoji="0" lang="en-US" sz="1600" b="0" i="0" u="none" strike="noStrike" cap="none" normalizeH="0" baseline="0" dirty="0" smtClean="0">
+              <a:rPr kumimoji="0" lang="en-US" sz="1600" b="0" i="0" u="none" strike="noStrike" cap="none" normalizeH="0" baseline="0" dirty="0">
                 <a:ln>
                   <a:noFill/>
                 </a:ln>
@@ -11058,7 +10898,7 @@
               <a:t>)</a:t>
             </a:r>
             <a:br>
-              <a:rPr kumimoji="0" lang="en-US" sz="1600" b="0" i="0" u="none" strike="noStrike" cap="none" normalizeH="0" baseline="0" dirty="0" smtClean="0">
+              <a:rPr kumimoji="0" lang="en-US" sz="1600" b="0" i="0" u="none" strike="noStrike" cap="none" normalizeH="0" baseline="0" dirty="0">
                 <a:ln>
                   <a:noFill/>
                 </a:ln>
@@ -11070,7 +10910,7 @@
               </a:rPr>
             </a:br>
             <a:r>
-              <a:rPr kumimoji="0" lang="en-US" sz="1600" b="0" i="0" u="none" strike="noStrike" cap="none" normalizeH="0" baseline="0" dirty="0" smtClean="0">
+              <a:rPr kumimoji="0" lang="en-US" sz="1600" b="0" i="0" u="none" strike="noStrike" cap="none" normalizeH="0" baseline="0" dirty="0">
                 <a:ln>
                   <a:noFill/>
                 </a:ln>
@@ -11083,7 +10923,7 @@
               <a:t>    </a:t>
             </a:r>
             <a:r>
-              <a:rPr kumimoji="0" lang="en-US" sz="1600" b="0" i="0" u="none" strike="noStrike" cap="none" normalizeH="0" baseline="0" dirty="0" err="1" smtClean="0">
+              <a:rPr kumimoji="0" lang="en-US" sz="1600" b="0" i="0" u="none" strike="noStrike" cap="none" normalizeH="0" baseline="0" dirty="0" err="1">
                 <a:ln>
                   <a:noFill/>
                 </a:ln>
@@ -11096,7 +10936,7 @@
               <a:t>sendCommand</a:t>
             </a:r>
             <a:r>
-              <a:rPr kumimoji="0" lang="en-US" sz="1600" b="0" i="0" u="none" strike="noStrike" cap="none" normalizeH="0" baseline="0" dirty="0" smtClean="0">
+              <a:rPr kumimoji="0" lang="en-US" sz="1600" b="0" i="0" u="none" strike="noStrike" cap="none" normalizeH="0" baseline="0" dirty="0">
                 <a:ln>
                   <a:noFill/>
                 </a:ln>
@@ -11109,7 +10949,7 @@
               <a:t>(</a:t>
             </a:r>
             <a:r>
-              <a:rPr kumimoji="0" lang="en-US" sz="1600" b="0" i="0" u="none" strike="noStrike" cap="none" normalizeH="0" baseline="0" dirty="0" smtClean="0">
+              <a:rPr kumimoji="0" lang="en-US" sz="1600" b="0" i="0" u="none" strike="noStrike" cap="none" normalizeH="0" baseline="0" dirty="0">
                 <a:ln>
                   <a:noFill/>
                 </a:ln>
@@ -11122,7 +10962,7 @@
               <a:t>"5"</a:t>
             </a:r>
             <a:r>
-              <a:rPr kumimoji="0" lang="en-US" sz="1600" b="0" i="0" u="none" strike="noStrike" cap="none" normalizeH="0" baseline="0" dirty="0" smtClean="0">
+              <a:rPr kumimoji="0" lang="en-US" sz="1600" b="0" i="0" u="none" strike="noStrike" cap="none" normalizeH="0" baseline="0" dirty="0">
                 <a:ln>
                   <a:noFill/>
                 </a:ln>
@@ -11135,7 +10975,7 @@
               <a:t>)</a:t>
             </a:r>
             <a:br>
-              <a:rPr kumimoji="0" lang="en-US" sz="1600" b="0" i="0" u="none" strike="noStrike" cap="none" normalizeH="0" baseline="0" dirty="0" smtClean="0">
+              <a:rPr kumimoji="0" lang="en-US" sz="1600" b="0" i="0" u="none" strike="noStrike" cap="none" normalizeH="0" baseline="0" dirty="0">
                 <a:ln>
                   <a:noFill/>
                 </a:ln>
@@ -11147,7 +10987,7 @@
               </a:rPr>
             </a:br>
             <a:r>
-              <a:rPr kumimoji="0" lang="en-US" sz="1600" b="0" i="0" u="none" strike="noStrike" cap="none" normalizeH="0" baseline="0" dirty="0" smtClean="0">
+              <a:rPr kumimoji="0" lang="en-US" sz="1600" b="0" i="0" u="none" strike="noStrike" cap="none" normalizeH="0" baseline="0" dirty="0">
                 <a:ln>
                   <a:noFill/>
                 </a:ln>
@@ -11160,7 +11000,7 @@
               <a:t>    </a:t>
             </a:r>
             <a:r>
-              <a:rPr kumimoji="0" lang="en-US" sz="1600" b="0" i="0" u="none" strike="noStrike" cap="none" normalizeH="0" baseline="0" dirty="0" err="1" smtClean="0">
+              <a:rPr kumimoji="0" lang="en-US" sz="1600" b="0" i="0" u="none" strike="noStrike" cap="none" normalizeH="0" baseline="0" dirty="0" err="1">
                 <a:ln>
                   <a:noFill/>
                 </a:ln>
@@ -11173,7 +11013,7 @@
               <a:t>time.sleep</a:t>
             </a:r>
             <a:r>
-              <a:rPr kumimoji="0" lang="en-US" sz="1600" b="0" i="0" u="none" strike="noStrike" cap="none" normalizeH="0" baseline="0" dirty="0" smtClean="0">
+              <a:rPr kumimoji="0" lang="en-US" sz="1600" b="0" i="0" u="none" strike="noStrike" cap="none" normalizeH="0" baseline="0" dirty="0">
                 <a:ln>
                   <a:noFill/>
                 </a:ln>
@@ -11186,7 +11026,7 @@
               <a:t>(</a:t>
             </a:r>
             <a:r>
-              <a:rPr kumimoji="0" lang="en-US" sz="1600" b="0" i="0" u="none" strike="noStrike" cap="none" normalizeH="0" baseline="0" dirty="0" smtClean="0">
+              <a:rPr kumimoji="0" lang="en-US" sz="1600" b="0" i="0" u="none" strike="noStrike" cap="none" normalizeH="0" baseline="0" dirty="0">
                 <a:ln>
                   <a:noFill/>
                 </a:ln>
@@ -11199,7 +11039,7 @@
               <a:t>2</a:t>
             </a:r>
             <a:r>
-              <a:rPr kumimoji="0" lang="en-US" sz="1600" b="0" i="0" u="none" strike="noStrike" cap="none" normalizeH="0" baseline="0" dirty="0" smtClean="0">
+              <a:rPr kumimoji="0" lang="en-US" sz="1600" b="0" i="0" u="none" strike="noStrike" cap="none" normalizeH="0" baseline="0" dirty="0">
                 <a:ln>
                   <a:noFill/>
                 </a:ln>
@@ -11211,7 +11051,7 @@
               </a:rPr>
               <a:t>)</a:t>
             </a:r>
-            <a:endParaRPr kumimoji="0" lang="en-US" sz="1200" b="0" i="0" u="none" strike="noStrike" cap="none" normalizeH="0" baseline="0" dirty="0" smtClean="0">
+            <a:endParaRPr kumimoji="0" lang="en-US" sz="1200" b="0" i="0" u="none" strike="noStrike" cap="none" normalizeH="0" baseline="0" dirty="0">
               <a:ln>
                 <a:noFill/>
               </a:ln>
@@ -11234,13 +11074,13 @@
   <p:clrMapOvr>
     <a:masterClrMapping/>
   </p:clrMapOvr>
-  <mc:AlternateContent xmlns:mc="http://schemas.openxmlformats.org/markup-compatibility/2006">
-    <mc:Choice xmlns:p14="http://schemas.microsoft.com/office/powerpoint/2010/main" Requires="p14">
+  <mc:AlternateContent xmlns:mc="http://schemas.openxmlformats.org/markup-compatibility/2006" xmlns:p14="http://schemas.microsoft.com/office/powerpoint/2010/main">
+    <mc:Choice Requires="p14">
       <p:transition spd="med" p14:dur="700">
         <p:fade/>
       </p:transition>
     </mc:Choice>
-    <mc:Fallback>
+    <mc:Fallback xmlns="">
       <p:transition spd="med">
         <p:fade/>
       </p:transition>
@@ -11290,20 +11130,12 @@
           <a:p>
             <a:pPr algn="ctr"/>
             <a:r>
-              <a:rPr lang="en-US" dirty="0" smtClean="0">
+              <a:rPr lang="en-US" dirty="0">
                 <a:solidFill>
                   <a:srgbClr val="FFFF00"/>
                 </a:solidFill>
               </a:rPr>
-              <a:t>Part 2: </a:t>
-            </a:r>
-            <a:r>
-              <a:rPr lang="en-US" dirty="0" smtClean="0">
-                <a:solidFill>
-                  <a:srgbClr val="FFFF00"/>
-                </a:solidFill>
-              </a:rPr>
-              <a:t>Receive Sensory Data</a:t>
+              <a:t>Part 2: Receive Sensory Data</a:t>
             </a:r>
             <a:endParaRPr lang="en-US" dirty="0"/>
           </a:p>
@@ -11331,13 +11163,6 @@
       </p:transition>
     </mc:Fallback>
   </mc:AlternateContent>
-  <p:timing>
-    <p:tnLst>
-      <p:par>
-        <p:cTn id="1" dur="indefinite" restart="never" nodeType="tmRoot"/>
-      </p:par>
-    </p:tnLst>
-  </p:timing>
 </p:sld>
 </file>
 

</xml_diff>